<commit_message>
Add revisions to dataset preparation
</commit_message>
<xml_diff>
--- a/Machine_Learning_Deep_Learning/data/Dataset_Preparation_EP_DL.pptx
+++ b/Machine_Learning_Deep_Learning/data/Dataset_Preparation_EP_DL.pptx
@@ -8,10 +8,12 @@
     <p:sldId id="260" r:id="rId2"/>
     <p:sldId id="256" r:id="rId3"/>
     <p:sldId id="257" r:id="rId4"/>
-    <p:sldId id="259" r:id="rId5"/>
-    <p:sldId id="258" r:id="rId6"/>
-    <p:sldId id="261" r:id="rId7"/>
-    <p:sldId id="262" r:id="rId8"/>
+    <p:sldId id="263" r:id="rId5"/>
+    <p:sldId id="264" r:id="rId6"/>
+    <p:sldId id="259" r:id="rId7"/>
+    <p:sldId id="258" r:id="rId8"/>
+    <p:sldId id="261" r:id="rId9"/>
+    <p:sldId id="262" r:id="rId10"/>
   </p:sldIdLst>
   <p:sldSz cx="12192000" cy="6858000"/>
   <p:notesSz cx="6858000" cy="9144000"/>
@@ -866,6 +868,753 @@
 </file>
 
 <file path=ppt/diagrams/colors2.xml><?xml version="1.0" encoding="utf-8"?>
+<dgm:colorsDef xmlns:dgm="http://schemas.openxmlformats.org/drawingml/2006/diagram" xmlns:a="http://schemas.openxmlformats.org/drawingml/2006/main" uniqueId="urn:microsoft.com/office/officeart/2005/8/colors/accent1_2">
+  <dgm:title val=""/>
+  <dgm:desc val=""/>
+  <dgm:catLst>
+    <dgm:cat type="accent1" pri="11200"/>
+  </dgm:catLst>
+  <dgm:styleLbl name="node0">
+    <dgm:fillClrLst meth="repeat">
+      <a:schemeClr val="accent1"/>
+    </dgm:fillClrLst>
+    <dgm:linClrLst meth="repeat">
+      <a:schemeClr val="lt1"/>
+    </dgm:linClrLst>
+    <dgm:effectClrLst/>
+    <dgm:txLinClrLst/>
+    <dgm:txFillClrLst/>
+    <dgm:txEffectClrLst/>
+  </dgm:styleLbl>
+  <dgm:styleLbl name="alignNode1">
+    <dgm:fillClrLst meth="repeat">
+      <a:schemeClr val="accent1"/>
+    </dgm:fillClrLst>
+    <dgm:linClrLst meth="repeat">
+      <a:schemeClr val="accent1"/>
+    </dgm:linClrLst>
+    <dgm:effectClrLst/>
+    <dgm:txLinClrLst/>
+    <dgm:txFillClrLst/>
+    <dgm:txEffectClrLst/>
+  </dgm:styleLbl>
+  <dgm:styleLbl name="node1">
+    <dgm:fillClrLst meth="repeat">
+      <a:schemeClr val="accent1"/>
+    </dgm:fillClrLst>
+    <dgm:linClrLst meth="repeat">
+      <a:schemeClr val="lt1"/>
+    </dgm:linClrLst>
+    <dgm:effectClrLst/>
+    <dgm:txLinClrLst/>
+    <dgm:txFillClrLst/>
+    <dgm:txEffectClrLst/>
+  </dgm:styleLbl>
+  <dgm:styleLbl name="lnNode1">
+    <dgm:fillClrLst meth="repeat">
+      <a:schemeClr val="accent1"/>
+    </dgm:fillClrLst>
+    <dgm:linClrLst meth="repeat">
+      <a:schemeClr val="lt1"/>
+    </dgm:linClrLst>
+    <dgm:effectClrLst/>
+    <dgm:txLinClrLst/>
+    <dgm:txFillClrLst/>
+    <dgm:txEffectClrLst/>
+  </dgm:styleLbl>
+  <dgm:styleLbl name="vennNode1">
+    <dgm:fillClrLst meth="repeat">
+      <a:schemeClr val="accent1">
+        <a:alpha val="50000"/>
+      </a:schemeClr>
+    </dgm:fillClrLst>
+    <dgm:linClrLst meth="repeat">
+      <a:schemeClr val="lt1"/>
+    </dgm:linClrLst>
+    <dgm:effectClrLst/>
+    <dgm:txLinClrLst/>
+    <dgm:txFillClrLst/>
+    <dgm:txEffectClrLst/>
+  </dgm:styleLbl>
+  <dgm:styleLbl name="node2">
+    <dgm:fillClrLst meth="repeat">
+      <a:schemeClr val="accent1"/>
+    </dgm:fillClrLst>
+    <dgm:linClrLst meth="repeat">
+      <a:schemeClr val="lt1"/>
+    </dgm:linClrLst>
+    <dgm:effectClrLst/>
+    <dgm:txLinClrLst/>
+    <dgm:txFillClrLst/>
+    <dgm:txEffectClrLst/>
+  </dgm:styleLbl>
+  <dgm:styleLbl name="node3">
+    <dgm:fillClrLst meth="repeat">
+      <a:schemeClr val="accent1"/>
+    </dgm:fillClrLst>
+    <dgm:linClrLst meth="repeat">
+      <a:schemeClr val="lt1"/>
+    </dgm:linClrLst>
+    <dgm:effectClrLst/>
+    <dgm:txLinClrLst/>
+    <dgm:txFillClrLst/>
+    <dgm:txEffectClrLst/>
+  </dgm:styleLbl>
+  <dgm:styleLbl name="node4">
+    <dgm:fillClrLst meth="repeat">
+      <a:schemeClr val="accent1"/>
+    </dgm:fillClrLst>
+    <dgm:linClrLst meth="repeat">
+      <a:schemeClr val="lt1"/>
+    </dgm:linClrLst>
+    <dgm:effectClrLst/>
+    <dgm:txLinClrLst/>
+    <dgm:txFillClrLst/>
+    <dgm:txEffectClrLst/>
+  </dgm:styleLbl>
+  <dgm:styleLbl name="fgImgPlace1">
+    <dgm:fillClrLst meth="repeat">
+      <a:schemeClr val="accent1">
+        <a:tint val="50000"/>
+      </a:schemeClr>
+    </dgm:fillClrLst>
+    <dgm:linClrLst meth="repeat">
+      <a:schemeClr val="lt1"/>
+    </dgm:linClrLst>
+    <dgm:effectClrLst/>
+    <dgm:txLinClrLst/>
+    <dgm:txFillClrLst meth="repeat">
+      <a:schemeClr val="lt1"/>
+    </dgm:txFillClrLst>
+    <dgm:txEffectClrLst/>
+  </dgm:styleLbl>
+  <dgm:styleLbl name="alignImgPlace1">
+    <dgm:fillClrLst meth="repeat">
+      <a:schemeClr val="accent1">
+        <a:tint val="50000"/>
+      </a:schemeClr>
+    </dgm:fillClrLst>
+    <dgm:linClrLst meth="repeat">
+      <a:schemeClr val="lt1"/>
+    </dgm:linClrLst>
+    <dgm:effectClrLst/>
+    <dgm:txLinClrLst/>
+    <dgm:txFillClrLst meth="repeat">
+      <a:schemeClr val="lt1"/>
+    </dgm:txFillClrLst>
+    <dgm:txEffectClrLst/>
+  </dgm:styleLbl>
+  <dgm:styleLbl name="bgImgPlace1">
+    <dgm:fillClrLst meth="repeat">
+      <a:schemeClr val="accent1">
+        <a:tint val="50000"/>
+      </a:schemeClr>
+    </dgm:fillClrLst>
+    <dgm:linClrLst meth="repeat">
+      <a:schemeClr val="lt1"/>
+    </dgm:linClrLst>
+    <dgm:effectClrLst/>
+    <dgm:txLinClrLst/>
+    <dgm:txFillClrLst meth="repeat">
+      <a:schemeClr val="lt1"/>
+    </dgm:txFillClrLst>
+    <dgm:txEffectClrLst/>
+  </dgm:styleLbl>
+  <dgm:styleLbl name="sibTrans2D1">
+    <dgm:fillClrLst meth="repeat">
+      <a:schemeClr val="accent1">
+        <a:tint val="60000"/>
+      </a:schemeClr>
+    </dgm:fillClrLst>
+    <dgm:linClrLst meth="repeat">
+      <a:schemeClr val="accent1">
+        <a:tint val="60000"/>
+      </a:schemeClr>
+    </dgm:linClrLst>
+    <dgm:effectClrLst/>
+    <dgm:txLinClrLst/>
+    <dgm:txFillClrLst/>
+    <dgm:txEffectClrLst/>
+  </dgm:styleLbl>
+  <dgm:styleLbl name="fgSibTrans2D1">
+    <dgm:fillClrLst meth="repeat">
+      <a:schemeClr val="accent1">
+        <a:tint val="60000"/>
+      </a:schemeClr>
+    </dgm:fillClrLst>
+    <dgm:linClrLst meth="repeat">
+      <a:schemeClr val="accent1">
+        <a:tint val="60000"/>
+      </a:schemeClr>
+    </dgm:linClrLst>
+    <dgm:effectClrLst/>
+    <dgm:txLinClrLst/>
+    <dgm:txFillClrLst/>
+    <dgm:txEffectClrLst/>
+  </dgm:styleLbl>
+  <dgm:styleLbl name="bgSibTrans2D1">
+    <dgm:fillClrLst meth="repeat">
+      <a:schemeClr val="accent1">
+        <a:tint val="60000"/>
+      </a:schemeClr>
+    </dgm:fillClrLst>
+    <dgm:linClrLst meth="repeat">
+      <a:schemeClr val="accent1">
+        <a:tint val="60000"/>
+      </a:schemeClr>
+    </dgm:linClrLst>
+    <dgm:effectClrLst/>
+    <dgm:txLinClrLst/>
+    <dgm:txFillClrLst/>
+    <dgm:txEffectClrLst/>
+  </dgm:styleLbl>
+  <dgm:styleLbl name="sibTrans1D1">
+    <dgm:fillClrLst meth="repeat">
+      <a:schemeClr val="accent1"/>
+    </dgm:fillClrLst>
+    <dgm:linClrLst meth="repeat">
+      <a:schemeClr val="accent1"/>
+    </dgm:linClrLst>
+    <dgm:effectClrLst/>
+    <dgm:txLinClrLst/>
+    <dgm:txFillClrLst meth="repeat">
+      <a:schemeClr val="tx1"/>
+    </dgm:txFillClrLst>
+    <dgm:txEffectClrLst/>
+  </dgm:styleLbl>
+  <dgm:styleLbl name="callout">
+    <dgm:fillClrLst meth="repeat">
+      <a:schemeClr val="accent1"/>
+    </dgm:fillClrLst>
+    <dgm:linClrLst meth="repeat">
+      <a:schemeClr val="accent1">
+        <a:tint val="50000"/>
+      </a:schemeClr>
+    </dgm:linClrLst>
+    <dgm:effectClrLst/>
+    <dgm:txLinClrLst/>
+    <dgm:txFillClrLst meth="repeat">
+      <a:schemeClr val="tx1"/>
+    </dgm:txFillClrLst>
+    <dgm:txEffectClrLst/>
+  </dgm:styleLbl>
+  <dgm:styleLbl name="asst0">
+    <dgm:fillClrLst meth="repeat">
+      <a:schemeClr val="accent1"/>
+    </dgm:fillClrLst>
+    <dgm:linClrLst meth="repeat">
+      <a:schemeClr val="lt1"/>
+    </dgm:linClrLst>
+    <dgm:effectClrLst/>
+    <dgm:txLinClrLst/>
+    <dgm:txFillClrLst/>
+    <dgm:txEffectClrLst/>
+  </dgm:styleLbl>
+  <dgm:styleLbl name="asst1">
+    <dgm:fillClrLst meth="repeat">
+      <a:schemeClr val="accent1"/>
+    </dgm:fillClrLst>
+    <dgm:linClrLst meth="repeat">
+      <a:schemeClr val="lt1"/>
+    </dgm:linClrLst>
+    <dgm:effectClrLst/>
+    <dgm:txLinClrLst/>
+    <dgm:txFillClrLst/>
+    <dgm:txEffectClrLst/>
+  </dgm:styleLbl>
+  <dgm:styleLbl name="asst2">
+    <dgm:fillClrLst meth="repeat">
+      <a:schemeClr val="accent1"/>
+    </dgm:fillClrLst>
+    <dgm:linClrLst meth="repeat">
+      <a:schemeClr val="lt1"/>
+    </dgm:linClrLst>
+    <dgm:effectClrLst/>
+    <dgm:txLinClrLst/>
+    <dgm:txFillClrLst/>
+    <dgm:txEffectClrLst/>
+  </dgm:styleLbl>
+  <dgm:styleLbl name="asst3">
+    <dgm:fillClrLst meth="repeat">
+      <a:schemeClr val="accent1"/>
+    </dgm:fillClrLst>
+    <dgm:linClrLst meth="repeat">
+      <a:schemeClr val="lt1"/>
+    </dgm:linClrLst>
+    <dgm:effectClrLst/>
+    <dgm:txLinClrLst/>
+    <dgm:txFillClrLst/>
+    <dgm:txEffectClrLst/>
+  </dgm:styleLbl>
+  <dgm:styleLbl name="asst4">
+    <dgm:fillClrLst meth="repeat">
+      <a:schemeClr val="accent1"/>
+    </dgm:fillClrLst>
+    <dgm:linClrLst meth="repeat">
+      <a:schemeClr val="lt1"/>
+    </dgm:linClrLst>
+    <dgm:effectClrLst/>
+    <dgm:txLinClrLst/>
+    <dgm:txFillClrLst/>
+    <dgm:txEffectClrLst/>
+  </dgm:styleLbl>
+  <dgm:styleLbl name="parChTrans2D1">
+    <dgm:fillClrLst meth="repeat">
+      <a:schemeClr val="accent1">
+        <a:tint val="60000"/>
+      </a:schemeClr>
+    </dgm:fillClrLst>
+    <dgm:linClrLst meth="repeat">
+      <a:schemeClr val="accent1">
+        <a:tint val="60000"/>
+      </a:schemeClr>
+    </dgm:linClrLst>
+    <dgm:effectClrLst/>
+    <dgm:txLinClrLst/>
+    <dgm:txFillClrLst meth="repeat">
+      <a:schemeClr val="lt1"/>
+    </dgm:txFillClrLst>
+    <dgm:txEffectClrLst/>
+  </dgm:styleLbl>
+  <dgm:styleLbl name="parChTrans2D2">
+    <dgm:fillClrLst meth="repeat">
+      <a:schemeClr val="accent1"/>
+    </dgm:fillClrLst>
+    <dgm:linClrLst meth="repeat">
+      <a:schemeClr val="accent1"/>
+    </dgm:linClrLst>
+    <dgm:effectClrLst/>
+    <dgm:txLinClrLst/>
+    <dgm:txFillClrLst meth="repeat">
+      <a:schemeClr val="lt1"/>
+    </dgm:txFillClrLst>
+    <dgm:txEffectClrLst/>
+  </dgm:styleLbl>
+  <dgm:styleLbl name="parChTrans2D3">
+    <dgm:fillClrLst meth="repeat">
+      <a:schemeClr val="accent1"/>
+    </dgm:fillClrLst>
+    <dgm:linClrLst meth="repeat">
+      <a:schemeClr val="accent1"/>
+    </dgm:linClrLst>
+    <dgm:effectClrLst/>
+    <dgm:txLinClrLst/>
+    <dgm:txFillClrLst meth="repeat">
+      <a:schemeClr val="lt1"/>
+    </dgm:txFillClrLst>
+    <dgm:txEffectClrLst/>
+  </dgm:styleLbl>
+  <dgm:styleLbl name="parChTrans2D4">
+    <dgm:fillClrLst meth="repeat">
+      <a:schemeClr val="accent1"/>
+    </dgm:fillClrLst>
+    <dgm:linClrLst meth="repeat">
+      <a:schemeClr val="accent1"/>
+    </dgm:linClrLst>
+    <dgm:effectClrLst/>
+    <dgm:txLinClrLst/>
+    <dgm:txFillClrLst meth="repeat">
+      <a:schemeClr val="lt1"/>
+    </dgm:txFillClrLst>
+    <dgm:txEffectClrLst/>
+  </dgm:styleLbl>
+  <dgm:styleLbl name="parChTrans1D1">
+    <dgm:fillClrLst meth="repeat">
+      <a:schemeClr val="accent1"/>
+    </dgm:fillClrLst>
+    <dgm:linClrLst meth="repeat">
+      <a:schemeClr val="accent1">
+        <a:shade val="60000"/>
+      </a:schemeClr>
+    </dgm:linClrLst>
+    <dgm:effectClrLst/>
+    <dgm:txLinClrLst/>
+    <dgm:txFillClrLst meth="repeat">
+      <a:schemeClr val="tx1"/>
+    </dgm:txFillClrLst>
+    <dgm:txEffectClrLst/>
+  </dgm:styleLbl>
+  <dgm:styleLbl name="parChTrans1D2">
+    <dgm:fillClrLst meth="repeat">
+      <a:schemeClr val="accent1"/>
+    </dgm:fillClrLst>
+    <dgm:linClrLst meth="repeat">
+      <a:schemeClr val="accent1">
+        <a:shade val="60000"/>
+      </a:schemeClr>
+    </dgm:linClrLst>
+    <dgm:effectClrLst/>
+    <dgm:txLinClrLst/>
+    <dgm:txFillClrLst meth="repeat">
+      <a:schemeClr val="tx1"/>
+    </dgm:txFillClrLst>
+    <dgm:txEffectClrLst/>
+  </dgm:styleLbl>
+  <dgm:styleLbl name="parChTrans1D3">
+    <dgm:fillClrLst meth="repeat">
+      <a:schemeClr val="accent1"/>
+    </dgm:fillClrLst>
+    <dgm:linClrLst meth="repeat">
+      <a:schemeClr val="accent1">
+        <a:shade val="80000"/>
+      </a:schemeClr>
+    </dgm:linClrLst>
+    <dgm:effectClrLst/>
+    <dgm:txLinClrLst/>
+    <dgm:txFillClrLst meth="repeat">
+      <a:schemeClr val="tx1"/>
+    </dgm:txFillClrLst>
+    <dgm:txEffectClrLst/>
+  </dgm:styleLbl>
+  <dgm:styleLbl name="parChTrans1D4">
+    <dgm:fillClrLst meth="repeat">
+      <a:schemeClr val="accent1"/>
+    </dgm:fillClrLst>
+    <dgm:linClrLst meth="repeat">
+      <a:schemeClr val="accent1">
+        <a:shade val="80000"/>
+      </a:schemeClr>
+    </dgm:linClrLst>
+    <dgm:effectClrLst/>
+    <dgm:txLinClrLst/>
+    <dgm:txFillClrLst meth="repeat">
+      <a:schemeClr val="tx1"/>
+    </dgm:txFillClrLst>
+    <dgm:txEffectClrLst/>
+  </dgm:styleLbl>
+  <dgm:styleLbl name="fgAcc1">
+    <dgm:fillClrLst meth="repeat">
+      <a:schemeClr val="lt1">
+        <a:alpha val="90000"/>
+      </a:schemeClr>
+    </dgm:fillClrLst>
+    <dgm:linClrLst meth="repeat">
+      <a:schemeClr val="accent1"/>
+    </dgm:linClrLst>
+    <dgm:effectClrLst/>
+    <dgm:txLinClrLst/>
+    <dgm:txFillClrLst meth="repeat">
+      <a:schemeClr val="dk1"/>
+    </dgm:txFillClrLst>
+    <dgm:txEffectClrLst/>
+  </dgm:styleLbl>
+  <dgm:styleLbl name="conFgAcc1">
+    <dgm:fillClrLst meth="repeat">
+      <a:schemeClr val="lt1">
+        <a:alpha val="90000"/>
+      </a:schemeClr>
+    </dgm:fillClrLst>
+    <dgm:linClrLst meth="repeat">
+      <a:schemeClr val="accent1"/>
+    </dgm:linClrLst>
+    <dgm:effectClrLst/>
+    <dgm:txLinClrLst/>
+    <dgm:txFillClrLst meth="repeat">
+      <a:schemeClr val="dk1"/>
+    </dgm:txFillClrLst>
+    <dgm:txEffectClrLst/>
+  </dgm:styleLbl>
+  <dgm:styleLbl name="alignAcc1">
+    <dgm:fillClrLst meth="repeat">
+      <a:schemeClr val="lt1">
+        <a:alpha val="90000"/>
+      </a:schemeClr>
+    </dgm:fillClrLst>
+    <dgm:linClrLst meth="repeat">
+      <a:schemeClr val="accent1"/>
+    </dgm:linClrLst>
+    <dgm:effectClrLst/>
+    <dgm:txLinClrLst/>
+    <dgm:txFillClrLst meth="repeat">
+      <a:schemeClr val="dk1"/>
+    </dgm:txFillClrLst>
+    <dgm:txEffectClrLst/>
+  </dgm:styleLbl>
+  <dgm:styleLbl name="trAlignAcc1">
+    <dgm:fillClrLst meth="repeat">
+      <a:schemeClr val="lt1">
+        <a:alpha val="40000"/>
+      </a:schemeClr>
+    </dgm:fillClrLst>
+    <dgm:linClrLst meth="repeat">
+      <a:schemeClr val="accent1"/>
+    </dgm:linClrLst>
+    <dgm:effectClrLst/>
+    <dgm:txLinClrLst/>
+    <dgm:txFillClrLst meth="repeat">
+      <a:schemeClr val="dk1"/>
+    </dgm:txFillClrLst>
+    <dgm:txEffectClrLst/>
+  </dgm:styleLbl>
+  <dgm:styleLbl name="bgAcc1">
+    <dgm:fillClrLst meth="repeat">
+      <a:schemeClr val="lt1">
+        <a:alpha val="90000"/>
+      </a:schemeClr>
+    </dgm:fillClrLst>
+    <dgm:linClrLst meth="repeat">
+      <a:schemeClr val="accent1"/>
+    </dgm:linClrLst>
+    <dgm:effectClrLst/>
+    <dgm:txLinClrLst/>
+    <dgm:txFillClrLst meth="repeat">
+      <a:schemeClr val="dk1"/>
+    </dgm:txFillClrLst>
+    <dgm:txEffectClrLst/>
+  </dgm:styleLbl>
+  <dgm:styleLbl name="solidFgAcc1">
+    <dgm:fillClrLst meth="repeat">
+      <a:schemeClr val="lt1"/>
+    </dgm:fillClrLst>
+    <dgm:linClrLst meth="repeat">
+      <a:schemeClr val="accent1"/>
+    </dgm:linClrLst>
+    <dgm:effectClrLst/>
+    <dgm:txLinClrLst/>
+    <dgm:txFillClrLst meth="repeat">
+      <a:schemeClr val="dk1"/>
+    </dgm:txFillClrLst>
+    <dgm:txEffectClrLst/>
+  </dgm:styleLbl>
+  <dgm:styleLbl name="solidAlignAcc1">
+    <dgm:fillClrLst meth="repeat">
+      <a:schemeClr val="lt1"/>
+    </dgm:fillClrLst>
+    <dgm:linClrLst meth="repeat">
+      <a:schemeClr val="accent1"/>
+    </dgm:linClrLst>
+    <dgm:effectClrLst/>
+    <dgm:txLinClrLst/>
+    <dgm:txFillClrLst meth="repeat">
+      <a:schemeClr val="dk1"/>
+    </dgm:txFillClrLst>
+    <dgm:txEffectClrLst/>
+  </dgm:styleLbl>
+  <dgm:styleLbl name="solidBgAcc1">
+    <dgm:fillClrLst meth="repeat">
+      <a:schemeClr val="lt1"/>
+    </dgm:fillClrLst>
+    <dgm:linClrLst meth="repeat">
+      <a:schemeClr val="accent1"/>
+    </dgm:linClrLst>
+    <dgm:effectClrLst/>
+    <dgm:txLinClrLst/>
+    <dgm:txFillClrLst meth="repeat">
+      <a:schemeClr val="dk1"/>
+    </dgm:txFillClrLst>
+    <dgm:txEffectClrLst/>
+  </dgm:styleLbl>
+  <dgm:styleLbl name="fgAccFollowNode1">
+    <dgm:fillClrLst meth="repeat">
+      <a:schemeClr val="accent1">
+        <a:alpha val="90000"/>
+        <a:tint val="40000"/>
+      </a:schemeClr>
+    </dgm:fillClrLst>
+    <dgm:linClrLst meth="repeat">
+      <a:schemeClr val="accent1">
+        <a:alpha val="90000"/>
+        <a:tint val="40000"/>
+      </a:schemeClr>
+    </dgm:linClrLst>
+    <dgm:effectClrLst/>
+    <dgm:txLinClrLst/>
+    <dgm:txFillClrLst meth="repeat">
+      <a:schemeClr val="dk1"/>
+    </dgm:txFillClrLst>
+    <dgm:txEffectClrLst/>
+  </dgm:styleLbl>
+  <dgm:styleLbl name="alignAccFollowNode1">
+    <dgm:fillClrLst meth="repeat">
+      <a:schemeClr val="accent1">
+        <a:alpha val="90000"/>
+        <a:tint val="40000"/>
+      </a:schemeClr>
+    </dgm:fillClrLst>
+    <dgm:linClrLst meth="repeat">
+      <a:schemeClr val="accent1">
+        <a:alpha val="90000"/>
+        <a:tint val="40000"/>
+      </a:schemeClr>
+    </dgm:linClrLst>
+    <dgm:effectClrLst/>
+    <dgm:txLinClrLst/>
+    <dgm:txFillClrLst meth="repeat">
+      <a:schemeClr val="dk1"/>
+    </dgm:txFillClrLst>
+    <dgm:txEffectClrLst/>
+  </dgm:styleLbl>
+  <dgm:styleLbl name="bgAccFollowNode1">
+    <dgm:fillClrLst meth="repeat">
+      <a:schemeClr val="accent1">
+        <a:alpha val="90000"/>
+        <a:tint val="40000"/>
+      </a:schemeClr>
+    </dgm:fillClrLst>
+    <dgm:linClrLst meth="repeat">
+      <a:schemeClr val="accent1">
+        <a:alpha val="90000"/>
+        <a:tint val="40000"/>
+      </a:schemeClr>
+    </dgm:linClrLst>
+    <dgm:effectClrLst/>
+    <dgm:txLinClrLst/>
+    <dgm:txFillClrLst meth="repeat">
+      <a:schemeClr val="dk1"/>
+    </dgm:txFillClrLst>
+    <dgm:txEffectClrLst/>
+  </dgm:styleLbl>
+  <dgm:styleLbl name="fgAcc0">
+    <dgm:fillClrLst meth="repeat">
+      <a:schemeClr val="lt1">
+        <a:alpha val="90000"/>
+      </a:schemeClr>
+    </dgm:fillClrLst>
+    <dgm:linClrLst meth="repeat">
+      <a:schemeClr val="accent1"/>
+    </dgm:linClrLst>
+    <dgm:effectClrLst/>
+    <dgm:txLinClrLst/>
+    <dgm:txFillClrLst meth="repeat">
+      <a:schemeClr val="dk1"/>
+    </dgm:txFillClrLst>
+    <dgm:txEffectClrLst/>
+  </dgm:styleLbl>
+  <dgm:styleLbl name="fgAcc2">
+    <dgm:fillClrLst meth="repeat">
+      <a:schemeClr val="lt1">
+        <a:alpha val="90000"/>
+      </a:schemeClr>
+    </dgm:fillClrLst>
+    <dgm:linClrLst meth="repeat">
+      <a:schemeClr val="accent1"/>
+    </dgm:linClrLst>
+    <dgm:effectClrLst/>
+    <dgm:txLinClrLst/>
+    <dgm:txFillClrLst meth="repeat">
+      <a:schemeClr val="dk1"/>
+    </dgm:txFillClrLst>
+    <dgm:txEffectClrLst/>
+  </dgm:styleLbl>
+  <dgm:styleLbl name="fgAcc3">
+    <dgm:fillClrLst meth="repeat">
+      <a:schemeClr val="lt1">
+        <a:alpha val="90000"/>
+      </a:schemeClr>
+    </dgm:fillClrLst>
+    <dgm:linClrLst meth="repeat">
+      <a:schemeClr val="accent1"/>
+    </dgm:linClrLst>
+    <dgm:effectClrLst/>
+    <dgm:txLinClrLst/>
+    <dgm:txFillClrLst meth="repeat">
+      <a:schemeClr val="dk1"/>
+    </dgm:txFillClrLst>
+    <dgm:txEffectClrLst/>
+  </dgm:styleLbl>
+  <dgm:styleLbl name="fgAcc4">
+    <dgm:fillClrLst meth="repeat">
+      <a:schemeClr val="lt1">
+        <a:alpha val="90000"/>
+      </a:schemeClr>
+    </dgm:fillClrLst>
+    <dgm:linClrLst meth="repeat">
+      <a:schemeClr val="accent1"/>
+    </dgm:linClrLst>
+    <dgm:effectClrLst/>
+    <dgm:txLinClrLst/>
+    <dgm:txFillClrLst meth="repeat">
+      <a:schemeClr val="dk1"/>
+    </dgm:txFillClrLst>
+    <dgm:txEffectClrLst/>
+  </dgm:styleLbl>
+  <dgm:styleLbl name="bgShp">
+    <dgm:fillClrLst meth="repeat">
+      <a:schemeClr val="accent1">
+        <a:tint val="40000"/>
+      </a:schemeClr>
+    </dgm:fillClrLst>
+    <dgm:linClrLst meth="repeat">
+      <a:schemeClr val="accent1"/>
+    </dgm:linClrLst>
+    <dgm:effectClrLst/>
+    <dgm:txLinClrLst/>
+    <dgm:txFillClrLst meth="repeat">
+      <a:schemeClr val="dk1"/>
+    </dgm:txFillClrLst>
+    <dgm:txEffectClrLst/>
+  </dgm:styleLbl>
+  <dgm:styleLbl name="dkBgShp">
+    <dgm:fillClrLst meth="repeat">
+      <a:schemeClr val="accent1">
+        <a:shade val="80000"/>
+      </a:schemeClr>
+    </dgm:fillClrLst>
+    <dgm:linClrLst meth="repeat">
+      <a:schemeClr val="accent1"/>
+    </dgm:linClrLst>
+    <dgm:effectClrLst/>
+    <dgm:txLinClrLst/>
+    <dgm:txFillClrLst meth="repeat">
+      <a:schemeClr val="lt1"/>
+    </dgm:txFillClrLst>
+    <dgm:txEffectClrLst/>
+  </dgm:styleLbl>
+  <dgm:styleLbl name="trBgShp">
+    <dgm:fillClrLst meth="repeat">
+      <a:schemeClr val="accent1">
+        <a:tint val="50000"/>
+        <a:alpha val="40000"/>
+      </a:schemeClr>
+    </dgm:fillClrLst>
+    <dgm:linClrLst meth="repeat">
+      <a:schemeClr val="accent1"/>
+    </dgm:linClrLst>
+    <dgm:effectClrLst/>
+    <dgm:txLinClrLst/>
+    <dgm:txFillClrLst meth="repeat">
+      <a:schemeClr val="lt1"/>
+    </dgm:txFillClrLst>
+    <dgm:txEffectClrLst/>
+  </dgm:styleLbl>
+  <dgm:styleLbl name="fgShp">
+    <dgm:fillClrLst meth="repeat">
+      <a:schemeClr val="accent1">
+        <a:tint val="60000"/>
+      </a:schemeClr>
+    </dgm:fillClrLst>
+    <dgm:linClrLst meth="repeat">
+      <a:schemeClr val="lt1"/>
+    </dgm:linClrLst>
+    <dgm:effectClrLst/>
+    <dgm:txLinClrLst/>
+    <dgm:txFillClrLst meth="repeat">
+      <a:schemeClr val="dk1"/>
+    </dgm:txFillClrLst>
+    <dgm:txEffectClrLst/>
+  </dgm:styleLbl>
+  <dgm:styleLbl name="revTx">
+    <dgm:fillClrLst meth="repeat">
+      <a:schemeClr val="lt1">
+        <a:alpha val="0"/>
+      </a:schemeClr>
+    </dgm:fillClrLst>
+    <dgm:linClrLst meth="repeat">
+      <a:schemeClr val="dk1">
+        <a:alpha val="0"/>
+      </a:schemeClr>
+    </dgm:linClrLst>
+    <dgm:effectClrLst/>
+    <dgm:txLinClrLst/>
+    <dgm:txFillClrLst meth="repeat">
+      <a:schemeClr val="tx1"/>
+    </dgm:txFillClrLst>
+    <dgm:txEffectClrLst/>
+  </dgm:styleLbl>
+</dgm:colorsDef>
+</file>
+
+<file path=ppt/diagrams/colors3.xml><?xml version="1.0" encoding="utf-8"?>
 <dgm:colorsDef xmlns:dgm="http://schemas.openxmlformats.org/drawingml/2006/diagram" xmlns:a="http://schemas.openxmlformats.org/drawingml/2006/main" uniqueId="urn:microsoft.com/office/officeart/2005/8/colors/accent1_2">
   <dgm:title val=""/>
   <dgm:desc val=""/>
@@ -1791,7 +2540,7 @@
         <a:p>
           <a:r>
             <a:rPr lang="en-US" dirty="0"/>
-            <a:t>IMR90 Cell Line RNA-Seq Data (Peak Enrichment/ Counts)</a:t>
+            <a:t>H1 Cell Line RNA-Seq Data (Peak Enrichment/ Counts)</a:t>
           </a:r>
         </a:p>
       </dgm:t>
@@ -2250,7 +2999,7 @@
         <a:p>
           <a:r>
             <a:rPr lang="en-US" dirty="0"/>
-            <a:t>IMR90 Cell Line RNA-Seq Data (Peak Enrichment/ Counts)</a:t>
+            <a:t>H1 Cell Line RNA-Seq Data (Peak Enrichment/ Counts)</a:t>
           </a:r>
         </a:p>
       </dgm:t>
@@ -2519,6 +3268,403 @@
     <dgm:cxn modelId="{E7951F09-1D6A-4A9C-A2DC-C7C50AD194CF}" type="presParOf" srcId="{857B9EDD-DB8E-4517-AD36-83DDE2AEF884}" destId="{00F56850-D342-4134-9B78-13D03064AD3D}" srcOrd="9" destOrd="0" presId="urn:microsoft.com/office/officeart/2005/8/layout/process5"/>
     <dgm:cxn modelId="{5202D6B3-A7E3-4C20-98EC-7A980BFFAB76}" type="presParOf" srcId="{00F56850-D342-4134-9B78-13D03064AD3D}" destId="{9BA988E9-4104-47D0-B6E3-76A4D1E7F4BD}" srcOrd="0" destOrd="0" presId="urn:microsoft.com/office/officeart/2005/8/layout/process5"/>
     <dgm:cxn modelId="{B4BF09AD-9E51-4F0B-B1C0-F44574A7961B}" type="presParOf" srcId="{857B9EDD-DB8E-4517-AD36-83DDE2AEF884}" destId="{7D559195-406A-4495-9E8C-0928894E290F}" srcOrd="10" destOrd="0" presId="urn:microsoft.com/office/officeart/2005/8/layout/process5"/>
+  </dgm:cxnLst>
+  <dgm:bg/>
+  <dgm:whole/>
+  <dgm:extLst>
+    <a:ext uri="http://schemas.microsoft.com/office/drawing/2008/diagram">
+      <dsp:dataModelExt xmlns:dsp="http://schemas.microsoft.com/office/drawing/2008/diagram" relId="rId6" minVer="http://schemas.openxmlformats.org/drawingml/2006/diagram"/>
+    </a:ext>
+  </dgm:extLst>
+</dgm:dataModel>
+</file>
+
+<file path=ppt/diagrams/data3.xml><?xml version="1.0" encoding="utf-8"?>
+<dgm:dataModel xmlns:dgm="http://schemas.openxmlformats.org/drawingml/2006/diagram" xmlns:a="http://schemas.openxmlformats.org/drawingml/2006/main">
+  <dgm:ptLst>
+    <dgm:pt modelId="{41117B40-1263-4EEB-84B8-342A98841174}" type="doc">
+      <dgm:prSet loTypeId="urn:microsoft.com/office/officeart/2005/8/layout/process5" loCatId="process" qsTypeId="urn:microsoft.com/office/officeart/2005/8/quickstyle/simple1" qsCatId="simple" csTypeId="urn:microsoft.com/office/officeart/2005/8/colors/accent1_2" csCatId="accent1" phldr="1"/>
+      <dgm:spPr/>
+      <dgm:t>
+        <a:bodyPr/>
+        <a:lstStyle/>
+        <a:p>
+          <a:endParaRPr lang="en-US"/>
+        </a:p>
+      </dgm:t>
+    </dgm:pt>
+    <dgm:pt modelId="{83E76A1E-37F5-40F2-8A1D-E48D18B49F59}">
+      <dgm:prSet phldrT="[Text]"/>
+      <dgm:spPr>
+        <a:solidFill>
+          <a:schemeClr val="accent6"/>
+        </a:solidFill>
+      </dgm:spPr>
+      <dgm:t>
+        <a:bodyPr/>
+        <a:lstStyle/>
+        <a:p>
+          <a:r>
+            <a:rPr lang="en-US" dirty="0"/>
+            <a:t>ENCODE (https://</a:t>
+          </a:r>
+          <a:r>
+            <a:rPr lang="en-US" dirty="0" err="1"/>
+            <a:t>www.encodeproject.org</a:t>
+          </a:r>
+          <a:r>
+            <a:rPr lang="en-US" dirty="0"/>
+            <a:t>/)</a:t>
+          </a:r>
+        </a:p>
+      </dgm:t>
+    </dgm:pt>
+    <dgm:pt modelId="{74A7E4AF-6806-4B2C-8DD9-FE7146608088}" type="parTrans" cxnId="{A9F3761F-CD6A-466F-8A36-69DD7EDC6B49}">
+      <dgm:prSet/>
+      <dgm:spPr/>
+      <dgm:t>
+        <a:bodyPr/>
+        <a:lstStyle/>
+        <a:p>
+          <a:endParaRPr lang="en-US"/>
+        </a:p>
+      </dgm:t>
+    </dgm:pt>
+    <dgm:pt modelId="{B8655291-E70F-4D4D-8B79-91F940719591}" type="sibTrans" cxnId="{A9F3761F-CD6A-466F-8A36-69DD7EDC6B49}">
+      <dgm:prSet/>
+      <dgm:spPr>
+        <a:solidFill>
+          <a:schemeClr val="accent6"/>
+        </a:solidFill>
+      </dgm:spPr>
+      <dgm:t>
+        <a:bodyPr/>
+        <a:lstStyle/>
+        <a:p>
+          <a:endParaRPr lang="en-US"/>
+        </a:p>
+      </dgm:t>
+    </dgm:pt>
+    <dgm:pt modelId="{53A60C83-E320-4D8D-AC34-A4FD5C458BEB}">
+      <dgm:prSet phldrT="[Text]"/>
+      <dgm:spPr>
+        <a:solidFill>
+          <a:schemeClr val="accent6"/>
+        </a:solidFill>
+      </dgm:spPr>
+      <dgm:t>
+        <a:bodyPr/>
+        <a:lstStyle/>
+        <a:p>
+          <a:r>
+            <a:rPr lang="en-US" dirty="0"/>
+            <a:t>H1 Cell Line</a:t>
+          </a:r>
+        </a:p>
+      </dgm:t>
+    </dgm:pt>
+    <dgm:pt modelId="{0910C672-12E4-4E6F-877E-E112A14C3768}" type="parTrans" cxnId="{E374BE8F-2C75-454F-A0B8-B5176391C94A}">
+      <dgm:prSet/>
+      <dgm:spPr/>
+      <dgm:t>
+        <a:bodyPr/>
+        <a:lstStyle/>
+        <a:p>
+          <a:endParaRPr lang="en-US"/>
+        </a:p>
+      </dgm:t>
+    </dgm:pt>
+    <dgm:pt modelId="{C0E435F7-9BDE-4FEE-964B-894E24251584}" type="sibTrans" cxnId="{E374BE8F-2C75-454F-A0B8-B5176391C94A}">
+      <dgm:prSet/>
+      <dgm:spPr>
+        <a:solidFill>
+          <a:schemeClr val="accent6"/>
+        </a:solidFill>
+      </dgm:spPr>
+      <dgm:t>
+        <a:bodyPr/>
+        <a:lstStyle/>
+        <a:p>
+          <a:endParaRPr lang="en-US"/>
+        </a:p>
+      </dgm:t>
+    </dgm:pt>
+    <dgm:pt modelId="{0F92D21F-7FE4-4D81-A164-B28499D968D3}">
+      <dgm:prSet phldrT="[Text]"/>
+      <dgm:spPr>
+        <a:solidFill>
+          <a:schemeClr val="accent6"/>
+        </a:solidFill>
+      </dgm:spPr>
+      <dgm:t>
+        <a:bodyPr/>
+        <a:lstStyle/>
+        <a:p>
+          <a:r>
+            <a:rPr lang="en-US" dirty="0"/>
+            <a:t>Pull </a:t>
+          </a:r>
+          <a:r>
+            <a:rPr lang="en-US" dirty="0" err="1"/>
+            <a:t>ChIP</a:t>
+          </a:r>
+          <a:r>
+            <a:rPr lang="en-US" dirty="0"/>
+            <a:t>-Seq data (BAM files) for H3K27ac, H3K4me1, HeK4me2, H3K4me3.</a:t>
+          </a:r>
+        </a:p>
+      </dgm:t>
+    </dgm:pt>
+    <dgm:pt modelId="{2C4C9838-BC5C-47D6-894F-BC512EB5B94A}" type="parTrans" cxnId="{40AE0E74-CA1D-47F3-B0A9-156A682A012F}">
+      <dgm:prSet/>
+      <dgm:spPr/>
+      <dgm:t>
+        <a:bodyPr/>
+        <a:lstStyle/>
+        <a:p>
+          <a:endParaRPr lang="en-US"/>
+        </a:p>
+      </dgm:t>
+    </dgm:pt>
+    <dgm:pt modelId="{BA2AA2E8-201B-45EF-B4DC-10FB233BC901}" type="sibTrans" cxnId="{40AE0E74-CA1D-47F3-B0A9-156A682A012F}">
+      <dgm:prSet/>
+      <dgm:spPr>
+        <a:solidFill>
+          <a:schemeClr val="accent6"/>
+        </a:solidFill>
+      </dgm:spPr>
+      <dgm:t>
+        <a:bodyPr/>
+        <a:lstStyle/>
+        <a:p>
+          <a:endParaRPr lang="en-US"/>
+        </a:p>
+      </dgm:t>
+    </dgm:pt>
+    <dgm:pt modelId="{C566CA9F-1CCA-49BA-B874-F56053556743}">
+      <dgm:prSet phldrT="[Text]"/>
+      <dgm:spPr>
+        <a:solidFill>
+          <a:schemeClr val="accent6"/>
+        </a:solidFill>
+      </dgm:spPr>
+      <dgm:t>
+        <a:bodyPr/>
+        <a:lstStyle/>
+        <a:p>
+          <a:r>
+            <a:rPr lang="en-US" dirty="0"/>
+            <a:t>Index the BAM files using </a:t>
+          </a:r>
+          <a:r>
+            <a:rPr lang="en-US" i="1" dirty="0" err="1"/>
+            <a:t>samtools</a:t>
+          </a:r>
+          <a:endParaRPr lang="en-US" i="1" dirty="0"/>
+        </a:p>
+      </dgm:t>
+    </dgm:pt>
+    <dgm:pt modelId="{4A33BA8D-5211-47DE-A871-138F20056C9C}" type="parTrans" cxnId="{BB448C94-3AAB-4E99-BB16-62AB028CB6BB}">
+      <dgm:prSet/>
+      <dgm:spPr/>
+      <dgm:t>
+        <a:bodyPr/>
+        <a:lstStyle/>
+        <a:p>
+          <a:endParaRPr lang="en-US"/>
+        </a:p>
+      </dgm:t>
+    </dgm:pt>
+    <dgm:pt modelId="{9894FC76-7147-475A-B94B-381B90063B73}" type="sibTrans" cxnId="{BB448C94-3AAB-4E99-BB16-62AB028CB6BB}">
+      <dgm:prSet/>
+      <dgm:spPr>
+        <a:solidFill>
+          <a:schemeClr val="accent6"/>
+        </a:solidFill>
+      </dgm:spPr>
+      <dgm:t>
+        <a:bodyPr/>
+        <a:lstStyle/>
+        <a:p>
+          <a:endParaRPr lang="en-US"/>
+        </a:p>
+      </dgm:t>
+    </dgm:pt>
+    <dgm:pt modelId="{07A1A27E-5A5A-47DB-8203-2D4557909B0E}">
+      <dgm:prSet phldrT="[Text]"/>
+      <dgm:spPr>
+        <a:solidFill>
+          <a:schemeClr val="accent6"/>
+        </a:solidFill>
+      </dgm:spPr>
+      <dgm:t>
+        <a:bodyPr/>
+        <a:lstStyle/>
+        <a:p>
+          <a:r>
+            <a:rPr lang="en-US" dirty="0"/>
+            <a:t>Calibrate bin level peak-enrichment using </a:t>
+          </a:r>
+          <a:r>
+            <a:rPr lang="en-US" i="1" dirty="0" err="1"/>
+            <a:t>bamCoverage</a:t>
+          </a:r>
+          <a:r>
+            <a:rPr lang="en-US" dirty="0"/>
+            <a:t> (</a:t>
+          </a:r>
+          <a:r>
+            <a:rPr lang="en-US" dirty="0" err="1"/>
+            <a:t>deeptools</a:t>
+          </a:r>
+          <a:r>
+            <a:rPr lang="en-US" dirty="0"/>
+            <a:t>)</a:t>
+          </a:r>
+        </a:p>
+      </dgm:t>
+    </dgm:pt>
+    <dgm:pt modelId="{C26931FD-4E7A-4DC9-9B1E-4468F4E96A4F}" type="parTrans" cxnId="{81D67C2C-E052-4F15-9BDE-EF8E3F39FC30}">
+      <dgm:prSet/>
+      <dgm:spPr/>
+      <dgm:t>
+        <a:bodyPr/>
+        <a:lstStyle/>
+        <a:p>
+          <a:endParaRPr lang="en-US"/>
+        </a:p>
+      </dgm:t>
+    </dgm:pt>
+    <dgm:pt modelId="{E70F03F5-06BC-476F-B8B1-BA35A4D715F1}" type="sibTrans" cxnId="{81D67C2C-E052-4F15-9BDE-EF8E3F39FC30}">
+      <dgm:prSet/>
+      <dgm:spPr>
+        <a:solidFill>
+          <a:schemeClr val="accent6"/>
+        </a:solidFill>
+      </dgm:spPr>
+      <dgm:t>
+        <a:bodyPr/>
+        <a:lstStyle/>
+        <a:p>
+          <a:endParaRPr lang="en-US"/>
+        </a:p>
+      </dgm:t>
+    </dgm:pt>
+    <dgm:pt modelId="{857B9EDD-DB8E-4517-AD36-83DDE2AEF884}" type="pres">
+      <dgm:prSet presAssocID="{41117B40-1263-4EEB-84B8-342A98841174}" presName="diagram" presStyleCnt="0">
+        <dgm:presLayoutVars>
+          <dgm:dir/>
+          <dgm:resizeHandles val="exact"/>
+        </dgm:presLayoutVars>
+      </dgm:prSet>
+      <dgm:spPr/>
+    </dgm:pt>
+    <dgm:pt modelId="{BB7625D6-7E73-42D8-93F2-FFA90462E3F6}" type="pres">
+      <dgm:prSet presAssocID="{83E76A1E-37F5-40F2-8A1D-E48D18B49F59}" presName="node" presStyleLbl="node1" presStyleIdx="0" presStyleCnt="5">
+        <dgm:presLayoutVars>
+          <dgm:bulletEnabled val="1"/>
+        </dgm:presLayoutVars>
+      </dgm:prSet>
+      <dgm:spPr/>
+    </dgm:pt>
+    <dgm:pt modelId="{082C4B30-40A3-45A9-9939-365B3C95504E}" type="pres">
+      <dgm:prSet presAssocID="{B8655291-E70F-4D4D-8B79-91F940719591}" presName="sibTrans" presStyleLbl="sibTrans2D1" presStyleIdx="0" presStyleCnt="4"/>
+      <dgm:spPr/>
+    </dgm:pt>
+    <dgm:pt modelId="{82D9668B-1229-4FE5-9218-E32052C32163}" type="pres">
+      <dgm:prSet presAssocID="{B8655291-E70F-4D4D-8B79-91F940719591}" presName="connectorText" presStyleLbl="sibTrans2D1" presStyleIdx="0" presStyleCnt="4"/>
+      <dgm:spPr/>
+    </dgm:pt>
+    <dgm:pt modelId="{2C28B92A-9BFD-4264-A70E-B712FFF61F0E}" type="pres">
+      <dgm:prSet presAssocID="{53A60C83-E320-4D8D-AC34-A4FD5C458BEB}" presName="node" presStyleLbl="node1" presStyleIdx="1" presStyleCnt="5">
+        <dgm:presLayoutVars>
+          <dgm:bulletEnabled val="1"/>
+        </dgm:presLayoutVars>
+      </dgm:prSet>
+      <dgm:spPr/>
+    </dgm:pt>
+    <dgm:pt modelId="{A035F27A-EAE1-4BF8-898B-030DF89D10B8}" type="pres">
+      <dgm:prSet presAssocID="{C0E435F7-9BDE-4FEE-964B-894E24251584}" presName="sibTrans" presStyleLbl="sibTrans2D1" presStyleIdx="1" presStyleCnt="4"/>
+      <dgm:spPr/>
+    </dgm:pt>
+    <dgm:pt modelId="{ED775E92-9BD6-461B-843B-1CEA801FF82B}" type="pres">
+      <dgm:prSet presAssocID="{C0E435F7-9BDE-4FEE-964B-894E24251584}" presName="connectorText" presStyleLbl="sibTrans2D1" presStyleIdx="1" presStyleCnt="4"/>
+      <dgm:spPr/>
+    </dgm:pt>
+    <dgm:pt modelId="{55681D6F-DDCB-42D8-9689-3B66CCF24AD0}" type="pres">
+      <dgm:prSet presAssocID="{0F92D21F-7FE4-4D81-A164-B28499D968D3}" presName="node" presStyleLbl="node1" presStyleIdx="2" presStyleCnt="5">
+        <dgm:presLayoutVars>
+          <dgm:bulletEnabled val="1"/>
+        </dgm:presLayoutVars>
+      </dgm:prSet>
+      <dgm:spPr/>
+    </dgm:pt>
+    <dgm:pt modelId="{81AE30B9-2D7F-4C6D-B7AB-E4A2F7352DFD}" type="pres">
+      <dgm:prSet presAssocID="{BA2AA2E8-201B-45EF-B4DC-10FB233BC901}" presName="sibTrans" presStyleLbl="sibTrans2D1" presStyleIdx="2" presStyleCnt="4"/>
+      <dgm:spPr/>
+    </dgm:pt>
+    <dgm:pt modelId="{24E70E83-2375-4A37-AE9A-12FC5FDC99F3}" type="pres">
+      <dgm:prSet presAssocID="{BA2AA2E8-201B-45EF-B4DC-10FB233BC901}" presName="connectorText" presStyleLbl="sibTrans2D1" presStyleIdx="2" presStyleCnt="4"/>
+      <dgm:spPr/>
+    </dgm:pt>
+    <dgm:pt modelId="{9E6080A3-0307-46A5-B63A-35ED5C8EB6A7}" type="pres">
+      <dgm:prSet presAssocID="{C566CA9F-1CCA-49BA-B874-F56053556743}" presName="node" presStyleLbl="node1" presStyleIdx="3" presStyleCnt="5">
+        <dgm:presLayoutVars>
+          <dgm:bulletEnabled val="1"/>
+        </dgm:presLayoutVars>
+      </dgm:prSet>
+      <dgm:spPr/>
+    </dgm:pt>
+    <dgm:pt modelId="{7BB9A6E6-08FA-4D6F-92C0-475F79B704A7}" type="pres">
+      <dgm:prSet presAssocID="{9894FC76-7147-475A-B94B-381B90063B73}" presName="sibTrans" presStyleLbl="sibTrans2D1" presStyleIdx="3" presStyleCnt="4"/>
+      <dgm:spPr/>
+    </dgm:pt>
+    <dgm:pt modelId="{96077CE2-89B8-4D88-87F6-59F29BAFF04A}" type="pres">
+      <dgm:prSet presAssocID="{9894FC76-7147-475A-B94B-381B90063B73}" presName="connectorText" presStyleLbl="sibTrans2D1" presStyleIdx="3" presStyleCnt="4"/>
+      <dgm:spPr/>
+    </dgm:pt>
+    <dgm:pt modelId="{14963B6A-3E06-4B62-AA40-C7BDE330A2E2}" type="pres">
+      <dgm:prSet presAssocID="{07A1A27E-5A5A-47DB-8203-2D4557909B0E}" presName="node" presStyleLbl="node1" presStyleIdx="4" presStyleCnt="5">
+        <dgm:presLayoutVars>
+          <dgm:bulletEnabled val="1"/>
+        </dgm:presLayoutVars>
+      </dgm:prSet>
+      <dgm:spPr/>
+    </dgm:pt>
+  </dgm:ptLst>
+  <dgm:cxnLst>
+    <dgm:cxn modelId="{A1D6E213-D624-4757-9CC1-DB80C4B262F4}" type="presOf" srcId="{0F92D21F-7FE4-4D81-A164-B28499D968D3}" destId="{55681D6F-DDCB-42D8-9689-3B66CCF24AD0}" srcOrd="0" destOrd="0" presId="urn:microsoft.com/office/officeart/2005/8/layout/process5"/>
+    <dgm:cxn modelId="{89C8E414-ACD2-4871-9C6F-70E8F96FFF98}" type="presOf" srcId="{BA2AA2E8-201B-45EF-B4DC-10FB233BC901}" destId="{24E70E83-2375-4A37-AE9A-12FC5FDC99F3}" srcOrd="1" destOrd="0" presId="urn:microsoft.com/office/officeart/2005/8/layout/process5"/>
+    <dgm:cxn modelId="{A9F3761F-CD6A-466F-8A36-69DD7EDC6B49}" srcId="{41117B40-1263-4EEB-84B8-342A98841174}" destId="{83E76A1E-37F5-40F2-8A1D-E48D18B49F59}" srcOrd="0" destOrd="0" parTransId="{74A7E4AF-6806-4B2C-8DD9-FE7146608088}" sibTransId="{B8655291-E70F-4D4D-8B79-91F940719591}"/>
+    <dgm:cxn modelId="{81D67C2C-E052-4F15-9BDE-EF8E3F39FC30}" srcId="{41117B40-1263-4EEB-84B8-342A98841174}" destId="{07A1A27E-5A5A-47DB-8203-2D4557909B0E}" srcOrd="4" destOrd="0" parTransId="{C26931FD-4E7A-4DC9-9B1E-4468F4E96A4F}" sibTransId="{E70F03F5-06BC-476F-B8B1-BA35A4D715F1}"/>
+    <dgm:cxn modelId="{073F5346-0907-42FB-9C0F-D57270D0BD72}" type="presOf" srcId="{B8655291-E70F-4D4D-8B79-91F940719591}" destId="{82D9668B-1229-4FE5-9218-E32052C32163}" srcOrd="1" destOrd="0" presId="urn:microsoft.com/office/officeart/2005/8/layout/process5"/>
+    <dgm:cxn modelId="{40AE0E74-CA1D-47F3-B0A9-156A682A012F}" srcId="{41117B40-1263-4EEB-84B8-342A98841174}" destId="{0F92D21F-7FE4-4D81-A164-B28499D968D3}" srcOrd="2" destOrd="0" parTransId="{2C4C9838-BC5C-47D6-894F-BC512EB5B94A}" sibTransId="{BA2AA2E8-201B-45EF-B4DC-10FB233BC901}"/>
+    <dgm:cxn modelId="{17BC108F-BCA0-4166-861C-33D90C1A5548}" type="presOf" srcId="{53A60C83-E320-4D8D-AC34-A4FD5C458BEB}" destId="{2C28B92A-9BFD-4264-A70E-B712FFF61F0E}" srcOrd="0" destOrd="0" presId="urn:microsoft.com/office/officeart/2005/8/layout/process5"/>
+    <dgm:cxn modelId="{E374BE8F-2C75-454F-A0B8-B5176391C94A}" srcId="{41117B40-1263-4EEB-84B8-342A98841174}" destId="{53A60C83-E320-4D8D-AC34-A4FD5C458BEB}" srcOrd="1" destOrd="0" parTransId="{0910C672-12E4-4E6F-877E-E112A14C3768}" sibTransId="{C0E435F7-9BDE-4FEE-964B-894E24251584}"/>
+    <dgm:cxn modelId="{2028E392-5A6E-4A55-B8A4-600AB4CC43D8}" type="presOf" srcId="{83E76A1E-37F5-40F2-8A1D-E48D18B49F59}" destId="{BB7625D6-7E73-42D8-93F2-FFA90462E3F6}" srcOrd="0" destOrd="0" presId="urn:microsoft.com/office/officeart/2005/8/layout/process5"/>
+    <dgm:cxn modelId="{1F667894-710F-4171-AF9E-248C8A6FA7E0}" type="presOf" srcId="{C0E435F7-9BDE-4FEE-964B-894E24251584}" destId="{ED775E92-9BD6-461B-843B-1CEA801FF82B}" srcOrd="1" destOrd="0" presId="urn:microsoft.com/office/officeart/2005/8/layout/process5"/>
+    <dgm:cxn modelId="{BB448C94-3AAB-4E99-BB16-62AB028CB6BB}" srcId="{41117B40-1263-4EEB-84B8-342A98841174}" destId="{C566CA9F-1CCA-49BA-B874-F56053556743}" srcOrd="3" destOrd="0" parTransId="{4A33BA8D-5211-47DE-A871-138F20056C9C}" sibTransId="{9894FC76-7147-475A-B94B-381B90063B73}"/>
+    <dgm:cxn modelId="{1B43C296-B8AB-473D-A473-900DEE7BD7AC}" type="presOf" srcId="{C0E435F7-9BDE-4FEE-964B-894E24251584}" destId="{A035F27A-EAE1-4BF8-898B-030DF89D10B8}" srcOrd="0" destOrd="0" presId="urn:microsoft.com/office/officeart/2005/8/layout/process5"/>
+    <dgm:cxn modelId="{4150A39A-5513-4937-8C63-EA5A65C25093}" type="presOf" srcId="{BA2AA2E8-201B-45EF-B4DC-10FB233BC901}" destId="{81AE30B9-2D7F-4C6D-B7AB-E4A2F7352DFD}" srcOrd="0" destOrd="0" presId="urn:microsoft.com/office/officeart/2005/8/layout/process5"/>
+    <dgm:cxn modelId="{B0487BBA-F986-434C-B2BC-74607AC44AA2}" type="presOf" srcId="{C566CA9F-1CCA-49BA-B874-F56053556743}" destId="{9E6080A3-0307-46A5-B63A-35ED5C8EB6A7}" srcOrd="0" destOrd="0" presId="urn:microsoft.com/office/officeart/2005/8/layout/process5"/>
+    <dgm:cxn modelId="{908DB7BD-942B-4819-8077-BD6CBE778F83}" type="presOf" srcId="{41117B40-1263-4EEB-84B8-342A98841174}" destId="{857B9EDD-DB8E-4517-AD36-83DDE2AEF884}" srcOrd="0" destOrd="0" presId="urn:microsoft.com/office/officeart/2005/8/layout/process5"/>
+    <dgm:cxn modelId="{CCEB99CD-F939-4380-9302-AD3CCC853642}" type="presOf" srcId="{07A1A27E-5A5A-47DB-8203-2D4557909B0E}" destId="{14963B6A-3E06-4B62-AA40-C7BDE330A2E2}" srcOrd="0" destOrd="0" presId="urn:microsoft.com/office/officeart/2005/8/layout/process5"/>
+    <dgm:cxn modelId="{3E93EFDD-DB7B-4F10-91D9-6389F0F90F04}" type="presOf" srcId="{9894FC76-7147-475A-B94B-381B90063B73}" destId="{7BB9A6E6-08FA-4D6F-92C0-475F79B704A7}" srcOrd="0" destOrd="0" presId="urn:microsoft.com/office/officeart/2005/8/layout/process5"/>
+    <dgm:cxn modelId="{EF3A61EE-2BF6-47E3-BAE4-5CD5BA43FFC2}" type="presOf" srcId="{9894FC76-7147-475A-B94B-381B90063B73}" destId="{96077CE2-89B8-4D88-87F6-59F29BAFF04A}" srcOrd="1" destOrd="0" presId="urn:microsoft.com/office/officeart/2005/8/layout/process5"/>
+    <dgm:cxn modelId="{438A59FB-31AC-4850-895A-901F6495A157}" type="presOf" srcId="{B8655291-E70F-4D4D-8B79-91F940719591}" destId="{082C4B30-40A3-45A9-9939-365B3C95504E}" srcOrd="0" destOrd="0" presId="urn:microsoft.com/office/officeart/2005/8/layout/process5"/>
+    <dgm:cxn modelId="{17E53DA0-1883-47A2-8D0E-3E86F028AE01}" type="presParOf" srcId="{857B9EDD-DB8E-4517-AD36-83DDE2AEF884}" destId="{BB7625D6-7E73-42D8-93F2-FFA90462E3F6}" srcOrd="0" destOrd="0" presId="urn:microsoft.com/office/officeart/2005/8/layout/process5"/>
+    <dgm:cxn modelId="{F55B9750-2100-41FC-9892-04C5FB783AB4}" type="presParOf" srcId="{857B9EDD-DB8E-4517-AD36-83DDE2AEF884}" destId="{082C4B30-40A3-45A9-9939-365B3C95504E}" srcOrd="1" destOrd="0" presId="urn:microsoft.com/office/officeart/2005/8/layout/process5"/>
+    <dgm:cxn modelId="{E8BE7E04-FDE1-4C64-A85F-91BA6D83B438}" type="presParOf" srcId="{082C4B30-40A3-45A9-9939-365B3C95504E}" destId="{82D9668B-1229-4FE5-9218-E32052C32163}" srcOrd="0" destOrd="0" presId="urn:microsoft.com/office/officeart/2005/8/layout/process5"/>
+    <dgm:cxn modelId="{671CB0CD-0AB7-4FE3-96AE-F0025160F89E}" type="presParOf" srcId="{857B9EDD-DB8E-4517-AD36-83DDE2AEF884}" destId="{2C28B92A-9BFD-4264-A70E-B712FFF61F0E}" srcOrd="2" destOrd="0" presId="urn:microsoft.com/office/officeart/2005/8/layout/process5"/>
+    <dgm:cxn modelId="{ECF8CEEE-08A5-4B32-8698-1FF0BE9A504F}" type="presParOf" srcId="{857B9EDD-DB8E-4517-AD36-83DDE2AEF884}" destId="{A035F27A-EAE1-4BF8-898B-030DF89D10B8}" srcOrd="3" destOrd="0" presId="urn:microsoft.com/office/officeart/2005/8/layout/process5"/>
+    <dgm:cxn modelId="{3448557A-A140-46F1-96EC-3F810181CE27}" type="presParOf" srcId="{A035F27A-EAE1-4BF8-898B-030DF89D10B8}" destId="{ED775E92-9BD6-461B-843B-1CEA801FF82B}" srcOrd="0" destOrd="0" presId="urn:microsoft.com/office/officeart/2005/8/layout/process5"/>
+    <dgm:cxn modelId="{D7E1FEDC-CFD3-4F25-9956-AA25699D967A}" type="presParOf" srcId="{857B9EDD-DB8E-4517-AD36-83DDE2AEF884}" destId="{55681D6F-DDCB-42D8-9689-3B66CCF24AD0}" srcOrd="4" destOrd="0" presId="urn:microsoft.com/office/officeart/2005/8/layout/process5"/>
+    <dgm:cxn modelId="{28DD3E93-5C65-4BD3-A134-3C7958EF18B3}" type="presParOf" srcId="{857B9EDD-DB8E-4517-AD36-83DDE2AEF884}" destId="{81AE30B9-2D7F-4C6D-B7AB-E4A2F7352DFD}" srcOrd="5" destOrd="0" presId="urn:microsoft.com/office/officeart/2005/8/layout/process5"/>
+    <dgm:cxn modelId="{9349F0D8-BC8B-445D-B083-B7CFEABD51D0}" type="presParOf" srcId="{81AE30B9-2D7F-4C6D-B7AB-E4A2F7352DFD}" destId="{24E70E83-2375-4A37-AE9A-12FC5FDC99F3}" srcOrd="0" destOrd="0" presId="urn:microsoft.com/office/officeart/2005/8/layout/process5"/>
+    <dgm:cxn modelId="{6B9C37E5-68DF-4437-B75B-4748A9F393D8}" type="presParOf" srcId="{857B9EDD-DB8E-4517-AD36-83DDE2AEF884}" destId="{9E6080A3-0307-46A5-B63A-35ED5C8EB6A7}" srcOrd="6" destOrd="0" presId="urn:microsoft.com/office/officeart/2005/8/layout/process5"/>
+    <dgm:cxn modelId="{26D1A08B-221B-4AB9-A25D-5029CD35D709}" type="presParOf" srcId="{857B9EDD-DB8E-4517-AD36-83DDE2AEF884}" destId="{7BB9A6E6-08FA-4D6F-92C0-475F79B704A7}" srcOrd="7" destOrd="0" presId="urn:microsoft.com/office/officeart/2005/8/layout/process5"/>
+    <dgm:cxn modelId="{7FE47A1E-2C16-4EB0-93C4-1FC5AF9B2AE5}" type="presParOf" srcId="{7BB9A6E6-08FA-4D6F-92C0-475F79B704A7}" destId="{96077CE2-89B8-4D88-87F6-59F29BAFF04A}" srcOrd="0" destOrd="0" presId="urn:microsoft.com/office/officeart/2005/8/layout/process5"/>
+    <dgm:cxn modelId="{76A5E812-7F60-40A2-8165-EB78A8247244}" type="presParOf" srcId="{857B9EDD-DB8E-4517-AD36-83DDE2AEF884}" destId="{14963B6A-3E06-4B62-AA40-C7BDE330A2E2}" srcOrd="8" destOrd="0" presId="urn:microsoft.com/office/officeart/2005/8/layout/process5"/>
   </dgm:cxnLst>
   <dgm:bg/>
   <dgm:whole/>
@@ -3041,7 +4187,7 @@
           </a:pPr>
           <a:r>
             <a:rPr lang="en-US" sz="1300" kern="1200" dirty="0"/>
-            <a:t>IMR90 Cell Line RNA-Seq Data (Peak Enrichment/ Counts)</a:t>
+            <a:t>H1 Cell Line RNA-Seq Data (Peak Enrichment/ Counts)</a:t>
           </a:r>
         </a:p>
       </dsp:txBody>
@@ -3859,7 +5005,7 @@
           </a:pPr>
           <a:r>
             <a:rPr lang="en-US" sz="1500" kern="1200" dirty="0"/>
-            <a:t>IMR90 Cell Line RNA-Seq Data (Peak Enrichment/ Counts)</a:t>
+            <a:t>H1 Cell Line RNA-Seq Data (Peak Enrichment/ Counts)</a:t>
           </a:r>
         </a:p>
       </dsp:txBody>
@@ -4159,6 +5305,686 @@
       </dsp:txBody>
       <dsp:txXfrm>
         <a:off x="44665" y="3173892"/>
+        <a:ext cx="2060143" cy="1206068"/>
+      </dsp:txXfrm>
+    </dsp:sp>
+  </dsp:spTree>
+</dsp:drawing>
+</file>
+
+<file path=ppt/diagrams/drawing3.xml><?xml version="1.0" encoding="utf-8"?>
+<dsp:drawing xmlns:dgm="http://schemas.openxmlformats.org/drawingml/2006/diagram" xmlns:dsp="http://schemas.microsoft.com/office/drawing/2008/diagram" xmlns:a="http://schemas.openxmlformats.org/drawingml/2006/main">
+  <dsp:spTree>
+    <dsp:nvGrpSpPr>
+      <dsp:cNvPr id="0" name=""/>
+      <dsp:cNvGrpSpPr/>
+    </dsp:nvGrpSpPr>
+    <dsp:grpSpPr/>
+    <dsp:sp modelId="{BB7625D6-7E73-42D8-93F2-FFA90462E3F6}">
+      <dsp:nvSpPr>
+        <dsp:cNvPr id="0" name=""/>
+        <dsp:cNvSpPr/>
+      </dsp:nvSpPr>
+      <dsp:spPr>
+        <a:xfrm>
+          <a:off x="7143" y="1001183"/>
+          <a:ext cx="2135187" cy="1281112"/>
+        </a:xfrm>
+        <a:prstGeom prst="roundRect">
+          <a:avLst>
+            <a:gd name="adj" fmla="val 10000"/>
+          </a:avLst>
+        </a:prstGeom>
+        <a:solidFill>
+          <a:schemeClr val="accent6"/>
+        </a:solidFill>
+        <a:ln w="12700" cap="flat" cmpd="sng" algn="ctr">
+          <a:solidFill>
+            <a:schemeClr val="lt1">
+              <a:hueOff val="0"/>
+              <a:satOff val="0"/>
+              <a:lumOff val="0"/>
+              <a:alphaOff val="0"/>
+            </a:schemeClr>
+          </a:solidFill>
+          <a:prstDash val="solid"/>
+          <a:miter lim="800000"/>
+        </a:ln>
+        <a:effectLst/>
+      </dsp:spPr>
+      <dsp:style>
+        <a:lnRef idx="2">
+          <a:scrgbClr r="0" g="0" b="0"/>
+        </a:lnRef>
+        <a:fillRef idx="1">
+          <a:scrgbClr r="0" g="0" b="0"/>
+        </a:fillRef>
+        <a:effectRef idx="0">
+          <a:scrgbClr r="0" g="0" b="0"/>
+        </a:effectRef>
+        <a:fontRef idx="minor">
+          <a:schemeClr val="lt1"/>
+        </a:fontRef>
+      </dsp:style>
+      <dsp:txBody>
+        <a:bodyPr spcFirstLastPara="0" vert="horz" wrap="square" lIns="41910" tIns="41910" rIns="41910" bIns="41910" numCol="1" spcCol="1270" anchor="ctr" anchorCtr="0">
+          <a:noAutofit/>
+        </a:bodyPr>
+        <a:lstStyle/>
+        <a:p>
+          <a:pPr marL="0" lvl="0" indent="0" algn="ctr" defTabSz="488950">
+            <a:lnSpc>
+              <a:spcPct val="90000"/>
+            </a:lnSpc>
+            <a:spcBef>
+              <a:spcPct val="0"/>
+            </a:spcBef>
+            <a:spcAft>
+              <a:spcPct val="35000"/>
+            </a:spcAft>
+            <a:buNone/>
+          </a:pPr>
+          <a:r>
+            <a:rPr lang="en-US" sz="1100" kern="1200" dirty="0"/>
+            <a:t>ENCODE (https://</a:t>
+          </a:r>
+          <a:r>
+            <a:rPr lang="en-US" sz="1100" kern="1200" dirty="0" err="1"/>
+            <a:t>www.encodeproject.org</a:t>
+          </a:r>
+          <a:r>
+            <a:rPr lang="en-US" sz="1100" kern="1200" dirty="0"/>
+            <a:t>/)</a:t>
+          </a:r>
+        </a:p>
+      </dsp:txBody>
+      <dsp:txXfrm>
+        <a:off x="44665" y="1038705"/>
+        <a:ext cx="2060143" cy="1206068"/>
+      </dsp:txXfrm>
+    </dsp:sp>
+    <dsp:sp modelId="{082C4B30-40A3-45A9-9939-365B3C95504E}">
+      <dsp:nvSpPr>
+        <dsp:cNvPr id="0" name=""/>
+        <dsp:cNvSpPr/>
+      </dsp:nvSpPr>
+      <dsp:spPr>
+        <a:xfrm>
+          <a:off x="2330227" y="1376976"/>
+          <a:ext cx="452659" cy="529526"/>
+        </a:xfrm>
+        <a:prstGeom prst="rightArrow">
+          <a:avLst>
+            <a:gd name="adj1" fmla="val 60000"/>
+            <a:gd name="adj2" fmla="val 50000"/>
+          </a:avLst>
+        </a:prstGeom>
+        <a:solidFill>
+          <a:schemeClr val="accent6"/>
+        </a:solidFill>
+        <a:ln>
+          <a:noFill/>
+        </a:ln>
+        <a:effectLst/>
+      </dsp:spPr>
+      <dsp:style>
+        <a:lnRef idx="0">
+          <a:scrgbClr r="0" g="0" b="0"/>
+        </a:lnRef>
+        <a:fillRef idx="1">
+          <a:scrgbClr r="0" g="0" b="0"/>
+        </a:fillRef>
+        <a:effectRef idx="0">
+          <a:scrgbClr r="0" g="0" b="0"/>
+        </a:effectRef>
+        <a:fontRef idx="minor">
+          <a:schemeClr val="lt1"/>
+        </a:fontRef>
+      </dsp:style>
+      <dsp:txBody>
+        <a:bodyPr spcFirstLastPara="0" vert="horz" wrap="square" lIns="0" tIns="0" rIns="0" bIns="0" numCol="1" spcCol="1270" anchor="ctr" anchorCtr="0">
+          <a:noAutofit/>
+        </a:bodyPr>
+        <a:lstStyle/>
+        <a:p>
+          <a:pPr marL="0" lvl="0" indent="0" algn="ctr" defTabSz="400050">
+            <a:lnSpc>
+              <a:spcPct val="90000"/>
+            </a:lnSpc>
+            <a:spcBef>
+              <a:spcPct val="0"/>
+            </a:spcBef>
+            <a:spcAft>
+              <a:spcPct val="35000"/>
+            </a:spcAft>
+            <a:buNone/>
+          </a:pPr>
+          <a:endParaRPr lang="en-US" sz="900" kern="1200"/>
+        </a:p>
+      </dsp:txBody>
+      <dsp:txXfrm>
+        <a:off x="2330227" y="1482881"/>
+        <a:ext cx="316861" cy="317716"/>
+      </dsp:txXfrm>
+    </dsp:sp>
+    <dsp:sp modelId="{2C28B92A-9BFD-4264-A70E-B712FFF61F0E}">
+      <dsp:nvSpPr>
+        <dsp:cNvPr id="0" name=""/>
+        <dsp:cNvSpPr/>
+      </dsp:nvSpPr>
+      <dsp:spPr>
+        <a:xfrm>
+          <a:off x="2996406" y="1001183"/>
+          <a:ext cx="2135187" cy="1281112"/>
+        </a:xfrm>
+        <a:prstGeom prst="roundRect">
+          <a:avLst>
+            <a:gd name="adj" fmla="val 10000"/>
+          </a:avLst>
+        </a:prstGeom>
+        <a:solidFill>
+          <a:schemeClr val="accent6"/>
+        </a:solidFill>
+        <a:ln w="12700" cap="flat" cmpd="sng" algn="ctr">
+          <a:solidFill>
+            <a:schemeClr val="lt1">
+              <a:hueOff val="0"/>
+              <a:satOff val="0"/>
+              <a:lumOff val="0"/>
+              <a:alphaOff val="0"/>
+            </a:schemeClr>
+          </a:solidFill>
+          <a:prstDash val="solid"/>
+          <a:miter lim="800000"/>
+        </a:ln>
+        <a:effectLst/>
+      </dsp:spPr>
+      <dsp:style>
+        <a:lnRef idx="2">
+          <a:scrgbClr r="0" g="0" b="0"/>
+        </a:lnRef>
+        <a:fillRef idx="1">
+          <a:scrgbClr r="0" g="0" b="0"/>
+        </a:fillRef>
+        <a:effectRef idx="0">
+          <a:scrgbClr r="0" g="0" b="0"/>
+        </a:effectRef>
+        <a:fontRef idx="minor">
+          <a:schemeClr val="lt1"/>
+        </a:fontRef>
+      </dsp:style>
+      <dsp:txBody>
+        <a:bodyPr spcFirstLastPara="0" vert="horz" wrap="square" lIns="41910" tIns="41910" rIns="41910" bIns="41910" numCol="1" spcCol="1270" anchor="ctr" anchorCtr="0">
+          <a:noAutofit/>
+        </a:bodyPr>
+        <a:lstStyle/>
+        <a:p>
+          <a:pPr marL="0" lvl="0" indent="0" algn="ctr" defTabSz="488950">
+            <a:lnSpc>
+              <a:spcPct val="90000"/>
+            </a:lnSpc>
+            <a:spcBef>
+              <a:spcPct val="0"/>
+            </a:spcBef>
+            <a:spcAft>
+              <a:spcPct val="35000"/>
+            </a:spcAft>
+            <a:buNone/>
+          </a:pPr>
+          <a:r>
+            <a:rPr lang="en-US" sz="1100" kern="1200" dirty="0"/>
+            <a:t>H1 Cell Line</a:t>
+          </a:r>
+        </a:p>
+      </dsp:txBody>
+      <dsp:txXfrm>
+        <a:off x="3033928" y="1038705"/>
+        <a:ext cx="2060143" cy="1206068"/>
+      </dsp:txXfrm>
+    </dsp:sp>
+    <dsp:sp modelId="{A035F27A-EAE1-4BF8-898B-030DF89D10B8}">
+      <dsp:nvSpPr>
+        <dsp:cNvPr id="0" name=""/>
+        <dsp:cNvSpPr/>
+      </dsp:nvSpPr>
+      <dsp:spPr>
+        <a:xfrm>
+          <a:off x="5319490" y="1376976"/>
+          <a:ext cx="452659" cy="529526"/>
+        </a:xfrm>
+        <a:prstGeom prst="rightArrow">
+          <a:avLst>
+            <a:gd name="adj1" fmla="val 60000"/>
+            <a:gd name="adj2" fmla="val 50000"/>
+          </a:avLst>
+        </a:prstGeom>
+        <a:solidFill>
+          <a:schemeClr val="accent6"/>
+        </a:solidFill>
+        <a:ln>
+          <a:noFill/>
+        </a:ln>
+        <a:effectLst/>
+      </dsp:spPr>
+      <dsp:style>
+        <a:lnRef idx="0">
+          <a:scrgbClr r="0" g="0" b="0"/>
+        </a:lnRef>
+        <a:fillRef idx="1">
+          <a:scrgbClr r="0" g="0" b="0"/>
+        </a:fillRef>
+        <a:effectRef idx="0">
+          <a:scrgbClr r="0" g="0" b="0"/>
+        </a:effectRef>
+        <a:fontRef idx="minor">
+          <a:schemeClr val="lt1"/>
+        </a:fontRef>
+      </dsp:style>
+      <dsp:txBody>
+        <a:bodyPr spcFirstLastPara="0" vert="horz" wrap="square" lIns="0" tIns="0" rIns="0" bIns="0" numCol="1" spcCol="1270" anchor="ctr" anchorCtr="0">
+          <a:noAutofit/>
+        </a:bodyPr>
+        <a:lstStyle/>
+        <a:p>
+          <a:pPr marL="0" lvl="0" indent="0" algn="ctr" defTabSz="400050">
+            <a:lnSpc>
+              <a:spcPct val="90000"/>
+            </a:lnSpc>
+            <a:spcBef>
+              <a:spcPct val="0"/>
+            </a:spcBef>
+            <a:spcAft>
+              <a:spcPct val="35000"/>
+            </a:spcAft>
+            <a:buNone/>
+          </a:pPr>
+          <a:endParaRPr lang="en-US" sz="900" kern="1200"/>
+        </a:p>
+      </dsp:txBody>
+      <dsp:txXfrm>
+        <a:off x="5319490" y="1482881"/>
+        <a:ext cx="316861" cy="317716"/>
+      </dsp:txXfrm>
+    </dsp:sp>
+    <dsp:sp modelId="{55681D6F-DDCB-42D8-9689-3B66CCF24AD0}">
+      <dsp:nvSpPr>
+        <dsp:cNvPr id="0" name=""/>
+        <dsp:cNvSpPr/>
+      </dsp:nvSpPr>
+      <dsp:spPr>
+        <a:xfrm>
+          <a:off x="5985668" y="1001183"/>
+          <a:ext cx="2135187" cy="1281112"/>
+        </a:xfrm>
+        <a:prstGeom prst="roundRect">
+          <a:avLst>
+            <a:gd name="adj" fmla="val 10000"/>
+          </a:avLst>
+        </a:prstGeom>
+        <a:solidFill>
+          <a:schemeClr val="accent6"/>
+        </a:solidFill>
+        <a:ln w="12700" cap="flat" cmpd="sng" algn="ctr">
+          <a:solidFill>
+            <a:schemeClr val="lt1">
+              <a:hueOff val="0"/>
+              <a:satOff val="0"/>
+              <a:lumOff val="0"/>
+              <a:alphaOff val="0"/>
+            </a:schemeClr>
+          </a:solidFill>
+          <a:prstDash val="solid"/>
+          <a:miter lim="800000"/>
+        </a:ln>
+        <a:effectLst/>
+      </dsp:spPr>
+      <dsp:style>
+        <a:lnRef idx="2">
+          <a:scrgbClr r="0" g="0" b="0"/>
+        </a:lnRef>
+        <a:fillRef idx="1">
+          <a:scrgbClr r="0" g="0" b="0"/>
+        </a:fillRef>
+        <a:effectRef idx="0">
+          <a:scrgbClr r="0" g="0" b="0"/>
+        </a:effectRef>
+        <a:fontRef idx="minor">
+          <a:schemeClr val="lt1"/>
+        </a:fontRef>
+      </dsp:style>
+      <dsp:txBody>
+        <a:bodyPr spcFirstLastPara="0" vert="horz" wrap="square" lIns="41910" tIns="41910" rIns="41910" bIns="41910" numCol="1" spcCol="1270" anchor="ctr" anchorCtr="0">
+          <a:noAutofit/>
+        </a:bodyPr>
+        <a:lstStyle/>
+        <a:p>
+          <a:pPr marL="0" lvl="0" indent="0" algn="ctr" defTabSz="488950">
+            <a:lnSpc>
+              <a:spcPct val="90000"/>
+            </a:lnSpc>
+            <a:spcBef>
+              <a:spcPct val="0"/>
+            </a:spcBef>
+            <a:spcAft>
+              <a:spcPct val="35000"/>
+            </a:spcAft>
+            <a:buNone/>
+          </a:pPr>
+          <a:r>
+            <a:rPr lang="en-US" sz="1100" kern="1200" dirty="0"/>
+            <a:t>Pull </a:t>
+          </a:r>
+          <a:r>
+            <a:rPr lang="en-US" sz="1100" kern="1200" dirty="0" err="1"/>
+            <a:t>ChIP</a:t>
+          </a:r>
+          <a:r>
+            <a:rPr lang="en-US" sz="1100" kern="1200" dirty="0"/>
+            <a:t>-Seq data (BAM files) for H3K27ac, H3K4me1, HeK4me2, H3K4me3.</a:t>
+          </a:r>
+        </a:p>
+      </dsp:txBody>
+      <dsp:txXfrm>
+        <a:off x="6023190" y="1038705"/>
+        <a:ext cx="2060143" cy="1206068"/>
+      </dsp:txXfrm>
+    </dsp:sp>
+    <dsp:sp modelId="{81AE30B9-2D7F-4C6D-B7AB-E4A2F7352DFD}">
+      <dsp:nvSpPr>
+        <dsp:cNvPr id="0" name=""/>
+        <dsp:cNvSpPr/>
+      </dsp:nvSpPr>
+      <dsp:spPr>
+        <a:xfrm rot="5400000">
+          <a:off x="6826932" y="2431759"/>
+          <a:ext cx="452659" cy="529526"/>
+        </a:xfrm>
+        <a:prstGeom prst="rightArrow">
+          <a:avLst>
+            <a:gd name="adj1" fmla="val 60000"/>
+            <a:gd name="adj2" fmla="val 50000"/>
+          </a:avLst>
+        </a:prstGeom>
+        <a:solidFill>
+          <a:schemeClr val="accent6"/>
+        </a:solidFill>
+        <a:ln>
+          <a:noFill/>
+        </a:ln>
+        <a:effectLst/>
+      </dsp:spPr>
+      <dsp:style>
+        <a:lnRef idx="0">
+          <a:scrgbClr r="0" g="0" b="0"/>
+        </a:lnRef>
+        <a:fillRef idx="1">
+          <a:scrgbClr r="0" g="0" b="0"/>
+        </a:fillRef>
+        <a:effectRef idx="0">
+          <a:scrgbClr r="0" g="0" b="0"/>
+        </a:effectRef>
+        <a:fontRef idx="minor">
+          <a:schemeClr val="lt1"/>
+        </a:fontRef>
+      </dsp:style>
+      <dsp:txBody>
+        <a:bodyPr spcFirstLastPara="0" vert="horz" wrap="square" lIns="0" tIns="0" rIns="0" bIns="0" numCol="1" spcCol="1270" anchor="ctr" anchorCtr="0">
+          <a:noAutofit/>
+        </a:bodyPr>
+        <a:lstStyle/>
+        <a:p>
+          <a:pPr marL="0" lvl="0" indent="0" algn="ctr" defTabSz="400050">
+            <a:lnSpc>
+              <a:spcPct val="90000"/>
+            </a:lnSpc>
+            <a:spcBef>
+              <a:spcPct val="0"/>
+            </a:spcBef>
+            <a:spcAft>
+              <a:spcPct val="35000"/>
+            </a:spcAft>
+            <a:buNone/>
+          </a:pPr>
+          <a:endParaRPr lang="en-US" sz="900" kern="1200"/>
+        </a:p>
+      </dsp:txBody>
+      <dsp:txXfrm rot="-5400000">
+        <a:off x="6894404" y="2470192"/>
+        <a:ext cx="317716" cy="316861"/>
+      </dsp:txXfrm>
+    </dsp:sp>
+    <dsp:sp modelId="{9E6080A3-0307-46A5-B63A-35ED5C8EB6A7}">
+      <dsp:nvSpPr>
+        <dsp:cNvPr id="0" name=""/>
+        <dsp:cNvSpPr/>
+      </dsp:nvSpPr>
+      <dsp:spPr>
+        <a:xfrm>
+          <a:off x="5985668" y="3136371"/>
+          <a:ext cx="2135187" cy="1281112"/>
+        </a:xfrm>
+        <a:prstGeom prst="roundRect">
+          <a:avLst>
+            <a:gd name="adj" fmla="val 10000"/>
+          </a:avLst>
+        </a:prstGeom>
+        <a:solidFill>
+          <a:schemeClr val="accent6"/>
+        </a:solidFill>
+        <a:ln w="12700" cap="flat" cmpd="sng" algn="ctr">
+          <a:solidFill>
+            <a:schemeClr val="lt1">
+              <a:hueOff val="0"/>
+              <a:satOff val="0"/>
+              <a:lumOff val="0"/>
+              <a:alphaOff val="0"/>
+            </a:schemeClr>
+          </a:solidFill>
+          <a:prstDash val="solid"/>
+          <a:miter lim="800000"/>
+        </a:ln>
+        <a:effectLst/>
+      </dsp:spPr>
+      <dsp:style>
+        <a:lnRef idx="2">
+          <a:scrgbClr r="0" g="0" b="0"/>
+        </a:lnRef>
+        <a:fillRef idx="1">
+          <a:scrgbClr r="0" g="0" b="0"/>
+        </a:fillRef>
+        <a:effectRef idx="0">
+          <a:scrgbClr r="0" g="0" b="0"/>
+        </a:effectRef>
+        <a:fontRef idx="minor">
+          <a:schemeClr val="lt1"/>
+        </a:fontRef>
+      </dsp:style>
+      <dsp:txBody>
+        <a:bodyPr spcFirstLastPara="0" vert="horz" wrap="square" lIns="41910" tIns="41910" rIns="41910" bIns="41910" numCol="1" spcCol="1270" anchor="ctr" anchorCtr="0">
+          <a:noAutofit/>
+        </a:bodyPr>
+        <a:lstStyle/>
+        <a:p>
+          <a:pPr marL="0" lvl="0" indent="0" algn="ctr" defTabSz="488950">
+            <a:lnSpc>
+              <a:spcPct val="90000"/>
+            </a:lnSpc>
+            <a:spcBef>
+              <a:spcPct val="0"/>
+            </a:spcBef>
+            <a:spcAft>
+              <a:spcPct val="35000"/>
+            </a:spcAft>
+            <a:buNone/>
+          </a:pPr>
+          <a:r>
+            <a:rPr lang="en-US" sz="1100" kern="1200" dirty="0"/>
+            <a:t>Index the BAM files using </a:t>
+          </a:r>
+          <a:r>
+            <a:rPr lang="en-US" sz="1100" i="1" kern="1200" dirty="0" err="1"/>
+            <a:t>samtools</a:t>
+          </a:r>
+          <a:endParaRPr lang="en-US" sz="1100" i="1" kern="1200" dirty="0"/>
+        </a:p>
+      </dsp:txBody>
+      <dsp:txXfrm>
+        <a:off x="6023190" y="3173893"/>
+        <a:ext cx="2060143" cy="1206068"/>
+      </dsp:txXfrm>
+    </dsp:sp>
+    <dsp:sp modelId="{7BB9A6E6-08FA-4D6F-92C0-475F79B704A7}">
+      <dsp:nvSpPr>
+        <dsp:cNvPr id="0" name=""/>
+        <dsp:cNvSpPr/>
+      </dsp:nvSpPr>
+      <dsp:spPr>
+        <a:xfrm rot="10800000">
+          <a:off x="5345112" y="3512163"/>
+          <a:ext cx="452659" cy="529526"/>
+        </a:xfrm>
+        <a:prstGeom prst="rightArrow">
+          <a:avLst>
+            <a:gd name="adj1" fmla="val 60000"/>
+            <a:gd name="adj2" fmla="val 50000"/>
+          </a:avLst>
+        </a:prstGeom>
+        <a:solidFill>
+          <a:schemeClr val="accent6"/>
+        </a:solidFill>
+        <a:ln>
+          <a:noFill/>
+        </a:ln>
+        <a:effectLst/>
+      </dsp:spPr>
+      <dsp:style>
+        <a:lnRef idx="0">
+          <a:scrgbClr r="0" g="0" b="0"/>
+        </a:lnRef>
+        <a:fillRef idx="1">
+          <a:scrgbClr r="0" g="0" b="0"/>
+        </a:fillRef>
+        <a:effectRef idx="0">
+          <a:scrgbClr r="0" g="0" b="0"/>
+        </a:effectRef>
+        <a:fontRef idx="minor">
+          <a:schemeClr val="lt1"/>
+        </a:fontRef>
+      </dsp:style>
+      <dsp:txBody>
+        <a:bodyPr spcFirstLastPara="0" vert="horz" wrap="square" lIns="0" tIns="0" rIns="0" bIns="0" numCol="1" spcCol="1270" anchor="ctr" anchorCtr="0">
+          <a:noAutofit/>
+        </a:bodyPr>
+        <a:lstStyle/>
+        <a:p>
+          <a:pPr marL="0" lvl="0" indent="0" algn="ctr" defTabSz="400050">
+            <a:lnSpc>
+              <a:spcPct val="90000"/>
+            </a:lnSpc>
+            <a:spcBef>
+              <a:spcPct val="0"/>
+            </a:spcBef>
+            <a:spcAft>
+              <a:spcPct val="35000"/>
+            </a:spcAft>
+            <a:buNone/>
+          </a:pPr>
+          <a:endParaRPr lang="en-US" sz="900" kern="1200"/>
+        </a:p>
+      </dsp:txBody>
+      <dsp:txXfrm rot="10800000">
+        <a:off x="5480910" y="3618068"/>
+        <a:ext cx="316861" cy="317716"/>
+      </dsp:txXfrm>
+    </dsp:sp>
+    <dsp:sp modelId="{14963B6A-3E06-4B62-AA40-C7BDE330A2E2}">
+      <dsp:nvSpPr>
+        <dsp:cNvPr id="0" name=""/>
+        <dsp:cNvSpPr/>
+      </dsp:nvSpPr>
+      <dsp:spPr>
+        <a:xfrm>
+          <a:off x="2996406" y="3136370"/>
+          <a:ext cx="2135187" cy="1281112"/>
+        </a:xfrm>
+        <a:prstGeom prst="roundRect">
+          <a:avLst>
+            <a:gd name="adj" fmla="val 10000"/>
+          </a:avLst>
+        </a:prstGeom>
+        <a:solidFill>
+          <a:schemeClr val="accent6"/>
+        </a:solidFill>
+        <a:ln w="12700" cap="flat" cmpd="sng" algn="ctr">
+          <a:solidFill>
+            <a:schemeClr val="lt1">
+              <a:hueOff val="0"/>
+              <a:satOff val="0"/>
+              <a:lumOff val="0"/>
+              <a:alphaOff val="0"/>
+            </a:schemeClr>
+          </a:solidFill>
+          <a:prstDash val="solid"/>
+          <a:miter lim="800000"/>
+        </a:ln>
+        <a:effectLst/>
+      </dsp:spPr>
+      <dsp:style>
+        <a:lnRef idx="2">
+          <a:scrgbClr r="0" g="0" b="0"/>
+        </a:lnRef>
+        <a:fillRef idx="1">
+          <a:scrgbClr r="0" g="0" b="0"/>
+        </a:fillRef>
+        <a:effectRef idx="0">
+          <a:scrgbClr r="0" g="0" b="0"/>
+        </a:effectRef>
+        <a:fontRef idx="minor">
+          <a:schemeClr val="lt1"/>
+        </a:fontRef>
+      </dsp:style>
+      <dsp:txBody>
+        <a:bodyPr spcFirstLastPara="0" vert="horz" wrap="square" lIns="41910" tIns="41910" rIns="41910" bIns="41910" numCol="1" spcCol="1270" anchor="ctr" anchorCtr="0">
+          <a:noAutofit/>
+        </a:bodyPr>
+        <a:lstStyle/>
+        <a:p>
+          <a:pPr marL="0" lvl="0" indent="0" algn="ctr" defTabSz="488950">
+            <a:lnSpc>
+              <a:spcPct val="90000"/>
+            </a:lnSpc>
+            <a:spcBef>
+              <a:spcPct val="0"/>
+            </a:spcBef>
+            <a:spcAft>
+              <a:spcPct val="35000"/>
+            </a:spcAft>
+            <a:buNone/>
+          </a:pPr>
+          <a:r>
+            <a:rPr lang="en-US" sz="1100" kern="1200" dirty="0"/>
+            <a:t>Calibrate bin level peak-enrichment using </a:t>
+          </a:r>
+          <a:r>
+            <a:rPr lang="en-US" sz="1100" i="1" kern="1200" dirty="0" err="1"/>
+            <a:t>bamCoverage</a:t>
+          </a:r>
+          <a:r>
+            <a:rPr lang="en-US" sz="1100" kern="1200" dirty="0"/>
+            <a:t> (</a:t>
+          </a:r>
+          <a:r>
+            <a:rPr lang="en-US" sz="1100" kern="1200" dirty="0" err="1"/>
+            <a:t>deeptools</a:t>
+          </a:r>
+          <a:r>
+            <a:rPr lang="en-US" sz="1100" kern="1200" dirty="0"/>
+            <a:t>)</a:t>
+          </a:r>
+        </a:p>
+      </dsp:txBody>
+      <dsp:txXfrm>
+        <a:off x="3033928" y="3173892"/>
         <a:ext cx="2060143" cy="1206068"/>
       </dsp:txXfrm>
     </dsp:sp>
@@ -4508,6 +6334,177 @@
 </dgm:layoutDef>
 </file>
 
+<file path=ppt/diagrams/layout3.xml><?xml version="1.0" encoding="utf-8"?>
+<dgm:layoutDef xmlns:dgm="http://schemas.openxmlformats.org/drawingml/2006/diagram" xmlns:a="http://schemas.openxmlformats.org/drawingml/2006/main" uniqueId="urn:microsoft.com/office/officeart/2005/8/layout/process5">
+  <dgm:title val=""/>
+  <dgm:desc val=""/>
+  <dgm:catLst>
+    <dgm:cat type="process" pri="17000"/>
+  </dgm:catLst>
+  <dgm:sampData>
+    <dgm:dataModel>
+      <dgm:ptLst>
+        <dgm:pt modelId="0" type="doc"/>
+        <dgm:pt modelId="1">
+          <dgm:prSet phldr="1"/>
+        </dgm:pt>
+        <dgm:pt modelId="2">
+          <dgm:prSet phldr="1"/>
+        </dgm:pt>
+        <dgm:pt modelId="3">
+          <dgm:prSet phldr="1"/>
+        </dgm:pt>
+        <dgm:pt modelId="4">
+          <dgm:prSet phldr="1"/>
+        </dgm:pt>
+        <dgm:pt modelId="5">
+          <dgm:prSet phldr="1"/>
+        </dgm:pt>
+      </dgm:ptLst>
+      <dgm:cxnLst>
+        <dgm:cxn modelId="7" srcId="0" destId="1" srcOrd="0" destOrd="0"/>
+        <dgm:cxn modelId="8" srcId="0" destId="2" srcOrd="1" destOrd="0"/>
+        <dgm:cxn modelId="9" srcId="0" destId="3" srcOrd="2" destOrd="0"/>
+        <dgm:cxn modelId="10" srcId="0" destId="4" srcOrd="3" destOrd="0"/>
+        <dgm:cxn modelId="11" srcId="0" destId="5" srcOrd="4" destOrd="0"/>
+      </dgm:cxnLst>
+      <dgm:bg/>
+      <dgm:whole/>
+    </dgm:dataModel>
+  </dgm:sampData>
+  <dgm:styleData>
+    <dgm:dataModel>
+      <dgm:ptLst>
+        <dgm:pt modelId="0" type="doc"/>
+        <dgm:pt modelId="1"/>
+        <dgm:pt modelId="2"/>
+      </dgm:ptLst>
+      <dgm:cxnLst>
+        <dgm:cxn modelId="3" srcId="0" destId="1" srcOrd="0" destOrd="0"/>
+        <dgm:cxn modelId="4" srcId="0" destId="2" srcOrd="1" destOrd="0"/>
+      </dgm:cxnLst>
+      <dgm:bg/>
+      <dgm:whole/>
+    </dgm:dataModel>
+  </dgm:styleData>
+  <dgm:clrData>
+    <dgm:dataModel>
+      <dgm:ptLst>
+        <dgm:pt modelId="0" type="doc"/>
+        <dgm:pt modelId="1"/>
+        <dgm:pt modelId="2"/>
+        <dgm:pt modelId="3"/>
+        <dgm:pt modelId="4"/>
+      </dgm:ptLst>
+      <dgm:cxnLst>
+        <dgm:cxn modelId="5" srcId="0" destId="1" srcOrd="0" destOrd="0"/>
+        <dgm:cxn modelId="6" srcId="0" destId="2" srcOrd="1" destOrd="0"/>
+        <dgm:cxn modelId="7" srcId="0" destId="3" srcOrd="2" destOrd="0"/>
+        <dgm:cxn modelId="8" srcId="0" destId="4" srcOrd="3" destOrd="0"/>
+      </dgm:cxnLst>
+      <dgm:bg/>
+      <dgm:whole/>
+    </dgm:dataModel>
+  </dgm:clrData>
+  <dgm:layoutNode name="diagram">
+    <dgm:varLst>
+      <dgm:dir/>
+      <dgm:resizeHandles val="exact"/>
+    </dgm:varLst>
+    <dgm:choose name="Name0">
+      <dgm:if name="Name1" axis="self" func="var" arg="dir" op="equ" val="norm">
+        <dgm:alg type="snake">
+          <dgm:param type="grDir" val="tL"/>
+          <dgm:param type="flowDir" val="row"/>
+          <dgm:param type="contDir" val="revDir"/>
+          <dgm:param type="bkpt" val="endCnv"/>
+        </dgm:alg>
+      </dgm:if>
+      <dgm:else name="Name2">
+        <dgm:alg type="snake">
+          <dgm:param type="grDir" val="tR"/>
+          <dgm:param type="flowDir" val="row"/>
+          <dgm:param type="contDir" val="revDir"/>
+          <dgm:param type="bkpt" val="endCnv"/>
+        </dgm:alg>
+      </dgm:else>
+    </dgm:choose>
+    <dgm:shape xmlns:r="http://schemas.openxmlformats.org/officeDocument/2006/relationships" r:blip="">
+      <dgm:adjLst/>
+    </dgm:shape>
+    <dgm:presOf/>
+    <dgm:constrLst>
+      <dgm:constr type="w" for="ch" ptType="node" refType="w"/>
+      <dgm:constr type="w" for="ch" forName="sibTrans" refType="w" refFor="ch" refPtType="node" op="equ" fact="0.4"/>
+      <dgm:constr type="sp" refType="w" refFor="ch" refForName="sibTrans" op="equ"/>
+      <dgm:constr type="primFontSz" for="ch" ptType="node" op="equ" val="65"/>
+      <dgm:constr type="primFontSz" for="des" forName="connectorText" op="equ" val="55"/>
+      <dgm:constr type="primFontSz" for="des" forName="connectorText" refType="primFontSz" refFor="ch" refPtType="node" op="lte" fact="0.8"/>
+    </dgm:constrLst>
+    <dgm:ruleLst/>
+    <dgm:forEach name="nodesForEach" axis="ch" ptType="node">
+      <dgm:layoutNode name="node">
+        <dgm:varLst>
+          <dgm:bulletEnabled val="1"/>
+        </dgm:varLst>
+        <dgm:alg type="tx"/>
+        <dgm:shape xmlns:r="http://schemas.openxmlformats.org/officeDocument/2006/relationships" type="roundRect" r:blip="">
+          <dgm:adjLst>
+            <dgm:adj idx="1" val="0.1"/>
+          </dgm:adjLst>
+        </dgm:shape>
+        <dgm:presOf axis="desOrSelf" ptType="node"/>
+        <dgm:constrLst>
+          <dgm:constr type="h" refType="w" fact="0.6"/>
+          <dgm:constr type="tMarg" refType="primFontSz" fact="0.3"/>
+          <dgm:constr type="bMarg" refType="primFontSz" fact="0.3"/>
+          <dgm:constr type="lMarg" refType="primFontSz" fact="0.3"/>
+          <dgm:constr type="rMarg" refType="primFontSz" fact="0.3"/>
+        </dgm:constrLst>
+        <dgm:ruleLst>
+          <dgm:rule type="primFontSz" val="5" fact="NaN" max="NaN"/>
+        </dgm:ruleLst>
+      </dgm:layoutNode>
+      <dgm:forEach name="sibTransForEach" axis="followSib" ptType="sibTrans" cnt="1">
+        <dgm:layoutNode name="sibTrans">
+          <dgm:alg type="conn">
+            <dgm:param type="begPts" val="auto"/>
+            <dgm:param type="endPts" val="auto"/>
+          </dgm:alg>
+          <dgm:shape xmlns:r="http://schemas.openxmlformats.org/officeDocument/2006/relationships" type="conn" r:blip="">
+            <dgm:adjLst/>
+          </dgm:shape>
+          <dgm:presOf axis="self"/>
+          <dgm:constrLst>
+            <dgm:constr type="h" refType="w" fact="0.62"/>
+            <dgm:constr type="connDist"/>
+          </dgm:constrLst>
+          <dgm:ruleLst/>
+          <dgm:layoutNode name="connectorText">
+            <dgm:alg type="tx">
+              <dgm:param type="autoTxRot" val="upr"/>
+            </dgm:alg>
+            <dgm:shape xmlns:r="http://schemas.openxmlformats.org/officeDocument/2006/relationships" type="conn" r:blip="" hideGeom="1">
+              <dgm:adjLst/>
+            </dgm:shape>
+            <dgm:presOf axis="self"/>
+            <dgm:constrLst>
+              <dgm:constr type="lMarg"/>
+              <dgm:constr type="rMarg"/>
+              <dgm:constr type="tMarg"/>
+              <dgm:constr type="bMarg"/>
+            </dgm:constrLst>
+            <dgm:ruleLst>
+              <dgm:rule type="primFontSz" val="5" fact="NaN" max="NaN"/>
+            </dgm:ruleLst>
+          </dgm:layoutNode>
+        </dgm:layoutNode>
+      </dgm:forEach>
+    </dgm:forEach>
+  </dgm:layoutNode>
+</dgm:layoutDef>
+</file>
+
 <file path=ppt/diagrams/quickStyle1.xml><?xml version="1.0" encoding="utf-8"?>
 <dgm:styleDef xmlns:dgm="http://schemas.openxmlformats.org/drawingml/2006/diagram" xmlns:a="http://schemas.openxmlformats.org/drawingml/2006/main" uniqueId="urn:microsoft.com/office/officeart/2005/8/quickstyle/simple1">
   <dgm:title val=""/>
@@ -5543,6 +7540,1040 @@
 </file>
 
 <file path=ppt/diagrams/quickStyle2.xml><?xml version="1.0" encoding="utf-8"?>
+<dgm:styleDef xmlns:dgm="http://schemas.openxmlformats.org/drawingml/2006/diagram" xmlns:a="http://schemas.openxmlformats.org/drawingml/2006/main" uniqueId="urn:microsoft.com/office/officeart/2005/8/quickstyle/simple1">
+  <dgm:title val=""/>
+  <dgm:desc val=""/>
+  <dgm:catLst>
+    <dgm:cat type="simple" pri="10100"/>
+  </dgm:catLst>
+  <dgm:scene3d>
+    <a:camera prst="orthographicFront"/>
+    <a:lightRig rig="threePt" dir="t"/>
+  </dgm:scene3d>
+  <dgm:styleLbl name="node0">
+    <dgm:scene3d>
+      <a:camera prst="orthographicFront"/>
+      <a:lightRig rig="threePt" dir="t"/>
+    </dgm:scene3d>
+    <dgm:sp3d/>
+    <dgm:txPr/>
+    <dgm:style>
+      <a:lnRef idx="2">
+        <a:scrgbClr r="0" g="0" b="0"/>
+      </a:lnRef>
+      <a:fillRef idx="1">
+        <a:scrgbClr r="0" g="0" b="0"/>
+      </a:fillRef>
+      <a:effectRef idx="0">
+        <a:scrgbClr r="0" g="0" b="0"/>
+      </a:effectRef>
+      <a:fontRef idx="minor">
+        <a:schemeClr val="lt1"/>
+      </a:fontRef>
+    </dgm:style>
+  </dgm:styleLbl>
+  <dgm:styleLbl name="lnNode1">
+    <dgm:scene3d>
+      <a:camera prst="orthographicFront"/>
+      <a:lightRig rig="threePt" dir="t"/>
+    </dgm:scene3d>
+    <dgm:sp3d/>
+    <dgm:txPr/>
+    <dgm:style>
+      <a:lnRef idx="2">
+        <a:scrgbClr r="0" g="0" b="0"/>
+      </a:lnRef>
+      <a:fillRef idx="1">
+        <a:scrgbClr r="0" g="0" b="0"/>
+      </a:fillRef>
+      <a:effectRef idx="0">
+        <a:scrgbClr r="0" g="0" b="0"/>
+      </a:effectRef>
+      <a:fontRef idx="minor">
+        <a:schemeClr val="lt1"/>
+      </a:fontRef>
+    </dgm:style>
+  </dgm:styleLbl>
+  <dgm:styleLbl name="vennNode1">
+    <dgm:scene3d>
+      <a:camera prst="orthographicFront"/>
+      <a:lightRig rig="threePt" dir="t"/>
+    </dgm:scene3d>
+    <dgm:sp3d/>
+    <dgm:txPr/>
+    <dgm:style>
+      <a:lnRef idx="2">
+        <a:scrgbClr r="0" g="0" b="0"/>
+      </a:lnRef>
+      <a:fillRef idx="1">
+        <a:scrgbClr r="0" g="0" b="0"/>
+      </a:fillRef>
+      <a:effectRef idx="0">
+        <a:scrgbClr r="0" g="0" b="0"/>
+      </a:effectRef>
+      <a:fontRef idx="minor">
+        <a:schemeClr val="tx1"/>
+      </a:fontRef>
+    </dgm:style>
+  </dgm:styleLbl>
+  <dgm:styleLbl name="alignNode1">
+    <dgm:scene3d>
+      <a:camera prst="orthographicFront"/>
+      <a:lightRig rig="threePt" dir="t"/>
+    </dgm:scene3d>
+    <dgm:sp3d/>
+    <dgm:txPr/>
+    <dgm:style>
+      <a:lnRef idx="2">
+        <a:scrgbClr r="0" g="0" b="0"/>
+      </a:lnRef>
+      <a:fillRef idx="1">
+        <a:scrgbClr r="0" g="0" b="0"/>
+      </a:fillRef>
+      <a:effectRef idx="0">
+        <a:scrgbClr r="0" g="0" b="0"/>
+      </a:effectRef>
+      <a:fontRef idx="minor">
+        <a:schemeClr val="lt1"/>
+      </a:fontRef>
+    </dgm:style>
+  </dgm:styleLbl>
+  <dgm:styleLbl name="node1">
+    <dgm:scene3d>
+      <a:camera prst="orthographicFront"/>
+      <a:lightRig rig="threePt" dir="t"/>
+    </dgm:scene3d>
+    <dgm:sp3d/>
+    <dgm:txPr/>
+    <dgm:style>
+      <a:lnRef idx="2">
+        <a:scrgbClr r="0" g="0" b="0"/>
+      </a:lnRef>
+      <a:fillRef idx="1">
+        <a:scrgbClr r="0" g="0" b="0"/>
+      </a:fillRef>
+      <a:effectRef idx="0">
+        <a:scrgbClr r="0" g="0" b="0"/>
+      </a:effectRef>
+      <a:fontRef idx="minor">
+        <a:schemeClr val="lt1"/>
+      </a:fontRef>
+    </dgm:style>
+  </dgm:styleLbl>
+  <dgm:styleLbl name="node2">
+    <dgm:scene3d>
+      <a:camera prst="orthographicFront"/>
+      <a:lightRig rig="threePt" dir="t"/>
+    </dgm:scene3d>
+    <dgm:sp3d/>
+    <dgm:txPr/>
+    <dgm:style>
+      <a:lnRef idx="2">
+        <a:scrgbClr r="0" g="0" b="0"/>
+      </a:lnRef>
+      <a:fillRef idx="1">
+        <a:scrgbClr r="0" g="0" b="0"/>
+      </a:fillRef>
+      <a:effectRef idx="0">
+        <a:scrgbClr r="0" g="0" b="0"/>
+      </a:effectRef>
+      <a:fontRef idx="minor">
+        <a:schemeClr val="lt1"/>
+      </a:fontRef>
+    </dgm:style>
+  </dgm:styleLbl>
+  <dgm:styleLbl name="node3">
+    <dgm:scene3d>
+      <a:camera prst="orthographicFront"/>
+      <a:lightRig rig="threePt" dir="t"/>
+    </dgm:scene3d>
+    <dgm:sp3d/>
+    <dgm:txPr/>
+    <dgm:style>
+      <a:lnRef idx="2">
+        <a:scrgbClr r="0" g="0" b="0"/>
+      </a:lnRef>
+      <a:fillRef idx="1">
+        <a:scrgbClr r="0" g="0" b="0"/>
+      </a:fillRef>
+      <a:effectRef idx="0">
+        <a:scrgbClr r="0" g="0" b="0"/>
+      </a:effectRef>
+      <a:fontRef idx="minor">
+        <a:schemeClr val="lt1"/>
+      </a:fontRef>
+    </dgm:style>
+  </dgm:styleLbl>
+  <dgm:styleLbl name="node4">
+    <dgm:scene3d>
+      <a:camera prst="orthographicFront"/>
+      <a:lightRig rig="threePt" dir="t"/>
+    </dgm:scene3d>
+    <dgm:sp3d/>
+    <dgm:txPr/>
+    <dgm:style>
+      <a:lnRef idx="2">
+        <a:scrgbClr r="0" g="0" b="0"/>
+      </a:lnRef>
+      <a:fillRef idx="1">
+        <a:scrgbClr r="0" g="0" b="0"/>
+      </a:fillRef>
+      <a:effectRef idx="0">
+        <a:scrgbClr r="0" g="0" b="0"/>
+      </a:effectRef>
+      <a:fontRef idx="minor">
+        <a:schemeClr val="lt1"/>
+      </a:fontRef>
+    </dgm:style>
+  </dgm:styleLbl>
+  <dgm:styleLbl name="fgImgPlace1">
+    <dgm:scene3d>
+      <a:camera prst="orthographicFront"/>
+      <a:lightRig rig="threePt" dir="t"/>
+    </dgm:scene3d>
+    <dgm:sp3d/>
+    <dgm:txPr/>
+    <dgm:style>
+      <a:lnRef idx="2">
+        <a:scrgbClr r="0" g="0" b="0"/>
+      </a:lnRef>
+      <a:fillRef idx="1">
+        <a:scrgbClr r="0" g="0" b="0"/>
+      </a:fillRef>
+      <a:effectRef idx="0">
+        <a:scrgbClr r="0" g="0" b="0"/>
+      </a:effectRef>
+      <a:fontRef idx="minor"/>
+    </dgm:style>
+  </dgm:styleLbl>
+  <dgm:styleLbl name="alignImgPlace1">
+    <dgm:scene3d>
+      <a:camera prst="orthographicFront"/>
+      <a:lightRig rig="threePt" dir="t"/>
+    </dgm:scene3d>
+    <dgm:sp3d/>
+    <dgm:txPr/>
+    <dgm:style>
+      <a:lnRef idx="2">
+        <a:scrgbClr r="0" g="0" b="0"/>
+      </a:lnRef>
+      <a:fillRef idx="1">
+        <a:scrgbClr r="0" g="0" b="0"/>
+      </a:fillRef>
+      <a:effectRef idx="0">
+        <a:scrgbClr r="0" g="0" b="0"/>
+      </a:effectRef>
+      <a:fontRef idx="minor"/>
+    </dgm:style>
+  </dgm:styleLbl>
+  <dgm:styleLbl name="bgImgPlace1">
+    <dgm:scene3d>
+      <a:camera prst="orthographicFront"/>
+      <a:lightRig rig="threePt" dir="t"/>
+    </dgm:scene3d>
+    <dgm:sp3d/>
+    <dgm:txPr/>
+    <dgm:style>
+      <a:lnRef idx="2">
+        <a:scrgbClr r="0" g="0" b="0"/>
+      </a:lnRef>
+      <a:fillRef idx="1">
+        <a:scrgbClr r="0" g="0" b="0"/>
+      </a:fillRef>
+      <a:effectRef idx="0">
+        <a:scrgbClr r="0" g="0" b="0"/>
+      </a:effectRef>
+      <a:fontRef idx="minor"/>
+    </dgm:style>
+  </dgm:styleLbl>
+  <dgm:styleLbl name="sibTrans2D1">
+    <dgm:scene3d>
+      <a:camera prst="orthographicFront"/>
+      <a:lightRig rig="threePt" dir="t"/>
+    </dgm:scene3d>
+    <dgm:sp3d/>
+    <dgm:txPr/>
+    <dgm:style>
+      <a:lnRef idx="0">
+        <a:scrgbClr r="0" g="0" b="0"/>
+      </a:lnRef>
+      <a:fillRef idx="1">
+        <a:scrgbClr r="0" g="0" b="0"/>
+      </a:fillRef>
+      <a:effectRef idx="0">
+        <a:scrgbClr r="0" g="0" b="0"/>
+      </a:effectRef>
+      <a:fontRef idx="minor">
+        <a:schemeClr val="lt1"/>
+      </a:fontRef>
+    </dgm:style>
+  </dgm:styleLbl>
+  <dgm:styleLbl name="fgSibTrans2D1">
+    <dgm:scene3d>
+      <a:camera prst="orthographicFront"/>
+      <a:lightRig rig="threePt" dir="t"/>
+    </dgm:scene3d>
+    <dgm:sp3d/>
+    <dgm:txPr/>
+    <dgm:style>
+      <a:lnRef idx="0">
+        <a:scrgbClr r="0" g="0" b="0"/>
+      </a:lnRef>
+      <a:fillRef idx="1">
+        <a:scrgbClr r="0" g="0" b="0"/>
+      </a:fillRef>
+      <a:effectRef idx="0">
+        <a:scrgbClr r="0" g="0" b="0"/>
+      </a:effectRef>
+      <a:fontRef idx="minor">
+        <a:schemeClr val="lt1"/>
+      </a:fontRef>
+    </dgm:style>
+  </dgm:styleLbl>
+  <dgm:styleLbl name="bgSibTrans2D1">
+    <dgm:scene3d>
+      <a:camera prst="orthographicFront"/>
+      <a:lightRig rig="threePt" dir="t"/>
+    </dgm:scene3d>
+    <dgm:sp3d/>
+    <dgm:txPr/>
+    <dgm:style>
+      <a:lnRef idx="0">
+        <a:scrgbClr r="0" g="0" b="0"/>
+      </a:lnRef>
+      <a:fillRef idx="1">
+        <a:scrgbClr r="0" g="0" b="0"/>
+      </a:fillRef>
+      <a:effectRef idx="0">
+        <a:scrgbClr r="0" g="0" b="0"/>
+      </a:effectRef>
+      <a:fontRef idx="minor">
+        <a:schemeClr val="lt1"/>
+      </a:fontRef>
+    </dgm:style>
+  </dgm:styleLbl>
+  <dgm:styleLbl name="sibTrans1D1">
+    <dgm:scene3d>
+      <a:camera prst="orthographicFront"/>
+      <a:lightRig rig="threePt" dir="t"/>
+    </dgm:scene3d>
+    <dgm:sp3d/>
+    <dgm:txPr/>
+    <dgm:style>
+      <a:lnRef idx="1">
+        <a:scrgbClr r="0" g="0" b="0"/>
+      </a:lnRef>
+      <a:fillRef idx="0">
+        <a:scrgbClr r="0" g="0" b="0"/>
+      </a:fillRef>
+      <a:effectRef idx="0">
+        <a:scrgbClr r="0" g="0" b="0"/>
+      </a:effectRef>
+      <a:fontRef idx="minor"/>
+    </dgm:style>
+  </dgm:styleLbl>
+  <dgm:styleLbl name="callout">
+    <dgm:scene3d>
+      <a:camera prst="orthographicFront"/>
+      <a:lightRig rig="threePt" dir="t"/>
+    </dgm:scene3d>
+    <dgm:sp3d/>
+    <dgm:txPr/>
+    <dgm:style>
+      <a:lnRef idx="2">
+        <a:scrgbClr r="0" g="0" b="0"/>
+      </a:lnRef>
+      <a:fillRef idx="1">
+        <a:scrgbClr r="0" g="0" b="0"/>
+      </a:fillRef>
+      <a:effectRef idx="0">
+        <a:scrgbClr r="0" g="0" b="0"/>
+      </a:effectRef>
+      <a:fontRef idx="minor"/>
+    </dgm:style>
+  </dgm:styleLbl>
+  <dgm:styleLbl name="asst0">
+    <dgm:scene3d>
+      <a:camera prst="orthographicFront"/>
+      <a:lightRig rig="threePt" dir="t"/>
+    </dgm:scene3d>
+    <dgm:sp3d/>
+    <dgm:txPr/>
+    <dgm:style>
+      <a:lnRef idx="2">
+        <a:scrgbClr r="0" g="0" b="0"/>
+      </a:lnRef>
+      <a:fillRef idx="1">
+        <a:scrgbClr r="0" g="0" b="0"/>
+      </a:fillRef>
+      <a:effectRef idx="0">
+        <a:scrgbClr r="0" g="0" b="0"/>
+      </a:effectRef>
+      <a:fontRef idx="minor">
+        <a:schemeClr val="lt1"/>
+      </a:fontRef>
+    </dgm:style>
+  </dgm:styleLbl>
+  <dgm:styleLbl name="asst1">
+    <dgm:scene3d>
+      <a:camera prst="orthographicFront"/>
+      <a:lightRig rig="threePt" dir="t"/>
+    </dgm:scene3d>
+    <dgm:sp3d/>
+    <dgm:txPr/>
+    <dgm:style>
+      <a:lnRef idx="2">
+        <a:scrgbClr r="0" g="0" b="0"/>
+      </a:lnRef>
+      <a:fillRef idx="1">
+        <a:scrgbClr r="0" g="0" b="0"/>
+      </a:fillRef>
+      <a:effectRef idx="0">
+        <a:scrgbClr r="0" g="0" b="0"/>
+      </a:effectRef>
+      <a:fontRef idx="minor">
+        <a:schemeClr val="lt1"/>
+      </a:fontRef>
+    </dgm:style>
+  </dgm:styleLbl>
+  <dgm:styleLbl name="asst2">
+    <dgm:scene3d>
+      <a:camera prst="orthographicFront"/>
+      <a:lightRig rig="threePt" dir="t"/>
+    </dgm:scene3d>
+    <dgm:sp3d/>
+    <dgm:txPr/>
+    <dgm:style>
+      <a:lnRef idx="2">
+        <a:scrgbClr r="0" g="0" b="0"/>
+      </a:lnRef>
+      <a:fillRef idx="1">
+        <a:scrgbClr r="0" g="0" b="0"/>
+      </a:fillRef>
+      <a:effectRef idx="0">
+        <a:scrgbClr r="0" g="0" b="0"/>
+      </a:effectRef>
+      <a:fontRef idx="minor">
+        <a:schemeClr val="lt1"/>
+      </a:fontRef>
+    </dgm:style>
+  </dgm:styleLbl>
+  <dgm:styleLbl name="asst3">
+    <dgm:scene3d>
+      <a:camera prst="orthographicFront"/>
+      <a:lightRig rig="threePt" dir="t"/>
+    </dgm:scene3d>
+    <dgm:sp3d/>
+    <dgm:txPr/>
+    <dgm:style>
+      <a:lnRef idx="2">
+        <a:scrgbClr r="0" g="0" b="0"/>
+      </a:lnRef>
+      <a:fillRef idx="1">
+        <a:scrgbClr r="0" g="0" b="0"/>
+      </a:fillRef>
+      <a:effectRef idx="0">
+        <a:scrgbClr r="0" g="0" b="0"/>
+      </a:effectRef>
+      <a:fontRef idx="minor">
+        <a:schemeClr val="lt1"/>
+      </a:fontRef>
+    </dgm:style>
+  </dgm:styleLbl>
+  <dgm:styleLbl name="asst4">
+    <dgm:scene3d>
+      <a:camera prst="orthographicFront"/>
+      <a:lightRig rig="threePt" dir="t"/>
+    </dgm:scene3d>
+    <dgm:sp3d/>
+    <dgm:txPr/>
+    <dgm:style>
+      <a:lnRef idx="2">
+        <a:scrgbClr r="0" g="0" b="0"/>
+      </a:lnRef>
+      <a:fillRef idx="1">
+        <a:scrgbClr r="0" g="0" b="0"/>
+      </a:fillRef>
+      <a:effectRef idx="0">
+        <a:scrgbClr r="0" g="0" b="0"/>
+      </a:effectRef>
+      <a:fontRef idx="minor">
+        <a:schemeClr val="lt1"/>
+      </a:fontRef>
+    </dgm:style>
+  </dgm:styleLbl>
+  <dgm:styleLbl name="parChTrans2D1">
+    <dgm:scene3d>
+      <a:camera prst="orthographicFront"/>
+      <a:lightRig rig="threePt" dir="t"/>
+    </dgm:scene3d>
+    <dgm:sp3d/>
+    <dgm:txPr/>
+    <dgm:style>
+      <a:lnRef idx="2">
+        <a:scrgbClr r="0" g="0" b="0"/>
+      </a:lnRef>
+      <a:fillRef idx="1">
+        <a:scrgbClr r="0" g="0" b="0"/>
+      </a:fillRef>
+      <a:effectRef idx="0">
+        <a:scrgbClr r="0" g="0" b="0"/>
+      </a:effectRef>
+      <a:fontRef idx="minor">
+        <a:schemeClr val="lt1"/>
+      </a:fontRef>
+    </dgm:style>
+  </dgm:styleLbl>
+  <dgm:styleLbl name="parChTrans2D2">
+    <dgm:scene3d>
+      <a:camera prst="orthographicFront"/>
+      <a:lightRig rig="threePt" dir="t"/>
+    </dgm:scene3d>
+    <dgm:sp3d/>
+    <dgm:txPr/>
+    <dgm:style>
+      <a:lnRef idx="2">
+        <a:scrgbClr r="0" g="0" b="0"/>
+      </a:lnRef>
+      <a:fillRef idx="1">
+        <a:scrgbClr r="0" g="0" b="0"/>
+      </a:fillRef>
+      <a:effectRef idx="0">
+        <a:scrgbClr r="0" g="0" b="0"/>
+      </a:effectRef>
+      <a:fontRef idx="minor">
+        <a:schemeClr val="lt1"/>
+      </a:fontRef>
+    </dgm:style>
+  </dgm:styleLbl>
+  <dgm:styleLbl name="parChTrans2D3">
+    <dgm:scene3d>
+      <a:camera prst="orthographicFront"/>
+      <a:lightRig rig="threePt" dir="t"/>
+    </dgm:scene3d>
+    <dgm:sp3d/>
+    <dgm:txPr/>
+    <dgm:style>
+      <a:lnRef idx="2">
+        <a:scrgbClr r="0" g="0" b="0"/>
+      </a:lnRef>
+      <a:fillRef idx="1">
+        <a:scrgbClr r="0" g="0" b="0"/>
+      </a:fillRef>
+      <a:effectRef idx="0">
+        <a:scrgbClr r="0" g="0" b="0"/>
+      </a:effectRef>
+      <a:fontRef idx="minor">
+        <a:schemeClr val="lt1"/>
+      </a:fontRef>
+    </dgm:style>
+  </dgm:styleLbl>
+  <dgm:styleLbl name="parChTrans2D4">
+    <dgm:scene3d>
+      <a:camera prst="orthographicFront"/>
+      <a:lightRig rig="threePt" dir="t"/>
+    </dgm:scene3d>
+    <dgm:sp3d/>
+    <dgm:txPr/>
+    <dgm:style>
+      <a:lnRef idx="2">
+        <a:scrgbClr r="0" g="0" b="0"/>
+      </a:lnRef>
+      <a:fillRef idx="1">
+        <a:scrgbClr r="0" g="0" b="0"/>
+      </a:fillRef>
+      <a:effectRef idx="0">
+        <a:scrgbClr r="0" g="0" b="0"/>
+      </a:effectRef>
+      <a:fontRef idx="minor">
+        <a:schemeClr val="lt1"/>
+      </a:fontRef>
+    </dgm:style>
+  </dgm:styleLbl>
+  <dgm:styleLbl name="parChTrans1D1">
+    <dgm:scene3d>
+      <a:camera prst="orthographicFront"/>
+      <a:lightRig rig="threePt" dir="t"/>
+    </dgm:scene3d>
+    <dgm:sp3d/>
+    <dgm:txPr/>
+    <dgm:style>
+      <a:lnRef idx="2">
+        <a:scrgbClr r="0" g="0" b="0"/>
+      </a:lnRef>
+      <a:fillRef idx="0">
+        <a:scrgbClr r="0" g="0" b="0"/>
+      </a:fillRef>
+      <a:effectRef idx="0">
+        <a:scrgbClr r="0" g="0" b="0"/>
+      </a:effectRef>
+      <a:fontRef idx="minor"/>
+    </dgm:style>
+  </dgm:styleLbl>
+  <dgm:styleLbl name="parChTrans1D2">
+    <dgm:scene3d>
+      <a:camera prst="orthographicFront"/>
+      <a:lightRig rig="threePt" dir="t"/>
+    </dgm:scene3d>
+    <dgm:sp3d/>
+    <dgm:txPr/>
+    <dgm:style>
+      <a:lnRef idx="2">
+        <a:scrgbClr r="0" g="0" b="0"/>
+      </a:lnRef>
+      <a:fillRef idx="0">
+        <a:scrgbClr r="0" g="0" b="0"/>
+      </a:fillRef>
+      <a:effectRef idx="0">
+        <a:scrgbClr r="0" g="0" b="0"/>
+      </a:effectRef>
+      <a:fontRef idx="minor"/>
+    </dgm:style>
+  </dgm:styleLbl>
+  <dgm:styleLbl name="parChTrans1D3">
+    <dgm:scene3d>
+      <a:camera prst="orthographicFront"/>
+      <a:lightRig rig="threePt" dir="t"/>
+    </dgm:scene3d>
+    <dgm:sp3d/>
+    <dgm:txPr/>
+    <dgm:style>
+      <a:lnRef idx="2">
+        <a:scrgbClr r="0" g="0" b="0"/>
+      </a:lnRef>
+      <a:fillRef idx="0">
+        <a:scrgbClr r="0" g="0" b="0"/>
+      </a:fillRef>
+      <a:effectRef idx="0">
+        <a:scrgbClr r="0" g="0" b="0"/>
+      </a:effectRef>
+      <a:fontRef idx="minor"/>
+    </dgm:style>
+  </dgm:styleLbl>
+  <dgm:styleLbl name="parChTrans1D4">
+    <dgm:scene3d>
+      <a:camera prst="orthographicFront"/>
+      <a:lightRig rig="threePt" dir="t"/>
+    </dgm:scene3d>
+    <dgm:sp3d/>
+    <dgm:txPr/>
+    <dgm:style>
+      <a:lnRef idx="2">
+        <a:scrgbClr r="0" g="0" b="0"/>
+      </a:lnRef>
+      <a:fillRef idx="0">
+        <a:scrgbClr r="0" g="0" b="0"/>
+      </a:fillRef>
+      <a:effectRef idx="0">
+        <a:scrgbClr r="0" g="0" b="0"/>
+      </a:effectRef>
+      <a:fontRef idx="minor"/>
+    </dgm:style>
+  </dgm:styleLbl>
+  <dgm:styleLbl name="fgAcc1">
+    <dgm:scene3d>
+      <a:camera prst="orthographicFront"/>
+      <a:lightRig rig="threePt" dir="t"/>
+    </dgm:scene3d>
+    <dgm:sp3d/>
+    <dgm:txPr/>
+    <dgm:style>
+      <a:lnRef idx="2">
+        <a:scrgbClr r="0" g="0" b="0"/>
+      </a:lnRef>
+      <a:fillRef idx="1">
+        <a:scrgbClr r="0" g="0" b="0"/>
+      </a:fillRef>
+      <a:effectRef idx="0">
+        <a:scrgbClr r="0" g="0" b="0"/>
+      </a:effectRef>
+      <a:fontRef idx="minor"/>
+    </dgm:style>
+  </dgm:styleLbl>
+  <dgm:styleLbl name="conFgAcc1">
+    <dgm:scene3d>
+      <a:camera prst="orthographicFront"/>
+      <a:lightRig rig="threePt" dir="t"/>
+    </dgm:scene3d>
+    <dgm:sp3d/>
+    <dgm:txPr/>
+    <dgm:style>
+      <a:lnRef idx="2">
+        <a:scrgbClr r="0" g="0" b="0"/>
+      </a:lnRef>
+      <a:fillRef idx="1">
+        <a:scrgbClr r="0" g="0" b="0"/>
+      </a:fillRef>
+      <a:effectRef idx="0">
+        <a:scrgbClr r="0" g="0" b="0"/>
+      </a:effectRef>
+      <a:fontRef idx="minor"/>
+    </dgm:style>
+  </dgm:styleLbl>
+  <dgm:styleLbl name="alignAcc1">
+    <dgm:scene3d>
+      <a:camera prst="orthographicFront"/>
+      <a:lightRig rig="threePt" dir="t"/>
+    </dgm:scene3d>
+    <dgm:sp3d/>
+    <dgm:txPr/>
+    <dgm:style>
+      <a:lnRef idx="2">
+        <a:scrgbClr r="0" g="0" b="0"/>
+      </a:lnRef>
+      <a:fillRef idx="1">
+        <a:scrgbClr r="0" g="0" b="0"/>
+      </a:fillRef>
+      <a:effectRef idx="0">
+        <a:scrgbClr r="0" g="0" b="0"/>
+      </a:effectRef>
+      <a:fontRef idx="minor"/>
+    </dgm:style>
+  </dgm:styleLbl>
+  <dgm:styleLbl name="trAlignAcc1">
+    <dgm:scene3d>
+      <a:camera prst="orthographicFront"/>
+      <a:lightRig rig="threePt" dir="t"/>
+    </dgm:scene3d>
+    <dgm:sp3d/>
+    <dgm:txPr/>
+    <dgm:style>
+      <a:lnRef idx="1">
+        <a:scrgbClr r="0" g="0" b="0"/>
+      </a:lnRef>
+      <a:fillRef idx="1">
+        <a:scrgbClr r="0" g="0" b="0"/>
+      </a:fillRef>
+      <a:effectRef idx="0">
+        <a:scrgbClr r="0" g="0" b="0"/>
+      </a:effectRef>
+      <a:fontRef idx="minor"/>
+    </dgm:style>
+  </dgm:styleLbl>
+  <dgm:styleLbl name="bgAcc1">
+    <dgm:scene3d>
+      <a:camera prst="orthographicFront"/>
+      <a:lightRig rig="threePt" dir="t"/>
+    </dgm:scene3d>
+    <dgm:sp3d/>
+    <dgm:txPr/>
+    <dgm:style>
+      <a:lnRef idx="2">
+        <a:scrgbClr r="0" g="0" b="0"/>
+      </a:lnRef>
+      <a:fillRef idx="1">
+        <a:scrgbClr r="0" g="0" b="0"/>
+      </a:fillRef>
+      <a:effectRef idx="0">
+        <a:scrgbClr r="0" g="0" b="0"/>
+      </a:effectRef>
+      <a:fontRef idx="minor"/>
+    </dgm:style>
+  </dgm:styleLbl>
+  <dgm:styleLbl name="solidFgAcc1">
+    <dgm:scene3d>
+      <a:camera prst="orthographicFront"/>
+      <a:lightRig rig="threePt" dir="t"/>
+    </dgm:scene3d>
+    <dgm:sp3d/>
+    <dgm:txPr/>
+    <dgm:style>
+      <a:lnRef idx="2">
+        <a:scrgbClr r="0" g="0" b="0"/>
+      </a:lnRef>
+      <a:fillRef idx="1">
+        <a:scrgbClr r="0" g="0" b="0"/>
+      </a:fillRef>
+      <a:effectRef idx="0">
+        <a:scrgbClr r="0" g="0" b="0"/>
+      </a:effectRef>
+      <a:fontRef idx="minor"/>
+    </dgm:style>
+  </dgm:styleLbl>
+  <dgm:styleLbl name="solidAlignAcc1">
+    <dgm:scene3d>
+      <a:camera prst="orthographicFront"/>
+      <a:lightRig rig="threePt" dir="t"/>
+    </dgm:scene3d>
+    <dgm:sp3d/>
+    <dgm:txPr/>
+    <dgm:style>
+      <a:lnRef idx="2">
+        <a:scrgbClr r="0" g="0" b="0"/>
+      </a:lnRef>
+      <a:fillRef idx="1">
+        <a:scrgbClr r="0" g="0" b="0"/>
+      </a:fillRef>
+      <a:effectRef idx="0">
+        <a:scrgbClr r="0" g="0" b="0"/>
+      </a:effectRef>
+      <a:fontRef idx="minor"/>
+    </dgm:style>
+  </dgm:styleLbl>
+  <dgm:styleLbl name="solidBgAcc1">
+    <dgm:scene3d>
+      <a:camera prst="orthographicFront"/>
+      <a:lightRig rig="threePt" dir="t"/>
+    </dgm:scene3d>
+    <dgm:sp3d/>
+    <dgm:txPr/>
+    <dgm:style>
+      <a:lnRef idx="2">
+        <a:scrgbClr r="0" g="0" b="0"/>
+      </a:lnRef>
+      <a:fillRef idx="1">
+        <a:scrgbClr r="0" g="0" b="0"/>
+      </a:fillRef>
+      <a:effectRef idx="0">
+        <a:scrgbClr r="0" g="0" b="0"/>
+      </a:effectRef>
+      <a:fontRef idx="minor"/>
+    </dgm:style>
+  </dgm:styleLbl>
+  <dgm:styleLbl name="fgAccFollowNode1">
+    <dgm:scene3d>
+      <a:camera prst="orthographicFront"/>
+      <a:lightRig rig="threePt" dir="t"/>
+    </dgm:scene3d>
+    <dgm:sp3d/>
+    <dgm:txPr/>
+    <dgm:style>
+      <a:lnRef idx="2">
+        <a:scrgbClr r="0" g="0" b="0"/>
+      </a:lnRef>
+      <a:fillRef idx="1">
+        <a:scrgbClr r="0" g="0" b="0"/>
+      </a:fillRef>
+      <a:effectRef idx="0">
+        <a:scrgbClr r="0" g="0" b="0"/>
+      </a:effectRef>
+      <a:fontRef idx="minor"/>
+    </dgm:style>
+  </dgm:styleLbl>
+  <dgm:styleLbl name="alignAccFollowNode1">
+    <dgm:scene3d>
+      <a:camera prst="orthographicFront"/>
+      <a:lightRig rig="threePt" dir="t"/>
+    </dgm:scene3d>
+    <dgm:sp3d/>
+    <dgm:txPr/>
+    <dgm:style>
+      <a:lnRef idx="2">
+        <a:scrgbClr r="0" g="0" b="0"/>
+      </a:lnRef>
+      <a:fillRef idx="1">
+        <a:scrgbClr r="0" g="0" b="0"/>
+      </a:fillRef>
+      <a:effectRef idx="0">
+        <a:scrgbClr r="0" g="0" b="0"/>
+      </a:effectRef>
+      <a:fontRef idx="minor"/>
+    </dgm:style>
+  </dgm:styleLbl>
+  <dgm:styleLbl name="bgAccFollowNode1">
+    <dgm:scene3d>
+      <a:camera prst="orthographicFront"/>
+      <a:lightRig rig="threePt" dir="t"/>
+    </dgm:scene3d>
+    <dgm:sp3d/>
+    <dgm:txPr/>
+    <dgm:style>
+      <a:lnRef idx="2">
+        <a:scrgbClr r="0" g="0" b="0"/>
+      </a:lnRef>
+      <a:fillRef idx="1">
+        <a:scrgbClr r="0" g="0" b="0"/>
+      </a:fillRef>
+      <a:effectRef idx="0">
+        <a:scrgbClr r="0" g="0" b="0"/>
+      </a:effectRef>
+      <a:fontRef idx="minor"/>
+    </dgm:style>
+  </dgm:styleLbl>
+  <dgm:styleLbl name="fgAcc0">
+    <dgm:scene3d>
+      <a:camera prst="orthographicFront"/>
+      <a:lightRig rig="threePt" dir="t"/>
+    </dgm:scene3d>
+    <dgm:sp3d/>
+    <dgm:txPr/>
+    <dgm:style>
+      <a:lnRef idx="2">
+        <a:scrgbClr r="0" g="0" b="0"/>
+      </a:lnRef>
+      <a:fillRef idx="1">
+        <a:scrgbClr r="0" g="0" b="0"/>
+      </a:fillRef>
+      <a:effectRef idx="0">
+        <a:scrgbClr r="0" g="0" b="0"/>
+      </a:effectRef>
+      <a:fontRef idx="minor"/>
+    </dgm:style>
+  </dgm:styleLbl>
+  <dgm:styleLbl name="fgAcc2">
+    <dgm:scene3d>
+      <a:camera prst="orthographicFront"/>
+      <a:lightRig rig="threePt" dir="t"/>
+    </dgm:scene3d>
+    <dgm:sp3d/>
+    <dgm:txPr/>
+    <dgm:style>
+      <a:lnRef idx="2">
+        <a:scrgbClr r="0" g="0" b="0"/>
+      </a:lnRef>
+      <a:fillRef idx="1">
+        <a:scrgbClr r="0" g="0" b="0"/>
+      </a:fillRef>
+      <a:effectRef idx="0">
+        <a:scrgbClr r="0" g="0" b="0"/>
+      </a:effectRef>
+      <a:fontRef idx="minor"/>
+    </dgm:style>
+  </dgm:styleLbl>
+  <dgm:styleLbl name="fgAcc3">
+    <dgm:scene3d>
+      <a:camera prst="orthographicFront"/>
+      <a:lightRig rig="threePt" dir="t"/>
+    </dgm:scene3d>
+    <dgm:sp3d/>
+    <dgm:txPr/>
+    <dgm:style>
+      <a:lnRef idx="2">
+        <a:scrgbClr r="0" g="0" b="0"/>
+      </a:lnRef>
+      <a:fillRef idx="1">
+        <a:scrgbClr r="0" g="0" b="0"/>
+      </a:fillRef>
+      <a:effectRef idx="0">
+        <a:scrgbClr r="0" g="0" b="0"/>
+      </a:effectRef>
+      <a:fontRef idx="minor"/>
+    </dgm:style>
+  </dgm:styleLbl>
+  <dgm:styleLbl name="fgAcc4">
+    <dgm:scene3d>
+      <a:camera prst="orthographicFront"/>
+      <a:lightRig rig="threePt" dir="t"/>
+    </dgm:scene3d>
+    <dgm:sp3d/>
+    <dgm:txPr/>
+    <dgm:style>
+      <a:lnRef idx="2">
+        <a:scrgbClr r="0" g="0" b="0"/>
+      </a:lnRef>
+      <a:fillRef idx="1">
+        <a:scrgbClr r="0" g="0" b="0"/>
+      </a:fillRef>
+      <a:effectRef idx="0">
+        <a:scrgbClr r="0" g="0" b="0"/>
+      </a:effectRef>
+      <a:fontRef idx="minor"/>
+    </dgm:style>
+  </dgm:styleLbl>
+  <dgm:styleLbl name="bgShp">
+    <dgm:scene3d>
+      <a:camera prst="orthographicFront"/>
+      <a:lightRig rig="threePt" dir="t"/>
+    </dgm:scene3d>
+    <dgm:sp3d/>
+    <dgm:txPr/>
+    <dgm:style>
+      <a:lnRef idx="0">
+        <a:scrgbClr r="0" g="0" b="0"/>
+      </a:lnRef>
+      <a:fillRef idx="1">
+        <a:scrgbClr r="0" g="0" b="0"/>
+      </a:fillRef>
+      <a:effectRef idx="0">
+        <a:scrgbClr r="0" g="0" b="0"/>
+      </a:effectRef>
+      <a:fontRef idx="minor"/>
+    </dgm:style>
+  </dgm:styleLbl>
+  <dgm:styleLbl name="dkBgShp">
+    <dgm:scene3d>
+      <a:camera prst="orthographicFront"/>
+      <a:lightRig rig="threePt" dir="t"/>
+    </dgm:scene3d>
+    <dgm:sp3d/>
+    <dgm:txPr/>
+    <dgm:style>
+      <a:lnRef idx="0">
+        <a:scrgbClr r="0" g="0" b="0"/>
+      </a:lnRef>
+      <a:fillRef idx="1">
+        <a:scrgbClr r="0" g="0" b="0"/>
+      </a:fillRef>
+      <a:effectRef idx="0">
+        <a:scrgbClr r="0" g="0" b="0"/>
+      </a:effectRef>
+      <a:fontRef idx="minor"/>
+    </dgm:style>
+  </dgm:styleLbl>
+  <dgm:styleLbl name="trBgShp">
+    <dgm:scene3d>
+      <a:camera prst="orthographicFront"/>
+      <a:lightRig rig="threePt" dir="t"/>
+    </dgm:scene3d>
+    <dgm:sp3d/>
+    <dgm:txPr/>
+    <dgm:style>
+      <a:lnRef idx="0">
+        <a:scrgbClr r="0" g="0" b="0"/>
+      </a:lnRef>
+      <a:fillRef idx="1">
+        <a:scrgbClr r="0" g="0" b="0"/>
+      </a:fillRef>
+      <a:effectRef idx="0">
+        <a:scrgbClr r="0" g="0" b="0"/>
+      </a:effectRef>
+      <a:fontRef idx="minor"/>
+    </dgm:style>
+  </dgm:styleLbl>
+  <dgm:styleLbl name="fgShp">
+    <dgm:scene3d>
+      <a:camera prst="orthographicFront"/>
+      <a:lightRig rig="threePt" dir="t"/>
+    </dgm:scene3d>
+    <dgm:sp3d/>
+    <dgm:txPr/>
+    <dgm:style>
+      <a:lnRef idx="2">
+        <a:scrgbClr r="0" g="0" b="0"/>
+      </a:lnRef>
+      <a:fillRef idx="1">
+        <a:scrgbClr r="0" g="0" b="0"/>
+      </a:fillRef>
+      <a:effectRef idx="0">
+        <a:scrgbClr r="0" g="0" b="0"/>
+      </a:effectRef>
+      <a:fontRef idx="minor"/>
+    </dgm:style>
+  </dgm:styleLbl>
+  <dgm:styleLbl name="revTx">
+    <dgm:scene3d>
+      <a:camera prst="orthographicFront"/>
+      <a:lightRig rig="threePt" dir="t"/>
+    </dgm:scene3d>
+    <dgm:sp3d/>
+    <dgm:txPr/>
+    <dgm:style>
+      <a:lnRef idx="0">
+        <a:scrgbClr r="0" g="0" b="0"/>
+      </a:lnRef>
+      <a:fillRef idx="0">
+        <a:scrgbClr r="0" g="0" b="0"/>
+      </a:fillRef>
+      <a:effectRef idx="0">
+        <a:scrgbClr r="0" g="0" b="0"/>
+      </a:effectRef>
+      <a:fontRef idx="minor"/>
+    </dgm:style>
+  </dgm:styleLbl>
+</dgm:styleDef>
+</file>
+
+<file path=ppt/diagrams/quickStyle3.xml><?xml version="1.0" encoding="utf-8"?>
 <dgm:styleDef xmlns:dgm="http://schemas.openxmlformats.org/drawingml/2006/diagram" xmlns:a="http://schemas.openxmlformats.org/drawingml/2006/main" uniqueId="urn:microsoft.com/office/officeart/2005/8/quickstyle/simple1">
   <dgm:title val=""/>
   <dgm:desc val=""/>
@@ -6723,7 +9754,7 @@
           <a:p>
             <a:fld id="{909B45E2-01E7-45BE-8601-658BCEA76055}" type="datetimeFigureOut">
               <a:rPr lang="en-US" smtClean="0"/>
-              <a:t>8/21/2019</a:t>
+              <a:t>8/22/19</a:t>
             </a:fld>
             <a:endParaRPr lang="en-US"/>
           </a:p>
@@ -6921,7 +9952,7 @@
           <a:p>
             <a:fld id="{909B45E2-01E7-45BE-8601-658BCEA76055}" type="datetimeFigureOut">
               <a:rPr lang="en-US" smtClean="0"/>
-              <a:t>8/21/2019</a:t>
+              <a:t>8/22/19</a:t>
             </a:fld>
             <a:endParaRPr lang="en-US"/>
           </a:p>
@@ -7129,7 +10160,7 @@
           <a:p>
             <a:fld id="{909B45E2-01E7-45BE-8601-658BCEA76055}" type="datetimeFigureOut">
               <a:rPr lang="en-US" smtClean="0"/>
-              <a:t>8/21/2019</a:t>
+              <a:t>8/22/19</a:t>
             </a:fld>
             <a:endParaRPr lang="en-US"/>
           </a:p>
@@ -7327,7 +10358,7 @@
           <a:p>
             <a:fld id="{909B45E2-01E7-45BE-8601-658BCEA76055}" type="datetimeFigureOut">
               <a:rPr lang="en-US" smtClean="0"/>
-              <a:t>8/21/2019</a:t>
+              <a:t>8/22/19</a:t>
             </a:fld>
             <a:endParaRPr lang="en-US"/>
           </a:p>
@@ -7602,7 +10633,7 @@
           <a:p>
             <a:fld id="{909B45E2-01E7-45BE-8601-658BCEA76055}" type="datetimeFigureOut">
               <a:rPr lang="en-US" smtClean="0"/>
-              <a:t>8/21/2019</a:t>
+              <a:t>8/22/19</a:t>
             </a:fld>
             <a:endParaRPr lang="en-US"/>
           </a:p>
@@ -7867,7 +10898,7 @@
           <a:p>
             <a:fld id="{909B45E2-01E7-45BE-8601-658BCEA76055}" type="datetimeFigureOut">
               <a:rPr lang="en-US" smtClean="0"/>
-              <a:t>8/21/2019</a:t>
+              <a:t>8/22/19</a:t>
             </a:fld>
             <a:endParaRPr lang="en-US"/>
           </a:p>
@@ -8279,7 +11310,7 @@
           <a:p>
             <a:fld id="{909B45E2-01E7-45BE-8601-658BCEA76055}" type="datetimeFigureOut">
               <a:rPr lang="en-US" smtClean="0"/>
-              <a:t>8/21/2019</a:t>
+              <a:t>8/22/19</a:t>
             </a:fld>
             <a:endParaRPr lang="en-US"/>
           </a:p>
@@ -8420,7 +11451,7 @@
           <a:p>
             <a:fld id="{909B45E2-01E7-45BE-8601-658BCEA76055}" type="datetimeFigureOut">
               <a:rPr lang="en-US" smtClean="0"/>
-              <a:t>8/21/2019</a:t>
+              <a:t>8/22/19</a:t>
             </a:fld>
             <a:endParaRPr lang="en-US"/>
           </a:p>
@@ -8533,7 +11564,7 @@
           <a:p>
             <a:fld id="{909B45E2-01E7-45BE-8601-658BCEA76055}" type="datetimeFigureOut">
               <a:rPr lang="en-US" smtClean="0"/>
-              <a:t>8/21/2019</a:t>
+              <a:t>8/22/19</a:t>
             </a:fld>
             <a:endParaRPr lang="en-US"/>
           </a:p>
@@ -8844,7 +11875,7 @@
           <a:p>
             <a:fld id="{909B45E2-01E7-45BE-8601-658BCEA76055}" type="datetimeFigureOut">
               <a:rPr lang="en-US" smtClean="0"/>
-              <a:t>8/21/2019</a:t>
+              <a:t>8/22/19</a:t>
             </a:fld>
             <a:endParaRPr lang="en-US"/>
           </a:p>
@@ -9132,7 +12163,7 @@
           <a:p>
             <a:fld id="{909B45E2-01E7-45BE-8601-658BCEA76055}" type="datetimeFigureOut">
               <a:rPr lang="en-US" smtClean="0"/>
-              <a:t>8/21/2019</a:t>
+              <a:t>8/22/19</a:t>
             </a:fld>
             <a:endParaRPr lang="en-US"/>
           </a:p>
@@ -9373,7 +12404,7 @@
           <a:p>
             <a:fld id="{909B45E2-01E7-45BE-8601-658BCEA76055}" type="datetimeFigureOut">
               <a:rPr lang="en-US" smtClean="0"/>
-              <a:t>8/21/2019</a:t>
+              <a:t>8/22/19</a:t>
             </a:fld>
             <a:endParaRPr lang="en-US"/>
           </a:p>
@@ -9938,7 +12969,7 @@
           <p:nvPr>
             <p:extLst>
               <p:ext uri="{D42A27DB-BD31-4B8C-83A1-F6EECF244321}">
-                <p14:modId xmlns:p14="http://schemas.microsoft.com/office/powerpoint/2010/main" val="52209672"/>
+                <p14:modId xmlns:p14="http://schemas.microsoft.com/office/powerpoint/2010/main" val="4139095478"/>
               </p:ext>
             </p:extLst>
           </p:nvPr>
@@ -10063,7 +13094,7 @@
           <p:nvPr>
             <p:extLst>
               <p:ext uri="{D42A27DB-BD31-4B8C-83A1-F6EECF244321}">
-                <p14:modId xmlns:p14="http://schemas.microsoft.com/office/powerpoint/2010/main" val="3133385866"/>
+                <p14:modId xmlns:p14="http://schemas.microsoft.com/office/powerpoint/2010/main" val="1010795437"/>
               </p:ext>
             </p:extLst>
           </p:nvPr>
@@ -10191,6 +13222,928 @@
           <a:chExt cx="0" cy="0"/>
         </a:xfrm>
       </p:grpSpPr>
+      <p:graphicFrame>
+        <p:nvGraphicFramePr>
+          <p:cNvPr id="4" name="Diagram 3">
+            <a:extLst>
+              <a:ext uri="{FF2B5EF4-FFF2-40B4-BE49-F238E27FC236}">
+                <a16:creationId xmlns:a16="http://schemas.microsoft.com/office/drawing/2014/main" id="{3B0A77BD-653A-4720-9F25-E05EEA59C1C2}"/>
+              </a:ext>
+            </a:extLst>
+          </p:cNvPr>
+          <p:cNvGraphicFramePr/>
+          <p:nvPr>
+            <p:extLst>
+              <p:ext uri="{D42A27DB-BD31-4B8C-83A1-F6EECF244321}">
+                <p14:modId xmlns:p14="http://schemas.microsoft.com/office/powerpoint/2010/main" val="309586699"/>
+              </p:ext>
+            </p:extLst>
+          </p:nvPr>
+        </p:nvGraphicFramePr>
+        <p:xfrm>
+          <a:off x="2032000" y="1567805"/>
+          <a:ext cx="8128000" cy="5418667"/>
+        </p:xfrm>
+        <a:graphic>
+          <a:graphicData uri="http://schemas.openxmlformats.org/drawingml/2006/diagram">
+            <dgm:relIds xmlns:dgm="http://schemas.openxmlformats.org/drawingml/2006/diagram" xmlns:r="http://schemas.openxmlformats.org/officeDocument/2006/relationships" r:dm="rId2" r:lo="rId3" r:qs="rId4" r:cs="rId5"/>
+          </a:graphicData>
+        </a:graphic>
+      </p:graphicFrame>
+      <p:sp>
+        <p:nvSpPr>
+          <p:cNvPr id="5" name="Rectangle 4">
+            <a:extLst>
+              <a:ext uri="{FF2B5EF4-FFF2-40B4-BE49-F238E27FC236}">
+                <a16:creationId xmlns:a16="http://schemas.microsoft.com/office/drawing/2014/main" id="{1C9B0859-A01B-402B-8C60-F50FABB916F0}"/>
+              </a:ext>
+            </a:extLst>
+          </p:cNvPr>
+          <p:cNvSpPr/>
+          <p:nvPr/>
+        </p:nvSpPr>
+        <p:spPr>
+          <a:xfrm>
+            <a:off x="3250033" y="258001"/>
+            <a:ext cx="5691944" cy="1754326"/>
+          </a:xfrm>
+          <a:prstGeom prst="rect">
+            <a:avLst/>
+          </a:prstGeom>
+          <a:noFill/>
+        </p:spPr>
+        <p:txBody>
+          <a:bodyPr wrap="none" lIns="91440" tIns="45720" rIns="91440" bIns="45720">
+            <a:spAutoFit/>
+          </a:bodyPr>
+          <a:lstStyle/>
+          <a:p>
+            <a:pPr algn="ctr"/>
+            <a:r>
+              <a:rPr lang="en-US" sz="5400" b="0" cap="none" spc="0" dirty="0">
+                <a:ln w="0"/>
+                <a:solidFill>
+                  <a:schemeClr val="accent6"/>
+                </a:solidFill>
+                <a:effectLst>
+                  <a:outerShdw blurRad="38100" dist="25400" dir="5400000" algn="ctr" rotWithShape="0">
+                    <a:srgbClr val="6E747A">
+                      <a:alpha val="43000"/>
+                    </a:srgbClr>
+                  </a:outerShdw>
+                </a:effectLst>
+              </a:rPr>
+              <a:t>Positive Testing Set </a:t>
+            </a:r>
+          </a:p>
+          <a:p>
+            <a:pPr algn="ctr"/>
+            <a:r>
+              <a:rPr lang="en-US" sz="5400" b="0" cap="none" spc="0" dirty="0">
+                <a:ln w="0"/>
+                <a:solidFill>
+                  <a:schemeClr val="accent6"/>
+                </a:solidFill>
+                <a:effectLst>
+                  <a:outerShdw blurRad="38100" dist="25400" dir="5400000" algn="ctr" rotWithShape="0">
+                    <a:srgbClr val="6E747A">
+                      <a:alpha val="43000"/>
+                    </a:srgbClr>
+                  </a:outerShdw>
+                </a:effectLst>
+              </a:rPr>
+              <a:t>(Enhancer -&gt; 1) </a:t>
+            </a:r>
+          </a:p>
+        </p:txBody>
+      </p:sp>
+    </p:spTree>
+    <p:extLst>
+      <p:ext uri="{BB962C8B-B14F-4D97-AF65-F5344CB8AC3E}">
+        <p14:creationId xmlns:p14="http://schemas.microsoft.com/office/powerpoint/2010/main" val="298117608"/>
+      </p:ext>
+    </p:extLst>
+  </p:cSld>
+  <p:clrMapOvr>
+    <a:masterClrMapping/>
+  </p:clrMapOvr>
+</p:sld>
+</file>
+
+<file path=ppt/slides/slide5.xml><?xml version="1.0" encoding="utf-8"?>
+<p:sld xmlns:a="http://schemas.openxmlformats.org/drawingml/2006/main" xmlns:r="http://schemas.openxmlformats.org/officeDocument/2006/relationships" xmlns:p="http://schemas.openxmlformats.org/presentationml/2006/main">
+  <p:cSld>
+    <p:spTree>
+      <p:nvGrpSpPr>
+        <p:cNvPr id="1" name=""/>
+        <p:cNvGrpSpPr/>
+        <p:nvPr/>
+      </p:nvGrpSpPr>
+      <p:grpSpPr>
+        <a:xfrm>
+          <a:off x="0" y="0"/>
+          <a:ext cx="0" cy="0"/>
+          <a:chOff x="0" y="0"/>
+          <a:chExt cx="0" cy="0"/>
+        </a:xfrm>
+      </p:grpSpPr>
+      <p:pic>
+        <p:nvPicPr>
+          <p:cNvPr id="5" name="Graphic 4" descr="Database">
+            <a:extLst>
+              <a:ext uri="{FF2B5EF4-FFF2-40B4-BE49-F238E27FC236}">
+                <a16:creationId xmlns:a16="http://schemas.microsoft.com/office/drawing/2014/main" id="{A4A36369-0C6F-B340-B9A8-775B1650373E}"/>
+              </a:ext>
+            </a:extLst>
+          </p:cNvPr>
+          <p:cNvPicPr>
+            <a:picLocks noChangeAspect="1"/>
+          </p:cNvPicPr>
+          <p:nvPr/>
+        </p:nvPicPr>
+        <p:blipFill>
+          <a:blip r:embed="rId2">
+            <a:extLst>
+              <a:ext uri="{28A0092B-C50C-407E-A947-70E740481C1C}">
+                <a14:useLocalDpi xmlns:a14="http://schemas.microsoft.com/office/drawing/2010/main" val="0"/>
+              </a:ext>
+              <a:ext uri="{96DAC541-7B7A-43D3-8B79-37D633B846F1}">
+                <asvg:svgBlip xmlns:asvg="http://schemas.microsoft.com/office/drawing/2016/SVG/main" r:embed="rId3"/>
+              </a:ext>
+            </a:extLst>
+          </a:blip>
+          <a:stretch>
+            <a:fillRect/>
+          </a:stretch>
+        </p:blipFill>
+        <p:spPr>
+          <a:xfrm>
+            <a:off x="211116" y="1203960"/>
+            <a:ext cx="1466088" cy="1466088"/>
+          </a:xfrm>
+          <a:prstGeom prst="rect">
+            <a:avLst/>
+          </a:prstGeom>
+        </p:spPr>
+      </p:pic>
+      <p:pic>
+        <p:nvPicPr>
+          <p:cNvPr id="1026" name="Picture 2" descr="ENCODE">
+            <a:extLst>
+              <a:ext uri="{FF2B5EF4-FFF2-40B4-BE49-F238E27FC236}">
+                <a16:creationId xmlns:a16="http://schemas.microsoft.com/office/drawing/2014/main" id="{5BF94698-9865-F046-AAD0-EAD2B7FF23E5}"/>
+              </a:ext>
+            </a:extLst>
+          </p:cNvPr>
+          <p:cNvPicPr>
+            <a:picLocks noChangeAspect="1" noChangeArrowheads="1"/>
+          </p:cNvPicPr>
+          <p:nvPr/>
+        </p:nvPicPr>
+        <p:blipFill>
+          <a:blip r:embed="rId4">
+            <a:extLst>
+              <a:ext uri="{28A0092B-C50C-407E-A947-70E740481C1C}">
+                <a14:useLocalDpi xmlns:a14="http://schemas.microsoft.com/office/drawing/2010/main" val="0"/>
+              </a:ext>
+            </a:extLst>
+          </a:blip>
+          <a:srcRect/>
+          <a:stretch>
+            <a:fillRect/>
+          </a:stretch>
+        </p:blipFill>
+        <p:spPr bwMode="auto">
+          <a:xfrm>
+            <a:off x="344424" y="528066"/>
+            <a:ext cx="1199473" cy="696468"/>
+          </a:xfrm>
+          <a:prstGeom prst="rect">
+            <a:avLst/>
+          </a:prstGeom>
+          <a:noFill/>
+          <a:extLst>
+            <a:ext uri="{909E8E84-426E-40DD-AFC4-6F175D3DCCD1}">
+              <a14:hiddenFill xmlns:a14="http://schemas.microsoft.com/office/drawing/2010/main">
+                <a:solidFill>
+                  <a:srgbClr val="FFFFFF"/>
+                </a:solidFill>
+              </a14:hiddenFill>
+            </a:ext>
+          </a:extLst>
+        </p:spPr>
+      </p:pic>
+      <p:pic>
+        <p:nvPicPr>
+          <p:cNvPr id="1028" name="Picture 4" descr="See the source image">
+            <a:extLst>
+              <a:ext uri="{FF2B5EF4-FFF2-40B4-BE49-F238E27FC236}">
+                <a16:creationId xmlns:a16="http://schemas.microsoft.com/office/drawing/2014/main" id="{3762094F-7716-FC4E-8777-9DFDC91B0D01}"/>
+              </a:ext>
+            </a:extLst>
+          </p:cNvPr>
+          <p:cNvPicPr>
+            <a:picLocks noChangeAspect="1" noChangeArrowheads="1"/>
+          </p:cNvPicPr>
+          <p:nvPr/>
+        </p:nvPicPr>
+        <p:blipFill>
+          <a:blip r:embed="rId5">
+            <a:extLst>
+              <a:ext uri="{28A0092B-C50C-407E-A947-70E740481C1C}">
+                <a14:useLocalDpi xmlns:a14="http://schemas.microsoft.com/office/drawing/2010/main" val="0"/>
+              </a:ext>
+            </a:extLst>
+          </a:blip>
+          <a:srcRect/>
+          <a:stretch>
+            <a:fillRect/>
+          </a:stretch>
+        </p:blipFill>
+        <p:spPr bwMode="auto">
+          <a:xfrm>
+            <a:off x="2886456" y="723900"/>
+            <a:ext cx="1213104" cy="1213104"/>
+          </a:xfrm>
+          <a:prstGeom prst="rect">
+            <a:avLst/>
+          </a:prstGeom>
+          <a:noFill/>
+          <a:extLst>
+            <a:ext uri="{909E8E84-426E-40DD-AFC4-6F175D3DCCD1}">
+              <a14:hiddenFill xmlns:a14="http://schemas.microsoft.com/office/drawing/2010/main">
+                <a:solidFill>
+                  <a:srgbClr val="FFFFFF"/>
+                </a:solidFill>
+              </a14:hiddenFill>
+            </a:ext>
+          </a:extLst>
+        </p:spPr>
+      </p:pic>
+      <p:pic>
+        <p:nvPicPr>
+          <p:cNvPr id="9" name="Graphic 8" descr="Line arrow: Straight">
+            <a:extLst>
+              <a:ext uri="{FF2B5EF4-FFF2-40B4-BE49-F238E27FC236}">
+                <a16:creationId xmlns:a16="http://schemas.microsoft.com/office/drawing/2014/main" id="{506DD1C2-9ED6-8943-9EEF-35DF73D3AC4C}"/>
+              </a:ext>
+            </a:extLst>
+          </p:cNvPr>
+          <p:cNvPicPr>
+            <a:picLocks noChangeAspect="1"/>
+          </p:cNvPicPr>
+          <p:nvPr/>
+        </p:nvPicPr>
+        <p:blipFill>
+          <a:blip r:embed="rId6">
+            <a:extLst>
+              <a:ext uri="{28A0092B-C50C-407E-A947-70E740481C1C}">
+                <a14:useLocalDpi xmlns:a14="http://schemas.microsoft.com/office/drawing/2010/main" val="0"/>
+              </a:ext>
+              <a:ext uri="{96DAC541-7B7A-43D3-8B79-37D633B846F1}">
+                <asvg:svgBlip xmlns:asvg="http://schemas.microsoft.com/office/drawing/2016/SVG/main" r:embed="rId7"/>
+              </a:ext>
+            </a:extLst>
+          </a:blip>
+          <a:stretch>
+            <a:fillRect/>
+          </a:stretch>
+        </p:blipFill>
+        <p:spPr>
+          <a:xfrm rot="10800000">
+            <a:off x="1613740" y="1022604"/>
+            <a:ext cx="1058636" cy="914400"/>
+          </a:xfrm>
+          <a:prstGeom prst="rect">
+            <a:avLst/>
+          </a:prstGeom>
+        </p:spPr>
+      </p:pic>
+      <p:sp>
+        <p:nvSpPr>
+          <p:cNvPr id="10" name="Rectangle 9">
+            <a:extLst>
+              <a:ext uri="{FF2B5EF4-FFF2-40B4-BE49-F238E27FC236}">
+                <a16:creationId xmlns:a16="http://schemas.microsoft.com/office/drawing/2014/main" id="{2CCF3D53-3C24-9C43-859B-A315709CE45E}"/>
+              </a:ext>
+            </a:extLst>
+          </p:cNvPr>
+          <p:cNvSpPr/>
+          <p:nvPr/>
+        </p:nvSpPr>
+        <p:spPr>
+          <a:xfrm>
+            <a:off x="2973475" y="2077319"/>
+            <a:ext cx="1039066" cy="307777"/>
+          </a:xfrm>
+          <a:prstGeom prst="rect">
+            <a:avLst/>
+          </a:prstGeom>
+          <a:noFill/>
+        </p:spPr>
+        <p:txBody>
+          <a:bodyPr wrap="none" lIns="91440" tIns="45720" rIns="91440" bIns="45720">
+            <a:spAutoFit/>
+          </a:bodyPr>
+          <a:lstStyle/>
+          <a:p>
+            <a:pPr algn="ctr"/>
+            <a:r>
+              <a:rPr lang="en-US" sz="1400" b="0" cap="none" spc="0" dirty="0">
+                <a:ln w="0"/>
+                <a:solidFill>
+                  <a:schemeClr val="tx1"/>
+                </a:solidFill>
+                <a:effectLst>
+                  <a:outerShdw blurRad="38100" dist="19050" dir="2700000" algn="tl" rotWithShape="0">
+                    <a:schemeClr val="dk1">
+                      <a:alpha val="40000"/>
+                    </a:schemeClr>
+                  </a:outerShdw>
+                </a:effectLst>
+              </a:rPr>
+              <a:t>H1 Cell Line</a:t>
+            </a:r>
+          </a:p>
+        </p:txBody>
+      </p:sp>
+      <p:pic>
+        <p:nvPicPr>
+          <p:cNvPr id="13" name="Graphic 12" descr="Line arrow: Straight">
+            <a:extLst>
+              <a:ext uri="{FF2B5EF4-FFF2-40B4-BE49-F238E27FC236}">
+                <a16:creationId xmlns:a16="http://schemas.microsoft.com/office/drawing/2014/main" id="{363AFA68-8EC1-3D40-BBBE-970400544887}"/>
+              </a:ext>
+            </a:extLst>
+          </p:cNvPr>
+          <p:cNvPicPr>
+            <a:picLocks noChangeAspect="1"/>
+          </p:cNvPicPr>
+          <p:nvPr/>
+        </p:nvPicPr>
+        <p:blipFill>
+          <a:blip r:embed="rId6">
+            <a:extLst>
+              <a:ext uri="{28A0092B-C50C-407E-A947-70E740481C1C}">
+                <a14:useLocalDpi xmlns:a14="http://schemas.microsoft.com/office/drawing/2010/main" val="0"/>
+              </a:ext>
+              <a:ext uri="{96DAC541-7B7A-43D3-8B79-37D633B846F1}">
+                <asvg:svgBlip xmlns:asvg="http://schemas.microsoft.com/office/drawing/2016/SVG/main" r:embed="rId7"/>
+              </a:ext>
+            </a:extLst>
+          </a:blip>
+          <a:stretch>
+            <a:fillRect/>
+          </a:stretch>
+        </p:blipFill>
+        <p:spPr>
+          <a:xfrm rot="10800000">
+            <a:off x="4259898" y="1049069"/>
+            <a:ext cx="1124389" cy="914400"/>
+          </a:xfrm>
+          <a:prstGeom prst="rect">
+            <a:avLst/>
+          </a:prstGeom>
+        </p:spPr>
+      </p:pic>
+      <p:pic>
+        <p:nvPicPr>
+          <p:cNvPr id="12" name="Graphic 11" descr="List">
+            <a:extLst>
+              <a:ext uri="{FF2B5EF4-FFF2-40B4-BE49-F238E27FC236}">
+                <a16:creationId xmlns:a16="http://schemas.microsoft.com/office/drawing/2014/main" id="{16E22206-5B7D-A145-8A3C-C086B6CE502F}"/>
+              </a:ext>
+            </a:extLst>
+          </p:cNvPr>
+          <p:cNvPicPr>
+            <a:picLocks noChangeAspect="1"/>
+          </p:cNvPicPr>
+          <p:nvPr/>
+        </p:nvPicPr>
+        <p:blipFill>
+          <a:blip r:embed="rId8">
+            <a:extLst>
+              <a:ext uri="{28A0092B-C50C-407E-A947-70E740481C1C}">
+                <a14:useLocalDpi xmlns:a14="http://schemas.microsoft.com/office/drawing/2010/main" val="0"/>
+              </a:ext>
+              <a:ext uri="{96DAC541-7B7A-43D3-8B79-37D633B846F1}">
+                <asvg:svgBlip xmlns:asvg="http://schemas.microsoft.com/office/drawing/2016/SVG/main" r:embed="rId9"/>
+              </a:ext>
+            </a:extLst>
+          </a:blip>
+          <a:stretch>
+            <a:fillRect/>
+          </a:stretch>
+        </p:blipFill>
+        <p:spPr>
+          <a:xfrm>
+            <a:off x="5490887" y="2002607"/>
+            <a:ext cx="914400" cy="914400"/>
+          </a:xfrm>
+          <a:prstGeom prst="rect">
+            <a:avLst/>
+          </a:prstGeom>
+        </p:spPr>
+      </p:pic>
+      <p:pic>
+        <p:nvPicPr>
+          <p:cNvPr id="16" name="Graphic 15" descr="List">
+            <a:extLst>
+              <a:ext uri="{FF2B5EF4-FFF2-40B4-BE49-F238E27FC236}">
+                <a16:creationId xmlns:a16="http://schemas.microsoft.com/office/drawing/2014/main" id="{01B06C1E-45E0-1D43-A3A9-CAACCAA81528}"/>
+              </a:ext>
+            </a:extLst>
+          </p:cNvPr>
+          <p:cNvPicPr>
+            <a:picLocks noChangeAspect="1"/>
+          </p:cNvPicPr>
+          <p:nvPr/>
+        </p:nvPicPr>
+        <p:blipFill>
+          <a:blip r:embed="rId8">
+            <a:extLst>
+              <a:ext uri="{28A0092B-C50C-407E-A947-70E740481C1C}">
+                <a14:useLocalDpi xmlns:a14="http://schemas.microsoft.com/office/drawing/2010/main" val="0"/>
+              </a:ext>
+              <a:ext uri="{96DAC541-7B7A-43D3-8B79-37D633B846F1}">
+                <asvg:svgBlip xmlns:asvg="http://schemas.microsoft.com/office/drawing/2016/SVG/main" r:embed="rId9"/>
+              </a:ext>
+            </a:extLst>
+          </a:blip>
+          <a:stretch>
+            <a:fillRect/>
+          </a:stretch>
+        </p:blipFill>
+        <p:spPr>
+          <a:xfrm>
+            <a:off x="5490887" y="1022604"/>
+            <a:ext cx="914400" cy="914400"/>
+          </a:xfrm>
+          <a:prstGeom prst="rect">
+            <a:avLst/>
+          </a:prstGeom>
+        </p:spPr>
+      </p:pic>
+      <p:pic>
+        <p:nvPicPr>
+          <p:cNvPr id="17" name="Graphic 16" descr="List">
+            <a:extLst>
+              <a:ext uri="{FF2B5EF4-FFF2-40B4-BE49-F238E27FC236}">
+                <a16:creationId xmlns:a16="http://schemas.microsoft.com/office/drawing/2014/main" id="{A67041DE-538F-FF4E-91A4-72468F73186F}"/>
+              </a:ext>
+            </a:extLst>
+          </p:cNvPr>
+          <p:cNvPicPr>
+            <a:picLocks noChangeAspect="1"/>
+          </p:cNvPicPr>
+          <p:nvPr/>
+        </p:nvPicPr>
+        <p:blipFill>
+          <a:blip r:embed="rId8">
+            <a:extLst>
+              <a:ext uri="{28A0092B-C50C-407E-A947-70E740481C1C}">
+                <a14:useLocalDpi xmlns:a14="http://schemas.microsoft.com/office/drawing/2010/main" val="0"/>
+              </a:ext>
+              <a:ext uri="{96DAC541-7B7A-43D3-8B79-37D633B846F1}">
+                <asvg:svgBlip xmlns:asvg="http://schemas.microsoft.com/office/drawing/2016/SVG/main" r:embed="rId9"/>
+              </a:ext>
+            </a:extLst>
+          </a:blip>
+          <a:stretch>
+            <a:fillRect/>
+          </a:stretch>
+        </p:blipFill>
+        <p:spPr>
+          <a:xfrm>
+            <a:off x="5490887" y="2917007"/>
+            <a:ext cx="914400" cy="914400"/>
+          </a:xfrm>
+          <a:prstGeom prst="rect">
+            <a:avLst/>
+          </a:prstGeom>
+        </p:spPr>
+      </p:pic>
+      <p:pic>
+        <p:nvPicPr>
+          <p:cNvPr id="19" name="Graphic 18" descr="List">
+            <a:extLst>
+              <a:ext uri="{FF2B5EF4-FFF2-40B4-BE49-F238E27FC236}">
+                <a16:creationId xmlns:a16="http://schemas.microsoft.com/office/drawing/2014/main" id="{F21AA5F8-8123-A64F-9ABD-7CBEFD8D0DD2}"/>
+              </a:ext>
+            </a:extLst>
+          </p:cNvPr>
+          <p:cNvPicPr>
+            <a:picLocks noChangeAspect="1"/>
+          </p:cNvPicPr>
+          <p:nvPr/>
+        </p:nvPicPr>
+        <p:blipFill>
+          <a:blip r:embed="rId8">
+            <a:extLst>
+              <a:ext uri="{28A0092B-C50C-407E-A947-70E740481C1C}">
+                <a14:useLocalDpi xmlns:a14="http://schemas.microsoft.com/office/drawing/2010/main" val="0"/>
+              </a:ext>
+              <a:ext uri="{96DAC541-7B7A-43D3-8B79-37D633B846F1}">
+                <asvg:svgBlip xmlns:asvg="http://schemas.microsoft.com/office/drawing/2016/SVG/main" r:embed="rId9"/>
+              </a:ext>
+            </a:extLst>
+          </a:blip>
+          <a:stretch>
+            <a:fillRect/>
+          </a:stretch>
+        </p:blipFill>
+        <p:spPr>
+          <a:xfrm>
+            <a:off x="5490887" y="108203"/>
+            <a:ext cx="914400" cy="914400"/>
+          </a:xfrm>
+          <a:prstGeom prst="rect">
+            <a:avLst/>
+          </a:prstGeom>
+        </p:spPr>
+      </p:pic>
+      <p:sp>
+        <p:nvSpPr>
+          <p:cNvPr id="23" name="Rectangle 22">
+            <a:extLst>
+              <a:ext uri="{FF2B5EF4-FFF2-40B4-BE49-F238E27FC236}">
+                <a16:creationId xmlns:a16="http://schemas.microsoft.com/office/drawing/2014/main" id="{7953912F-C24F-DE41-963B-31EDFFDF58B5}"/>
+              </a:ext>
+            </a:extLst>
+          </p:cNvPr>
+          <p:cNvSpPr/>
+          <p:nvPr/>
+        </p:nvSpPr>
+        <p:spPr>
+          <a:xfrm>
+            <a:off x="6439927" y="2270884"/>
+            <a:ext cx="896399" cy="307777"/>
+          </a:xfrm>
+          <a:prstGeom prst="rect">
+            <a:avLst/>
+          </a:prstGeom>
+          <a:noFill/>
+        </p:spPr>
+        <p:txBody>
+          <a:bodyPr wrap="none" lIns="91440" tIns="45720" rIns="91440" bIns="45720">
+            <a:spAutoFit/>
+          </a:bodyPr>
+          <a:lstStyle/>
+          <a:p>
+            <a:pPr algn="ctr"/>
+            <a:r>
+              <a:rPr lang="en-US" sz="1400" b="0" cap="none" spc="0" dirty="0">
+                <a:ln w="0"/>
+                <a:solidFill>
+                  <a:schemeClr val="tx1"/>
+                </a:solidFill>
+                <a:effectLst>
+                  <a:outerShdw blurRad="38100" dist="19050" dir="2700000" algn="tl" rotWithShape="0">
+                    <a:schemeClr val="dk1">
+                      <a:alpha val="40000"/>
+                    </a:schemeClr>
+                  </a:outerShdw>
+                </a:effectLst>
+              </a:rPr>
+              <a:t>H3K4me2</a:t>
+            </a:r>
+          </a:p>
+        </p:txBody>
+      </p:sp>
+      <p:sp>
+        <p:nvSpPr>
+          <p:cNvPr id="24" name="Rectangle 23">
+            <a:extLst>
+              <a:ext uri="{FF2B5EF4-FFF2-40B4-BE49-F238E27FC236}">
+                <a16:creationId xmlns:a16="http://schemas.microsoft.com/office/drawing/2014/main" id="{7E16B4DD-E74B-2B4B-9194-737FE100FA09}"/>
+              </a:ext>
+            </a:extLst>
+          </p:cNvPr>
+          <p:cNvSpPr/>
+          <p:nvPr/>
+        </p:nvSpPr>
+        <p:spPr>
+          <a:xfrm>
+            <a:off x="6475130" y="1325914"/>
+            <a:ext cx="896399" cy="307777"/>
+          </a:xfrm>
+          <a:prstGeom prst="rect">
+            <a:avLst/>
+          </a:prstGeom>
+          <a:noFill/>
+        </p:spPr>
+        <p:txBody>
+          <a:bodyPr wrap="none" lIns="91440" tIns="45720" rIns="91440" bIns="45720">
+            <a:spAutoFit/>
+          </a:bodyPr>
+          <a:lstStyle/>
+          <a:p>
+            <a:pPr algn="ctr"/>
+            <a:r>
+              <a:rPr lang="en-US" sz="1400" b="0" cap="none" spc="0" dirty="0">
+                <a:ln w="0"/>
+                <a:solidFill>
+                  <a:schemeClr val="tx1"/>
+                </a:solidFill>
+                <a:effectLst>
+                  <a:outerShdw blurRad="38100" dist="19050" dir="2700000" algn="tl" rotWithShape="0">
+                    <a:schemeClr val="dk1">
+                      <a:alpha val="40000"/>
+                    </a:schemeClr>
+                  </a:outerShdw>
+                </a:effectLst>
+              </a:rPr>
+              <a:t>H3K4me1</a:t>
+            </a:r>
+          </a:p>
+        </p:txBody>
+      </p:sp>
+      <p:sp>
+        <p:nvSpPr>
+          <p:cNvPr id="25" name="Rectangle 24">
+            <a:extLst>
+              <a:ext uri="{FF2B5EF4-FFF2-40B4-BE49-F238E27FC236}">
+                <a16:creationId xmlns:a16="http://schemas.microsoft.com/office/drawing/2014/main" id="{69230FB3-4A3E-A249-8935-473056F9200C}"/>
+              </a:ext>
+            </a:extLst>
+          </p:cNvPr>
+          <p:cNvSpPr/>
+          <p:nvPr/>
+        </p:nvSpPr>
+        <p:spPr>
+          <a:xfrm>
+            <a:off x="6511886" y="471059"/>
+            <a:ext cx="825868" cy="307777"/>
+          </a:xfrm>
+          <a:prstGeom prst="rect">
+            <a:avLst/>
+          </a:prstGeom>
+          <a:noFill/>
+        </p:spPr>
+        <p:txBody>
+          <a:bodyPr wrap="none" lIns="91440" tIns="45720" rIns="91440" bIns="45720">
+            <a:spAutoFit/>
+          </a:bodyPr>
+          <a:lstStyle/>
+          <a:p>
+            <a:pPr algn="ctr"/>
+            <a:r>
+              <a:rPr lang="en-US" sz="1400" b="0" cap="none" spc="0" dirty="0">
+                <a:ln w="0"/>
+                <a:solidFill>
+                  <a:schemeClr val="tx1"/>
+                </a:solidFill>
+                <a:effectLst>
+                  <a:outerShdw blurRad="38100" dist="19050" dir="2700000" algn="tl" rotWithShape="0">
+                    <a:schemeClr val="dk1">
+                      <a:alpha val="40000"/>
+                    </a:schemeClr>
+                  </a:outerShdw>
+                </a:effectLst>
+              </a:rPr>
+              <a:t>H3K27ac</a:t>
+            </a:r>
+          </a:p>
+        </p:txBody>
+      </p:sp>
+      <p:sp>
+        <p:nvSpPr>
+          <p:cNvPr id="26" name="Rectangle 25">
+            <a:extLst>
+              <a:ext uri="{FF2B5EF4-FFF2-40B4-BE49-F238E27FC236}">
+                <a16:creationId xmlns:a16="http://schemas.microsoft.com/office/drawing/2014/main" id="{08EA1EE7-F468-C343-87BE-F2BD2A52B77A}"/>
+              </a:ext>
+            </a:extLst>
+          </p:cNvPr>
+          <p:cNvSpPr/>
+          <p:nvPr/>
+        </p:nvSpPr>
+        <p:spPr>
+          <a:xfrm>
+            <a:off x="6439927" y="3215854"/>
+            <a:ext cx="896399" cy="307777"/>
+          </a:xfrm>
+          <a:prstGeom prst="rect">
+            <a:avLst/>
+          </a:prstGeom>
+          <a:noFill/>
+        </p:spPr>
+        <p:txBody>
+          <a:bodyPr wrap="none" lIns="91440" tIns="45720" rIns="91440" bIns="45720">
+            <a:spAutoFit/>
+          </a:bodyPr>
+          <a:lstStyle/>
+          <a:p>
+            <a:pPr algn="ctr"/>
+            <a:r>
+              <a:rPr lang="en-US" sz="1400" b="0" cap="none" spc="0" dirty="0">
+                <a:ln w="0"/>
+                <a:solidFill>
+                  <a:schemeClr val="tx1"/>
+                </a:solidFill>
+                <a:effectLst>
+                  <a:outerShdw blurRad="38100" dist="19050" dir="2700000" algn="tl" rotWithShape="0">
+                    <a:schemeClr val="dk1">
+                      <a:alpha val="40000"/>
+                    </a:schemeClr>
+                  </a:outerShdw>
+                </a:effectLst>
+              </a:rPr>
+              <a:t>H3K4me3</a:t>
+            </a:r>
+          </a:p>
+        </p:txBody>
+      </p:sp>
+      <p:sp>
+        <p:nvSpPr>
+          <p:cNvPr id="27" name="Rectangle 26">
+            <a:extLst>
+              <a:ext uri="{FF2B5EF4-FFF2-40B4-BE49-F238E27FC236}">
+                <a16:creationId xmlns:a16="http://schemas.microsoft.com/office/drawing/2014/main" id="{3A7B0F5B-82EA-A34B-8C22-FA8FFA5251B7}"/>
+              </a:ext>
+            </a:extLst>
+          </p:cNvPr>
+          <p:cNvSpPr/>
+          <p:nvPr/>
+        </p:nvSpPr>
+        <p:spPr>
+          <a:xfrm>
+            <a:off x="4174854" y="850950"/>
+            <a:ext cx="1209434" cy="523220"/>
+          </a:xfrm>
+          <a:prstGeom prst="rect">
+            <a:avLst/>
+          </a:prstGeom>
+          <a:noFill/>
+        </p:spPr>
+        <p:txBody>
+          <a:bodyPr wrap="none" lIns="91440" tIns="45720" rIns="91440" bIns="45720">
+            <a:spAutoFit/>
+          </a:bodyPr>
+          <a:lstStyle/>
+          <a:p>
+            <a:pPr algn="ctr"/>
+            <a:r>
+              <a:rPr lang="en-US" sz="1400" b="0" cap="none" spc="0" dirty="0" err="1">
+                <a:ln w="0"/>
+                <a:solidFill>
+                  <a:schemeClr val="tx1"/>
+                </a:solidFill>
+                <a:effectLst>
+                  <a:outerShdw blurRad="38100" dist="19050" dir="2700000" algn="tl" rotWithShape="0">
+                    <a:schemeClr val="dk1">
+                      <a:alpha val="40000"/>
+                    </a:schemeClr>
+                  </a:outerShdw>
+                </a:effectLst>
+              </a:rPr>
+              <a:t>ChIP</a:t>
+            </a:r>
+            <a:r>
+              <a:rPr lang="en-US" sz="1400" b="0" cap="none" spc="0" dirty="0">
+                <a:ln w="0"/>
+                <a:solidFill>
+                  <a:schemeClr val="tx1"/>
+                </a:solidFill>
+                <a:effectLst>
+                  <a:outerShdw blurRad="38100" dist="19050" dir="2700000" algn="tl" rotWithShape="0">
+                    <a:schemeClr val="dk1">
+                      <a:alpha val="40000"/>
+                    </a:schemeClr>
+                  </a:outerShdw>
+                </a:effectLst>
+              </a:rPr>
+              <a:t>-Seq Data</a:t>
+            </a:r>
+          </a:p>
+          <a:p>
+            <a:pPr algn="ctr"/>
+            <a:r>
+              <a:rPr lang="en-US" sz="1400" dirty="0">
+                <a:ln w="0"/>
+                <a:effectLst>
+                  <a:outerShdw blurRad="38100" dist="19050" dir="2700000" algn="tl" rotWithShape="0">
+                    <a:schemeClr val="dk1">
+                      <a:alpha val="40000"/>
+                    </a:schemeClr>
+                  </a:outerShdw>
+                </a:effectLst>
+              </a:rPr>
+              <a:t>(BAM file)</a:t>
+            </a:r>
+            <a:endParaRPr lang="en-US" sz="1400" b="0" cap="none" spc="0" dirty="0">
+              <a:ln w="0"/>
+              <a:solidFill>
+                <a:schemeClr val="tx1"/>
+              </a:solidFill>
+              <a:effectLst>
+                <a:outerShdw blurRad="38100" dist="19050" dir="2700000" algn="tl" rotWithShape="0">
+                  <a:schemeClr val="dk1">
+                    <a:alpha val="40000"/>
+                  </a:schemeClr>
+                </a:outerShdw>
+              </a:effectLst>
+            </a:endParaRPr>
+          </a:p>
+        </p:txBody>
+      </p:sp>
+      <p:sp>
+        <p:nvSpPr>
+          <p:cNvPr id="28" name="Rectangle 27">
+            <a:extLst>
+              <a:ext uri="{FF2B5EF4-FFF2-40B4-BE49-F238E27FC236}">
+                <a16:creationId xmlns:a16="http://schemas.microsoft.com/office/drawing/2014/main" id="{CF531CCE-9274-304D-9155-B35D65737B8C}"/>
+              </a:ext>
+            </a:extLst>
+          </p:cNvPr>
+          <p:cNvSpPr/>
+          <p:nvPr/>
+        </p:nvSpPr>
+        <p:spPr>
+          <a:xfrm>
+            <a:off x="4131850" y="1629227"/>
+            <a:ext cx="1358064" cy="523220"/>
+          </a:xfrm>
+          <a:prstGeom prst="rect">
+            <a:avLst/>
+          </a:prstGeom>
+          <a:noFill/>
+        </p:spPr>
+        <p:txBody>
+          <a:bodyPr wrap="none" lIns="91440" tIns="45720" rIns="91440" bIns="45720">
+            <a:spAutoFit/>
+          </a:bodyPr>
+          <a:lstStyle/>
+          <a:p>
+            <a:pPr algn="ctr"/>
+            <a:r>
+              <a:rPr lang="en-US" sz="1400" b="0" cap="none" spc="0" dirty="0">
+                <a:ln w="0"/>
+                <a:solidFill>
+                  <a:schemeClr val="tx1"/>
+                </a:solidFill>
+                <a:effectLst>
+                  <a:outerShdw blurRad="38100" dist="19050" dir="2700000" algn="tl" rotWithShape="0">
+                    <a:schemeClr val="dk1">
+                      <a:alpha val="40000"/>
+                    </a:schemeClr>
+                  </a:outerShdw>
+                </a:effectLst>
+              </a:rPr>
+              <a:t>Protein-binding </a:t>
+            </a:r>
+          </a:p>
+          <a:p>
+            <a:pPr algn="ctr"/>
+            <a:r>
+              <a:rPr lang="en-US" sz="1400" b="0" cap="none" spc="0" dirty="0">
+                <a:ln w="0"/>
+                <a:solidFill>
+                  <a:schemeClr val="tx1"/>
+                </a:solidFill>
+                <a:effectLst>
+                  <a:outerShdw blurRad="38100" dist="19050" dir="2700000" algn="tl" rotWithShape="0">
+                    <a:schemeClr val="dk1">
+                      <a:alpha val="40000"/>
+                    </a:schemeClr>
+                  </a:outerShdw>
+                </a:effectLst>
+              </a:rPr>
+              <a:t>assay</a:t>
+            </a:r>
+          </a:p>
+        </p:txBody>
+      </p:sp>
+    </p:spTree>
+    <p:extLst>
+      <p:ext uri="{BB962C8B-B14F-4D97-AF65-F5344CB8AC3E}">
+        <p14:creationId xmlns:p14="http://schemas.microsoft.com/office/powerpoint/2010/main" val="3713582907"/>
+      </p:ext>
+    </p:extLst>
+  </p:cSld>
+  <p:clrMapOvr>
+    <a:masterClrMapping/>
+  </p:clrMapOvr>
+</p:sld>
+</file>
+
+<file path=ppt/slides/slide6.xml><?xml version="1.0" encoding="utf-8"?>
+<p:sld xmlns:a="http://schemas.openxmlformats.org/drawingml/2006/main" xmlns:r="http://schemas.openxmlformats.org/officeDocument/2006/relationships" xmlns:p="http://schemas.openxmlformats.org/presentationml/2006/main">
+  <p:cSld>
+    <p:spTree>
+      <p:nvGrpSpPr>
+        <p:cNvPr id="1" name=""/>
+        <p:cNvGrpSpPr/>
+        <p:nvPr/>
+      </p:nvGrpSpPr>
+      <p:grpSpPr>
+        <a:xfrm>
+          <a:off x="0" y="0"/>
+          <a:ext cx="0" cy="0"/>
+          <a:chOff x="0" y="0"/>
+          <a:chExt cx="0" cy="0"/>
+        </a:xfrm>
+      </p:grpSpPr>
       <p:sp>
         <p:nvSpPr>
           <p:cNvPr id="2" name="Title 1">
@@ -10277,7 +14230,7 @@
 </p:sld>
 </file>
 
-<file path=ppt/slides/slide5.xml><?xml version="1.0" encoding="utf-8"?>
+<file path=ppt/slides/slide7.xml><?xml version="1.0" encoding="utf-8"?>
 <p:sld xmlns:a="http://schemas.openxmlformats.org/drawingml/2006/main" xmlns:r="http://schemas.openxmlformats.org/officeDocument/2006/relationships" xmlns:p="http://schemas.openxmlformats.org/presentationml/2006/main">
   <p:cSld>
     <p:spTree>
@@ -11918,7 +15871,7 @@
 </p:sld>
 </file>
 
-<file path=ppt/slides/slide6.xml><?xml version="1.0" encoding="utf-8"?>
+<file path=ppt/slides/slide8.xml><?xml version="1.0" encoding="utf-8"?>
 <p:sld xmlns:a="http://schemas.openxmlformats.org/drawingml/2006/main" xmlns:r="http://schemas.openxmlformats.org/officeDocument/2006/relationships" xmlns:p="http://schemas.openxmlformats.org/presentationml/2006/main">
   <p:cSld>
     <p:spTree>
@@ -16308,7 +20261,7 @@
 </p:sld>
 </file>
 
-<file path=ppt/slides/slide7.xml><?xml version="1.0" encoding="utf-8"?>
+<file path=ppt/slides/slide9.xml><?xml version="1.0" encoding="utf-8"?>
 <p:sld xmlns:a="http://schemas.openxmlformats.org/drawingml/2006/main" xmlns:r="http://schemas.openxmlformats.org/officeDocument/2006/relationships" xmlns:p="http://schemas.openxmlformats.org/presentationml/2006/main">
   <p:cSld>
     <p:spTree>

</xml_diff>

<commit_message>
Update presentation slides and workshop notebook
</commit_message>
<xml_diff>
--- a/Machine_Learning_Deep_Learning/data/Dataset_Preparation_EP_DL.pptx
+++ b/Machine_Learning_Deep_Learning/data/Dataset_Preparation_EP_DL.pptx
@@ -9754,7 +9754,7 @@
           <a:p>
             <a:fld id="{909B45E2-01E7-45BE-8601-658BCEA76055}" type="datetimeFigureOut">
               <a:rPr lang="en-US" smtClean="0"/>
-              <a:t>8/22/19</a:t>
+              <a:t>8/23/19</a:t>
             </a:fld>
             <a:endParaRPr lang="en-US"/>
           </a:p>
@@ -9952,7 +9952,7 @@
           <a:p>
             <a:fld id="{909B45E2-01E7-45BE-8601-658BCEA76055}" type="datetimeFigureOut">
               <a:rPr lang="en-US" smtClean="0"/>
-              <a:t>8/22/19</a:t>
+              <a:t>8/23/19</a:t>
             </a:fld>
             <a:endParaRPr lang="en-US"/>
           </a:p>
@@ -10160,7 +10160,7 @@
           <a:p>
             <a:fld id="{909B45E2-01E7-45BE-8601-658BCEA76055}" type="datetimeFigureOut">
               <a:rPr lang="en-US" smtClean="0"/>
-              <a:t>8/22/19</a:t>
+              <a:t>8/23/19</a:t>
             </a:fld>
             <a:endParaRPr lang="en-US"/>
           </a:p>
@@ -10358,7 +10358,7 @@
           <a:p>
             <a:fld id="{909B45E2-01E7-45BE-8601-658BCEA76055}" type="datetimeFigureOut">
               <a:rPr lang="en-US" smtClean="0"/>
-              <a:t>8/22/19</a:t>
+              <a:t>8/23/19</a:t>
             </a:fld>
             <a:endParaRPr lang="en-US"/>
           </a:p>
@@ -10633,7 +10633,7 @@
           <a:p>
             <a:fld id="{909B45E2-01E7-45BE-8601-658BCEA76055}" type="datetimeFigureOut">
               <a:rPr lang="en-US" smtClean="0"/>
-              <a:t>8/22/19</a:t>
+              <a:t>8/23/19</a:t>
             </a:fld>
             <a:endParaRPr lang="en-US"/>
           </a:p>
@@ -10898,7 +10898,7 @@
           <a:p>
             <a:fld id="{909B45E2-01E7-45BE-8601-658BCEA76055}" type="datetimeFigureOut">
               <a:rPr lang="en-US" smtClean="0"/>
-              <a:t>8/22/19</a:t>
+              <a:t>8/23/19</a:t>
             </a:fld>
             <a:endParaRPr lang="en-US"/>
           </a:p>
@@ -11310,7 +11310,7 @@
           <a:p>
             <a:fld id="{909B45E2-01E7-45BE-8601-658BCEA76055}" type="datetimeFigureOut">
               <a:rPr lang="en-US" smtClean="0"/>
-              <a:t>8/22/19</a:t>
+              <a:t>8/23/19</a:t>
             </a:fld>
             <a:endParaRPr lang="en-US"/>
           </a:p>
@@ -11451,7 +11451,7 @@
           <a:p>
             <a:fld id="{909B45E2-01E7-45BE-8601-658BCEA76055}" type="datetimeFigureOut">
               <a:rPr lang="en-US" smtClean="0"/>
-              <a:t>8/22/19</a:t>
+              <a:t>8/23/19</a:t>
             </a:fld>
             <a:endParaRPr lang="en-US"/>
           </a:p>
@@ -11564,7 +11564,7 @@
           <a:p>
             <a:fld id="{909B45E2-01E7-45BE-8601-658BCEA76055}" type="datetimeFigureOut">
               <a:rPr lang="en-US" smtClean="0"/>
-              <a:t>8/22/19</a:t>
+              <a:t>8/23/19</a:t>
             </a:fld>
             <a:endParaRPr lang="en-US"/>
           </a:p>
@@ -11875,7 +11875,7 @@
           <a:p>
             <a:fld id="{909B45E2-01E7-45BE-8601-658BCEA76055}" type="datetimeFigureOut">
               <a:rPr lang="en-US" smtClean="0"/>
-              <a:t>8/22/19</a:t>
+              <a:t>8/23/19</a:t>
             </a:fld>
             <a:endParaRPr lang="en-US"/>
           </a:p>
@@ -12163,7 +12163,7 @@
           <a:p>
             <a:fld id="{909B45E2-01E7-45BE-8601-658BCEA76055}" type="datetimeFigureOut">
               <a:rPr lang="en-US" smtClean="0"/>
-              <a:t>8/22/19</a:t>
+              <a:t>8/23/19</a:t>
             </a:fld>
             <a:endParaRPr lang="en-US"/>
           </a:p>
@@ -12404,7 +12404,7 @@
           <a:p>
             <a:fld id="{909B45E2-01E7-45BE-8601-658BCEA76055}" type="datetimeFigureOut">
               <a:rPr lang="en-US" smtClean="0"/>
-              <a:t>8/22/19</a:t>
+              <a:t>8/23/19</a:t>
             </a:fld>
             <a:endParaRPr lang="en-US"/>
           </a:p>
@@ -14111,6 +14111,374 @@
               </a:rPr>
               <a:t>assay</a:t>
             </a:r>
+          </a:p>
+        </p:txBody>
+      </p:sp>
+      <p:pic>
+        <p:nvPicPr>
+          <p:cNvPr id="3" name="Picture 2" descr="A close up of a mans face&#10;&#10;Description automatically generated">
+            <a:extLst>
+              <a:ext uri="{FF2B5EF4-FFF2-40B4-BE49-F238E27FC236}">
+                <a16:creationId xmlns:a16="http://schemas.microsoft.com/office/drawing/2014/main" id="{1214CFD5-DA81-DC4B-ABF6-5597F35A05BD}"/>
+              </a:ext>
+            </a:extLst>
+          </p:cNvPr>
+          <p:cNvPicPr>
+            <a:picLocks noChangeAspect="1"/>
+          </p:cNvPicPr>
+          <p:nvPr/>
+        </p:nvPicPr>
+        <p:blipFill>
+          <a:blip r:embed="rId10">
+            <a:extLst>
+              <a:ext uri="{28A0092B-C50C-407E-A947-70E740481C1C}">
+                <a14:useLocalDpi xmlns:a14="http://schemas.microsoft.com/office/drawing/2010/main" val="0"/>
+              </a:ext>
+            </a:extLst>
+          </a:blip>
+          <a:stretch>
+            <a:fillRect/>
+          </a:stretch>
+        </p:blipFill>
+        <p:spPr>
+          <a:xfrm>
+            <a:off x="344424" y="4599173"/>
+            <a:ext cx="6438900" cy="342900"/>
+          </a:xfrm>
+          <a:prstGeom prst="rect">
+            <a:avLst/>
+          </a:prstGeom>
+        </p:spPr>
+      </p:pic>
+      <p:pic>
+        <p:nvPicPr>
+          <p:cNvPr id="11" name="Picture 10" descr="A close up of a logo&#10;&#10;Description automatically generated">
+            <a:extLst>
+              <a:ext uri="{FF2B5EF4-FFF2-40B4-BE49-F238E27FC236}">
+                <a16:creationId xmlns:a16="http://schemas.microsoft.com/office/drawing/2014/main" id="{28E3458B-D5A5-E84D-8A89-19DE5D9F37D9}"/>
+              </a:ext>
+            </a:extLst>
+          </p:cNvPr>
+          <p:cNvPicPr>
+            <a:picLocks noChangeAspect="1"/>
+          </p:cNvPicPr>
+          <p:nvPr/>
+        </p:nvPicPr>
+        <p:blipFill>
+          <a:blip r:embed="rId11">
+            <a:extLst>
+              <a:ext uri="{28A0092B-C50C-407E-A947-70E740481C1C}">
+                <a14:useLocalDpi xmlns:a14="http://schemas.microsoft.com/office/drawing/2010/main" val="0"/>
+              </a:ext>
+            </a:extLst>
+          </a:blip>
+          <a:stretch>
+            <a:fillRect/>
+          </a:stretch>
+        </p:blipFill>
+        <p:spPr>
+          <a:xfrm>
+            <a:off x="344424" y="4986066"/>
+            <a:ext cx="4254500" cy="342900"/>
+          </a:xfrm>
+          <a:prstGeom prst="rect">
+            <a:avLst/>
+          </a:prstGeom>
+        </p:spPr>
+      </p:pic>
+      <p:pic>
+        <p:nvPicPr>
+          <p:cNvPr id="15" name="Picture 14">
+            <a:extLst>
+              <a:ext uri="{FF2B5EF4-FFF2-40B4-BE49-F238E27FC236}">
+                <a16:creationId xmlns:a16="http://schemas.microsoft.com/office/drawing/2014/main" id="{DE00E82C-DD51-AC48-B71A-05D3E4F542A4}"/>
+              </a:ext>
+            </a:extLst>
+          </p:cNvPr>
+          <p:cNvPicPr>
+            <a:picLocks noChangeAspect="1"/>
+          </p:cNvPicPr>
+          <p:nvPr/>
+        </p:nvPicPr>
+        <p:blipFill>
+          <a:blip r:embed="rId12">
+            <a:extLst>
+              <a:ext uri="{28A0092B-C50C-407E-A947-70E740481C1C}">
+                <a14:useLocalDpi xmlns:a14="http://schemas.microsoft.com/office/drawing/2010/main" val="0"/>
+              </a:ext>
+            </a:extLst>
+          </a:blip>
+          <a:stretch>
+            <a:fillRect/>
+          </a:stretch>
+        </p:blipFill>
+        <p:spPr>
+          <a:xfrm>
+            <a:off x="344424" y="5414075"/>
+            <a:ext cx="5384800" cy="1079500"/>
+          </a:xfrm>
+          <a:prstGeom prst="rect">
+            <a:avLst/>
+          </a:prstGeom>
+        </p:spPr>
+      </p:pic>
+      <p:sp>
+        <p:nvSpPr>
+          <p:cNvPr id="18" name="Rectangle 17">
+            <a:extLst>
+              <a:ext uri="{FF2B5EF4-FFF2-40B4-BE49-F238E27FC236}">
+                <a16:creationId xmlns:a16="http://schemas.microsoft.com/office/drawing/2014/main" id="{B79467E3-328B-704B-96B6-304615260D1C}"/>
+              </a:ext>
+            </a:extLst>
+          </p:cNvPr>
+          <p:cNvSpPr/>
+          <p:nvPr/>
+        </p:nvSpPr>
+        <p:spPr>
+          <a:xfrm>
+            <a:off x="6511886" y="471059"/>
+            <a:ext cx="824440" cy="307777"/>
+          </a:xfrm>
+          <a:prstGeom prst="rect">
+            <a:avLst/>
+          </a:prstGeom>
+          <a:noFill/>
+          <a:ln w="25400">
+            <a:solidFill>
+              <a:srgbClr val="FF0000"/>
+            </a:solidFill>
+          </a:ln>
+        </p:spPr>
+        <p:style>
+          <a:lnRef idx="2">
+            <a:schemeClr val="accent1">
+              <a:shade val="50000"/>
+            </a:schemeClr>
+          </a:lnRef>
+          <a:fillRef idx="1">
+            <a:schemeClr val="accent1"/>
+          </a:fillRef>
+          <a:effectRef idx="0">
+            <a:schemeClr val="accent1"/>
+          </a:effectRef>
+          <a:fontRef idx="minor">
+            <a:schemeClr val="lt1"/>
+          </a:fontRef>
+        </p:style>
+        <p:txBody>
+          <a:bodyPr rtlCol="0" anchor="ctr"/>
+          <a:lstStyle/>
+          <a:p>
+            <a:pPr algn="ctr"/>
+            <a:endParaRPr lang="en-US"/>
+          </a:p>
+        </p:txBody>
+      </p:sp>
+      <p:sp>
+        <p:nvSpPr>
+          <p:cNvPr id="29" name="Rectangle 28">
+            <a:extLst>
+              <a:ext uri="{FF2B5EF4-FFF2-40B4-BE49-F238E27FC236}">
+                <a16:creationId xmlns:a16="http://schemas.microsoft.com/office/drawing/2014/main" id="{47A2B25E-EE3F-3744-8828-CB94FADE4D48}"/>
+              </a:ext>
+            </a:extLst>
+          </p:cNvPr>
+          <p:cNvSpPr/>
+          <p:nvPr/>
+        </p:nvSpPr>
+        <p:spPr>
+          <a:xfrm>
+            <a:off x="2473694" y="6134100"/>
+            <a:ext cx="972150" cy="191292"/>
+          </a:xfrm>
+          <a:prstGeom prst="rect">
+            <a:avLst/>
+          </a:prstGeom>
+          <a:noFill/>
+          <a:ln w="25400">
+            <a:solidFill>
+              <a:srgbClr val="FF0000"/>
+            </a:solidFill>
+          </a:ln>
+        </p:spPr>
+        <p:style>
+          <a:lnRef idx="2">
+            <a:schemeClr val="accent1">
+              <a:shade val="50000"/>
+            </a:schemeClr>
+          </a:lnRef>
+          <a:fillRef idx="1">
+            <a:schemeClr val="accent1"/>
+          </a:fillRef>
+          <a:effectRef idx="0">
+            <a:schemeClr val="accent1"/>
+          </a:effectRef>
+          <a:fontRef idx="minor">
+            <a:schemeClr val="lt1"/>
+          </a:fontRef>
+        </p:style>
+        <p:txBody>
+          <a:bodyPr rtlCol="0" anchor="ctr"/>
+          <a:lstStyle/>
+          <a:p>
+            <a:pPr algn="ctr"/>
+            <a:endParaRPr lang="en-US"/>
+          </a:p>
+        </p:txBody>
+      </p:sp>
+      <p:sp>
+        <p:nvSpPr>
+          <p:cNvPr id="30" name="Rectangle 29">
+            <a:extLst>
+              <a:ext uri="{FF2B5EF4-FFF2-40B4-BE49-F238E27FC236}">
+                <a16:creationId xmlns:a16="http://schemas.microsoft.com/office/drawing/2014/main" id="{E5D2FFB8-752D-A248-8813-B56552160E41}"/>
+              </a:ext>
+            </a:extLst>
+          </p:cNvPr>
+          <p:cNvSpPr/>
+          <p:nvPr/>
+        </p:nvSpPr>
+        <p:spPr>
+          <a:xfrm>
+            <a:off x="2019285" y="5953825"/>
+            <a:ext cx="452389" cy="205586"/>
+          </a:xfrm>
+          <a:prstGeom prst="rect">
+            <a:avLst/>
+          </a:prstGeom>
+          <a:noFill/>
+          <a:ln w="25400">
+            <a:solidFill>
+              <a:srgbClr val="FF0000"/>
+            </a:solidFill>
+          </a:ln>
+        </p:spPr>
+        <p:style>
+          <a:lnRef idx="2">
+            <a:schemeClr val="accent1">
+              <a:shade val="50000"/>
+            </a:schemeClr>
+          </a:lnRef>
+          <a:fillRef idx="1">
+            <a:schemeClr val="accent1"/>
+          </a:fillRef>
+          <a:effectRef idx="0">
+            <a:schemeClr val="accent1"/>
+          </a:effectRef>
+          <a:fontRef idx="minor">
+            <a:schemeClr val="lt1"/>
+          </a:fontRef>
+        </p:style>
+        <p:txBody>
+          <a:bodyPr rtlCol="0" anchor="ctr"/>
+          <a:lstStyle/>
+          <a:p>
+            <a:pPr algn="ctr"/>
+            <a:endParaRPr lang="en-US"/>
+          </a:p>
+        </p:txBody>
+      </p:sp>
+      <p:sp>
+        <p:nvSpPr>
+          <p:cNvPr id="31" name="Rectangle 30">
+            <a:extLst>
+              <a:ext uri="{FF2B5EF4-FFF2-40B4-BE49-F238E27FC236}">
+                <a16:creationId xmlns:a16="http://schemas.microsoft.com/office/drawing/2014/main" id="{CC10F364-DBE7-2446-892A-690118AFDE5A}"/>
+              </a:ext>
+            </a:extLst>
+          </p:cNvPr>
+          <p:cNvSpPr/>
+          <p:nvPr/>
+        </p:nvSpPr>
+        <p:spPr>
+          <a:xfrm>
+            <a:off x="1361477" y="5754900"/>
+            <a:ext cx="364839" cy="205586"/>
+          </a:xfrm>
+          <a:prstGeom prst="rect">
+            <a:avLst/>
+          </a:prstGeom>
+          <a:noFill/>
+          <a:ln w="25400">
+            <a:solidFill>
+              <a:srgbClr val="FF0000"/>
+            </a:solidFill>
+          </a:ln>
+        </p:spPr>
+        <p:style>
+          <a:lnRef idx="2">
+            <a:schemeClr val="accent1">
+              <a:shade val="50000"/>
+            </a:schemeClr>
+          </a:lnRef>
+          <a:fillRef idx="1">
+            <a:schemeClr val="accent1"/>
+          </a:fillRef>
+          <a:effectRef idx="0">
+            <a:schemeClr val="accent1"/>
+          </a:effectRef>
+          <a:fontRef idx="minor">
+            <a:schemeClr val="lt1"/>
+          </a:fontRef>
+        </p:style>
+        <p:txBody>
+          <a:bodyPr rtlCol="0" anchor="ctr"/>
+          <a:lstStyle/>
+          <a:p>
+            <a:pPr algn="ctr"/>
+            <a:endParaRPr lang="en-US"/>
+          </a:p>
+        </p:txBody>
+      </p:sp>
+      <p:sp>
+        <p:nvSpPr>
+          <p:cNvPr id="32" name="Rectangle 31">
+            <a:extLst>
+              <a:ext uri="{FF2B5EF4-FFF2-40B4-BE49-F238E27FC236}">
+                <a16:creationId xmlns:a16="http://schemas.microsoft.com/office/drawing/2014/main" id="{C553EEA0-C644-704B-B05B-C1CABA754C4C}"/>
+              </a:ext>
+            </a:extLst>
+          </p:cNvPr>
+          <p:cNvSpPr/>
+          <p:nvPr/>
+        </p:nvSpPr>
+        <p:spPr>
+          <a:xfrm>
+            <a:off x="3647975" y="4986066"/>
+            <a:ext cx="818146" cy="263784"/>
+          </a:xfrm>
+          <a:prstGeom prst="rect">
+            <a:avLst/>
+          </a:prstGeom>
+          <a:noFill/>
+          <a:ln w="25400">
+            <a:solidFill>
+              <a:srgbClr val="FF0000"/>
+            </a:solidFill>
+          </a:ln>
+        </p:spPr>
+        <p:style>
+          <a:lnRef idx="2">
+            <a:schemeClr val="accent1">
+              <a:shade val="50000"/>
+            </a:schemeClr>
+          </a:lnRef>
+          <a:fillRef idx="1">
+            <a:schemeClr val="accent1"/>
+          </a:fillRef>
+          <a:effectRef idx="0">
+            <a:schemeClr val="accent1"/>
+          </a:effectRef>
+          <a:fontRef idx="minor">
+            <a:schemeClr val="lt1"/>
+          </a:fontRef>
+        </p:style>
+        <p:txBody>
+          <a:bodyPr rtlCol="0" anchor="ctr"/>
+          <a:lstStyle/>
+          <a:p>
+            <a:pPr algn="ctr"/>
+            <a:endParaRPr lang="en-US"/>
           </a:p>
         </p:txBody>
       </p:sp>

</xml_diff>